<commit_message>
Provide schematics on how Promitor works (#1188)
Signed-off-by: Tom Kerkhove <kerkhove.tom@gmail.com>
</commit_message>
<xml_diff>
--- a/media/schematics/schematics.pptx
+++ b/media/schematics/schematics.pptx
@@ -5,7 +5,11 @@
     <p:sldMasterId id="2147483648" r:id="rId1"/>
   </p:sldMasterIdLst>
   <p:sldIdLst>
-    <p:sldId id="256" r:id="rId2"/>
+    <p:sldId id="258" r:id="rId2"/>
+    <p:sldId id="263" r:id="rId3"/>
+    <p:sldId id="264" r:id="rId4"/>
+    <p:sldId id="266" r:id="rId5"/>
+    <p:sldId id="256" r:id="rId6"/>
   </p:sldIdLst>
   <p:sldSz cx="12192000" cy="6858000"/>
   <p:notesSz cx="6858000" cy="9144000"/>
@@ -104,6 +108,28 @@
       </a:defRPr>
     </a:lvl9pPr>
   </p:defaultTextStyle>
+  <p:extLst>
+    <p:ext uri="{521415D9-36F7-43E2-AB2F-B90AF26B5E84}">
+      <p14:sectionLst xmlns:p14="http://schemas.microsoft.com/office/powerpoint/2010/main">
+        <p14:section name="Overviews" id="{E6D77793-41F2-4B3D-8B58-5DA21C617E87}">
+          <p14:sldIdLst>
+            <p14:sldId id="258"/>
+            <p14:sldId id="263"/>
+            <p14:sldId id="264"/>
+            <p14:sldId id="266"/>
+          </p14:sldIdLst>
+        </p14:section>
+        <p14:section name="Logos" id="{1FCCA3F7-6BF9-486B-941C-AFCB7516BE42}">
+          <p14:sldIdLst>
+            <p14:sldId id="256"/>
+          </p14:sldIdLst>
+        </p14:section>
+      </p14:sectionLst>
+    </p:ext>
+    <p:ext uri="{EFAFB233-063F-42B5-8137-9DF3F51BA10A}">
+      <p15:sldGuideLst xmlns:p15="http://schemas.microsoft.com/office/powerpoint/2012/main"/>
+    </p:ext>
+  </p:extLst>
 </p:presentation>
 </file>
 
@@ -256,7 +282,7 @@
           <a:p>
             <a:fld id="{268B1832-4C9F-45AF-916B-E5DF6A83A891}" type="datetimeFigureOut">
               <a:rPr lang="LID4096" smtClean="0"/>
-              <a:t>07/26/2020</a:t>
+              <a:t>07/29/2020</a:t>
             </a:fld>
             <a:endParaRPr lang="LID4096"/>
           </a:p>
@@ -456,7 +482,7 @@
           <a:p>
             <a:fld id="{268B1832-4C9F-45AF-916B-E5DF6A83A891}" type="datetimeFigureOut">
               <a:rPr lang="LID4096" smtClean="0"/>
-              <a:t>07/26/2020</a:t>
+              <a:t>07/29/2020</a:t>
             </a:fld>
             <a:endParaRPr lang="LID4096"/>
           </a:p>
@@ -666,7 +692,7 @@
           <a:p>
             <a:fld id="{268B1832-4C9F-45AF-916B-E5DF6A83A891}" type="datetimeFigureOut">
               <a:rPr lang="LID4096" smtClean="0"/>
-              <a:t>07/26/2020</a:t>
+              <a:t>07/29/2020</a:t>
             </a:fld>
             <a:endParaRPr lang="LID4096"/>
           </a:p>
@@ -866,7 +892,7 @@
           <a:p>
             <a:fld id="{268B1832-4C9F-45AF-916B-E5DF6A83A891}" type="datetimeFigureOut">
               <a:rPr lang="LID4096" smtClean="0"/>
-              <a:t>07/26/2020</a:t>
+              <a:t>07/29/2020</a:t>
             </a:fld>
             <a:endParaRPr lang="LID4096"/>
           </a:p>
@@ -1142,7 +1168,7 @@
           <a:p>
             <a:fld id="{268B1832-4C9F-45AF-916B-E5DF6A83A891}" type="datetimeFigureOut">
               <a:rPr lang="LID4096" smtClean="0"/>
-              <a:t>07/26/2020</a:t>
+              <a:t>07/29/2020</a:t>
             </a:fld>
             <a:endParaRPr lang="LID4096"/>
           </a:p>
@@ -1410,7 +1436,7 @@
           <a:p>
             <a:fld id="{268B1832-4C9F-45AF-916B-E5DF6A83A891}" type="datetimeFigureOut">
               <a:rPr lang="LID4096" smtClean="0"/>
-              <a:t>07/26/2020</a:t>
+              <a:t>07/29/2020</a:t>
             </a:fld>
             <a:endParaRPr lang="LID4096"/>
           </a:p>
@@ -1825,7 +1851,7 @@
           <a:p>
             <a:fld id="{268B1832-4C9F-45AF-916B-E5DF6A83A891}" type="datetimeFigureOut">
               <a:rPr lang="LID4096" smtClean="0"/>
-              <a:t>07/26/2020</a:t>
+              <a:t>07/29/2020</a:t>
             </a:fld>
             <a:endParaRPr lang="LID4096"/>
           </a:p>
@@ -1967,7 +1993,7 @@
           <a:p>
             <a:fld id="{268B1832-4C9F-45AF-916B-E5DF6A83A891}" type="datetimeFigureOut">
               <a:rPr lang="LID4096" smtClean="0"/>
-              <a:t>07/26/2020</a:t>
+              <a:t>07/29/2020</a:t>
             </a:fld>
             <a:endParaRPr lang="LID4096"/>
           </a:p>
@@ -2080,7 +2106,7 @@
           <a:p>
             <a:fld id="{268B1832-4C9F-45AF-916B-E5DF6A83A891}" type="datetimeFigureOut">
               <a:rPr lang="LID4096" smtClean="0"/>
-              <a:t>07/26/2020</a:t>
+              <a:t>07/29/2020</a:t>
             </a:fld>
             <a:endParaRPr lang="LID4096"/>
           </a:p>
@@ -2393,7 +2419,7 @@
           <a:p>
             <a:fld id="{268B1832-4C9F-45AF-916B-E5DF6A83A891}" type="datetimeFigureOut">
               <a:rPr lang="LID4096" smtClean="0"/>
-              <a:t>07/26/2020</a:t>
+              <a:t>07/29/2020</a:t>
             </a:fld>
             <a:endParaRPr lang="LID4096"/>
           </a:p>
@@ -2682,7 +2708,7 @@
           <a:p>
             <a:fld id="{268B1832-4C9F-45AF-916B-E5DF6A83A891}" type="datetimeFigureOut">
               <a:rPr lang="LID4096" smtClean="0"/>
-              <a:t>07/26/2020</a:t>
+              <a:t>07/29/2020</a:t>
             </a:fld>
             <a:endParaRPr lang="LID4096"/>
           </a:p>
@@ -2925,7 +2951,7 @@
           <a:p>
             <a:fld id="{268B1832-4C9F-45AF-916B-E5DF6A83A891}" type="datetimeFigureOut">
               <a:rPr lang="LID4096" smtClean="0"/>
-              <a:t>07/26/2020</a:t>
+              <a:t>07/29/2020</a:t>
             </a:fld>
             <a:endParaRPr lang="LID4096"/>
           </a:p>
@@ -3344,10 +3370,10 @@
       </p:grpSpPr>
       <p:pic>
         <p:nvPicPr>
-          <p:cNvPr id="1026" name="Picture 2" descr="StatsD Logo | Logos, Tech logos, Gaming logos">
-            <a:extLst>
-              <a:ext uri="{FF2B5EF4-FFF2-40B4-BE49-F238E27FC236}">
-                <a16:creationId xmlns:a16="http://schemas.microsoft.com/office/drawing/2014/main" id="{470DAB4B-EB50-4C7D-AB0C-3A498CAB9764}"/>
+          <p:cNvPr id="8" name="Picture 2" descr="StatsD Logo | Logos, Tech logos, Gaming logos">
+            <a:extLst>
+              <a:ext uri="{FF2B5EF4-FFF2-40B4-BE49-F238E27FC236}">
+                <a16:creationId xmlns:a16="http://schemas.microsoft.com/office/drawing/2014/main" id="{A831F2BA-C1BF-45DD-A426-92DBB667254B}"/>
               </a:ext>
             </a:extLst>
           </p:cNvPr>
@@ -3369,8 +3395,8 @@
         </p:blipFill>
         <p:spPr bwMode="auto">
           <a:xfrm>
-            <a:off x="1612901" y="677539"/>
-            <a:ext cx="2308860" cy="839586"/>
+            <a:off x="3362012" y="1490275"/>
+            <a:ext cx="1350634" cy="491140"/>
           </a:xfrm>
           <a:prstGeom prst="rect">
             <a:avLst/>
@@ -3389,10 +3415,10 @@
       </p:pic>
       <p:pic>
         <p:nvPicPr>
-          <p:cNvPr id="1028" name="Picture 4" descr="Statuspage | Atlassian">
-            <a:extLst>
-              <a:ext uri="{FF2B5EF4-FFF2-40B4-BE49-F238E27FC236}">
-                <a16:creationId xmlns:a16="http://schemas.microsoft.com/office/drawing/2014/main" id="{31914B54-1771-403D-AD53-037D501A61D0}"/>
+          <p:cNvPr id="9" name="Picture 4" descr="Statuspage | Atlassian">
+            <a:extLst>
+              <a:ext uri="{FF2B5EF4-FFF2-40B4-BE49-F238E27FC236}">
+                <a16:creationId xmlns:a16="http://schemas.microsoft.com/office/drawing/2014/main" id="{ED0E2EE6-F25D-4B8F-83AA-A9112BCEE768}"/>
               </a:ext>
             </a:extLst>
           </p:cNvPr>
@@ -3416,8 +3442,8 @@
         </p:blipFill>
         <p:spPr bwMode="auto">
           <a:xfrm>
-            <a:off x="4704082" y="849259"/>
-            <a:ext cx="3312160" cy="480342"/>
+            <a:off x="5127229" y="1378972"/>
+            <a:ext cx="1937542" cy="280990"/>
           </a:xfrm>
           <a:prstGeom prst="rect">
             <a:avLst/>
@@ -3436,10 +3462,10 @@
       </p:pic>
       <p:pic>
         <p:nvPicPr>
-          <p:cNvPr id="1032" name="Picture 8">
-            <a:extLst>
-              <a:ext uri="{FF2B5EF4-FFF2-40B4-BE49-F238E27FC236}">
-                <a16:creationId xmlns:a16="http://schemas.microsoft.com/office/drawing/2014/main" id="{22B0F493-77C7-4171-AAEE-F756BB880245}"/>
+          <p:cNvPr id="10" name="Picture 8">
+            <a:extLst>
+              <a:ext uri="{FF2B5EF4-FFF2-40B4-BE49-F238E27FC236}">
+                <a16:creationId xmlns:a16="http://schemas.microsoft.com/office/drawing/2014/main" id="{CEDA630D-175A-4E24-AD69-628B82FF0939}"/>
               </a:ext>
             </a:extLst>
           </p:cNvPr>
@@ -3461,8 +3487,8 @@
         </p:blipFill>
         <p:spPr bwMode="auto">
           <a:xfrm>
-            <a:off x="8798563" y="695380"/>
-            <a:ext cx="2438398" cy="803904"/>
+            <a:off x="7509163" y="1490275"/>
+            <a:ext cx="1426410" cy="470266"/>
           </a:xfrm>
           <a:prstGeom prst="rect">
             <a:avLst/>
@@ -3481,10 +3507,10 @@
       </p:pic>
       <p:pic>
         <p:nvPicPr>
-          <p:cNvPr id="8" name="Picture 2" descr="StatsD Logo | Logos, Tech logos, Gaming logos">
-            <a:extLst>
-              <a:ext uri="{FF2B5EF4-FFF2-40B4-BE49-F238E27FC236}">
-                <a16:creationId xmlns:a16="http://schemas.microsoft.com/office/drawing/2014/main" id="{A831F2BA-C1BF-45DD-A426-92DBB667254B}"/>
+          <p:cNvPr id="12" name="Picture 2" descr="Promitor - Bringing Azure Monitor metrics where you need them ...">
+            <a:extLst>
+              <a:ext uri="{FF2B5EF4-FFF2-40B4-BE49-F238E27FC236}">
+                <a16:creationId xmlns:a16="http://schemas.microsoft.com/office/drawing/2014/main" id="{29194DD7-E944-49E1-84B5-30313969557E}"/>
               </a:ext>
             </a:extLst>
           </p:cNvPr>
@@ -3493,21 +3519,23 @@
           </p:cNvPicPr>
           <p:nvPr/>
         </p:nvPicPr>
-        <p:blipFill rotWithShape="1">
-          <a:blip r:embed="rId2">
+        <p:blipFill>
+          <a:blip r:embed="rId5">
             <a:extLst>
               <a:ext uri="{28A0092B-C50C-407E-A947-70E740481C1C}">
                 <a14:useLocalDpi xmlns:a14="http://schemas.microsoft.com/office/drawing/2010/main" val="0"/>
               </a:ext>
             </a:extLst>
           </a:blip>
-          <a:srcRect l="9765" t="27530" r="10000" b="26543"/>
-          <a:stretch/>
+          <a:srcRect/>
+          <a:stretch>
+            <a:fillRect/>
+          </a:stretch>
         </p:blipFill>
         <p:spPr bwMode="auto">
           <a:xfrm>
-            <a:off x="3147061" y="3321832"/>
-            <a:ext cx="2308860" cy="839586"/>
+            <a:off x="5016500" y="2420217"/>
+            <a:ext cx="2159000" cy="724630"/>
           </a:xfrm>
           <a:prstGeom prst="rect">
             <a:avLst/>
@@ -3524,12 +3552,211 @@
           </a:extLst>
         </p:spPr>
       </p:pic>
+      <p:cxnSp>
+        <p:nvCxnSpPr>
+          <p:cNvPr id="4" name="Straight Arrow Connector 3">
+            <a:extLst>
+              <a:ext uri="{FF2B5EF4-FFF2-40B4-BE49-F238E27FC236}">
+                <a16:creationId xmlns:a16="http://schemas.microsoft.com/office/drawing/2014/main" id="{080ACE8A-92F3-47BE-A907-9AB06186A982}"/>
+              </a:ext>
+            </a:extLst>
+          </p:cNvPr>
+          <p:cNvCxnSpPr>
+            <a:cxnSpLocks/>
+          </p:cNvCxnSpPr>
+          <p:nvPr/>
+        </p:nvCxnSpPr>
+        <p:spPr>
+          <a:xfrm flipH="1" flipV="1">
+            <a:off x="4770120" y="1960541"/>
+            <a:ext cx="1104425" cy="343704"/>
+          </a:xfrm>
+          <a:prstGeom prst="straightConnector1">
+            <a:avLst/>
+          </a:prstGeom>
+          <a:ln>
+            <a:tailEnd type="triangle"/>
+          </a:ln>
+        </p:spPr>
+        <p:style>
+          <a:lnRef idx="1">
+            <a:schemeClr val="dk1"/>
+          </a:lnRef>
+          <a:fillRef idx="0">
+            <a:schemeClr val="dk1"/>
+          </a:fillRef>
+          <a:effectRef idx="0">
+            <a:schemeClr val="dk1"/>
+          </a:effectRef>
+          <a:fontRef idx="minor">
+            <a:schemeClr val="tx1"/>
+          </a:fontRef>
+        </p:style>
+      </p:cxnSp>
+      <p:cxnSp>
+        <p:nvCxnSpPr>
+          <p:cNvPr id="11" name="Straight Arrow Connector 10">
+            <a:extLst>
+              <a:ext uri="{FF2B5EF4-FFF2-40B4-BE49-F238E27FC236}">
+                <a16:creationId xmlns:a16="http://schemas.microsoft.com/office/drawing/2014/main" id="{3DDD3110-2C22-4100-A249-9147599B7B36}"/>
+              </a:ext>
+            </a:extLst>
+          </p:cNvPr>
+          <p:cNvCxnSpPr>
+            <a:cxnSpLocks/>
+            <a:endCxn id="9" idx="2"/>
+          </p:cNvCxnSpPr>
+          <p:nvPr/>
+        </p:nvCxnSpPr>
+        <p:spPr>
+          <a:xfrm flipV="1">
+            <a:off x="6096000" y="1659962"/>
+            <a:ext cx="0" cy="644283"/>
+          </a:xfrm>
+          <a:prstGeom prst="straightConnector1">
+            <a:avLst/>
+          </a:prstGeom>
+          <a:ln>
+            <a:tailEnd type="triangle"/>
+          </a:ln>
+        </p:spPr>
+        <p:style>
+          <a:lnRef idx="1">
+            <a:schemeClr val="dk1"/>
+          </a:lnRef>
+          <a:fillRef idx="0">
+            <a:schemeClr val="dk1"/>
+          </a:fillRef>
+          <a:effectRef idx="0">
+            <a:schemeClr val="dk1"/>
+          </a:effectRef>
+          <a:fontRef idx="minor">
+            <a:schemeClr val="tx1"/>
+          </a:fontRef>
+        </p:style>
+      </p:cxnSp>
+      <p:cxnSp>
+        <p:nvCxnSpPr>
+          <p:cNvPr id="14" name="Straight Arrow Connector 13">
+            <a:extLst>
+              <a:ext uri="{FF2B5EF4-FFF2-40B4-BE49-F238E27FC236}">
+                <a16:creationId xmlns:a16="http://schemas.microsoft.com/office/drawing/2014/main" id="{EF0E679F-CEE6-4FC8-BEA2-8FFF5767B9F6}"/>
+              </a:ext>
+            </a:extLst>
+          </p:cNvPr>
+          <p:cNvCxnSpPr>
+            <a:cxnSpLocks/>
+          </p:cNvCxnSpPr>
+          <p:nvPr/>
+        </p:nvCxnSpPr>
+        <p:spPr>
+          <a:xfrm flipH="1">
+            <a:off x="6262689" y="1959769"/>
+            <a:ext cx="1250155" cy="344476"/>
+          </a:xfrm>
+          <a:prstGeom prst="straightConnector1">
+            <a:avLst/>
+          </a:prstGeom>
+          <a:ln>
+            <a:headEnd type="triangle" w="med" len="med"/>
+            <a:tailEnd type="none" w="med" len="med"/>
+          </a:ln>
+        </p:spPr>
+        <p:style>
+          <a:lnRef idx="1">
+            <a:schemeClr val="dk1"/>
+          </a:lnRef>
+          <a:fillRef idx="0">
+            <a:schemeClr val="dk1"/>
+          </a:fillRef>
+          <a:effectRef idx="0">
+            <a:schemeClr val="dk1"/>
+          </a:effectRef>
+          <a:fontRef idx="minor">
+            <a:schemeClr val="tx1"/>
+          </a:fontRef>
+        </p:style>
+      </p:cxnSp>
+    </p:spTree>
+    <p:extLst>
+      <p:ext uri="{BB962C8B-B14F-4D97-AF65-F5344CB8AC3E}">
+        <p14:creationId xmlns:p14="http://schemas.microsoft.com/office/powerpoint/2010/main" val="3242959706"/>
+      </p:ext>
+    </p:extLst>
+  </p:cSld>
+  <p:clrMapOvr>
+    <a:masterClrMapping/>
+  </p:clrMapOvr>
+</p:sld>
+</file>
+
+<file path=ppt/slides/slide2.xml><?xml version="1.0" encoding="utf-8"?>
+<p:sld xmlns:a="http://schemas.openxmlformats.org/drawingml/2006/main" xmlns:r="http://schemas.openxmlformats.org/officeDocument/2006/relationships" xmlns:p="http://schemas.openxmlformats.org/presentationml/2006/main">
+  <p:cSld>
+    <p:spTree>
+      <p:nvGrpSpPr>
+        <p:cNvPr id="1" name=""/>
+        <p:cNvGrpSpPr/>
+        <p:nvPr/>
+      </p:nvGrpSpPr>
+      <p:grpSpPr>
+        <a:xfrm>
+          <a:off x="0" y="0"/>
+          <a:ext cx="0" cy="0"/>
+          <a:chOff x="0" y="0"/>
+          <a:chExt cx="0" cy="0"/>
+        </a:xfrm>
+      </p:grpSpPr>
+      <p:sp>
+        <p:nvSpPr>
+          <p:cNvPr id="26" name="Rectangle 25">
+            <a:extLst>
+              <a:ext uri="{FF2B5EF4-FFF2-40B4-BE49-F238E27FC236}">
+                <a16:creationId xmlns:a16="http://schemas.microsoft.com/office/drawing/2014/main" id="{659BE901-B66A-471D-A3A8-7BC43DEB9815}"/>
+              </a:ext>
+            </a:extLst>
+          </p:cNvPr>
+          <p:cNvSpPr/>
+          <p:nvPr/>
+        </p:nvSpPr>
+        <p:spPr>
+          <a:xfrm>
+            <a:off x="419101" y="2145681"/>
+            <a:ext cx="5533123" cy="1390000"/>
+          </a:xfrm>
+          <a:prstGeom prst="rect">
+            <a:avLst/>
+          </a:prstGeom>
+        </p:spPr>
+        <p:style>
+          <a:lnRef idx="2">
+            <a:schemeClr val="dk1"/>
+          </a:lnRef>
+          <a:fillRef idx="1">
+            <a:schemeClr val="lt1"/>
+          </a:fillRef>
+          <a:effectRef idx="0">
+            <a:schemeClr val="dk1"/>
+          </a:effectRef>
+          <a:fontRef idx="minor">
+            <a:schemeClr val="dk1"/>
+          </a:fontRef>
+        </p:style>
+        <p:txBody>
+          <a:bodyPr rtlCol="0" anchor="ctr"/>
+          <a:lstStyle/>
+          <a:p>
+            <a:pPr algn="ctr"/>
+            <a:endParaRPr lang="LID4096" dirty="0"/>
+          </a:p>
+        </p:txBody>
+      </p:sp>
       <p:pic>
         <p:nvPicPr>
-          <p:cNvPr id="9" name="Picture 4" descr="Statuspage | Atlassian">
-            <a:extLst>
-              <a:ext uri="{FF2B5EF4-FFF2-40B4-BE49-F238E27FC236}">
-                <a16:creationId xmlns:a16="http://schemas.microsoft.com/office/drawing/2014/main" id="{ED0E2EE6-F25D-4B8F-83AA-A9112BCEE768}"/>
+          <p:cNvPr id="8" name="Picture 2" descr="StatsD Logo | Logos, Tech logos, Gaming logos">
+            <a:extLst>
+              <a:ext uri="{FF2B5EF4-FFF2-40B4-BE49-F238E27FC236}">
+                <a16:creationId xmlns:a16="http://schemas.microsoft.com/office/drawing/2014/main" id="{A831F2BA-C1BF-45DD-A426-92DBB667254B}"/>
               </a:ext>
             </a:extLst>
           </p:cNvPr>
@@ -3538,23 +3765,21 @@
           </p:cNvPicPr>
           <p:nvPr/>
         </p:nvPicPr>
-        <p:blipFill>
-          <a:blip r:embed="rId3">
+        <p:blipFill rotWithShape="1">
+          <a:blip r:embed="rId2">
             <a:extLst>
               <a:ext uri="{28A0092B-C50C-407E-A947-70E740481C1C}">
                 <a14:useLocalDpi xmlns:a14="http://schemas.microsoft.com/office/drawing/2010/main" val="0"/>
               </a:ext>
             </a:extLst>
           </a:blip>
-          <a:srcRect/>
-          <a:stretch>
-            <a:fillRect/>
-          </a:stretch>
+          <a:srcRect l="9765" t="27530" r="10000" b="26543"/>
+          <a:stretch/>
         </p:blipFill>
         <p:spPr bwMode="auto">
           <a:xfrm>
-            <a:off x="4704082" y="2505338"/>
-            <a:ext cx="3312160" cy="480342"/>
+            <a:off x="1510352" y="1451343"/>
+            <a:ext cx="1350634" cy="491140"/>
           </a:xfrm>
           <a:prstGeom prst="rect">
             <a:avLst/>
@@ -3573,10 +3798,10 @@
       </p:pic>
       <p:pic>
         <p:nvPicPr>
-          <p:cNvPr id="10" name="Picture 8">
-            <a:extLst>
-              <a:ext uri="{FF2B5EF4-FFF2-40B4-BE49-F238E27FC236}">
-                <a16:creationId xmlns:a16="http://schemas.microsoft.com/office/drawing/2014/main" id="{CEDA630D-175A-4E24-AD69-628B82FF0939}"/>
+          <p:cNvPr id="9" name="Picture 4" descr="Statuspage | Atlassian">
+            <a:extLst>
+              <a:ext uri="{FF2B5EF4-FFF2-40B4-BE49-F238E27FC236}">
+                <a16:creationId xmlns:a16="http://schemas.microsoft.com/office/drawing/2014/main" id="{ED0E2EE6-F25D-4B8F-83AA-A9112BCEE768}"/>
               </a:ext>
             </a:extLst>
           </p:cNvPr>
@@ -3585,21 +3810,23 @@
           </p:cNvPicPr>
           <p:nvPr/>
         </p:nvPicPr>
-        <p:blipFill rotWithShape="1">
-          <a:blip r:embed="rId4">
+        <p:blipFill>
+          <a:blip r:embed="rId3">
             <a:extLst>
               <a:ext uri="{28A0092B-C50C-407E-A947-70E740481C1C}">
                 <a14:useLocalDpi xmlns:a14="http://schemas.microsoft.com/office/drawing/2010/main" val="0"/>
               </a:ext>
             </a:extLst>
           </a:blip>
-          <a:srcRect l="1807" t="16125" r="4250" b="14397"/>
-          <a:stretch/>
+          <a:srcRect/>
+          <a:stretch>
+            <a:fillRect/>
+          </a:stretch>
         </p:blipFill>
         <p:spPr bwMode="auto">
           <a:xfrm>
-            <a:off x="7579364" y="3339673"/>
-            <a:ext cx="2438398" cy="803904"/>
+            <a:off x="3275569" y="1340040"/>
+            <a:ext cx="1937542" cy="280990"/>
           </a:xfrm>
           <a:prstGeom prst="rect">
             <a:avLst/>
@@ -3618,10 +3845,286 @@
       </p:pic>
       <p:pic>
         <p:nvPicPr>
-          <p:cNvPr id="1034" name="Picture 10" descr="Azure Monitor (@AzureMonitor) | Twitter">
-            <a:extLst>
-              <a:ext uri="{FF2B5EF4-FFF2-40B4-BE49-F238E27FC236}">
-                <a16:creationId xmlns:a16="http://schemas.microsoft.com/office/drawing/2014/main" id="{BE549738-E6C4-4685-9964-8DC70C16E0A9}"/>
+          <p:cNvPr id="10" name="Picture 8">
+            <a:extLst>
+              <a:ext uri="{FF2B5EF4-FFF2-40B4-BE49-F238E27FC236}">
+                <a16:creationId xmlns:a16="http://schemas.microsoft.com/office/drawing/2014/main" id="{CEDA630D-175A-4E24-AD69-628B82FF0939}"/>
+              </a:ext>
+            </a:extLst>
+          </p:cNvPr>
+          <p:cNvPicPr>
+            <a:picLocks noChangeAspect="1" noChangeArrowheads="1"/>
+          </p:cNvPicPr>
+          <p:nvPr/>
+        </p:nvPicPr>
+        <p:blipFill rotWithShape="1">
+          <a:blip r:embed="rId4">
+            <a:extLst>
+              <a:ext uri="{28A0092B-C50C-407E-A947-70E740481C1C}">
+                <a14:useLocalDpi xmlns:a14="http://schemas.microsoft.com/office/drawing/2010/main" val="0"/>
+              </a:ext>
+            </a:extLst>
+          </a:blip>
+          <a:srcRect l="1807" t="16125" r="4250" b="14397"/>
+          <a:stretch/>
+        </p:blipFill>
+        <p:spPr bwMode="auto">
+          <a:xfrm>
+            <a:off x="5657503" y="1451343"/>
+            <a:ext cx="1426410" cy="470266"/>
+          </a:xfrm>
+          <a:prstGeom prst="rect">
+            <a:avLst/>
+          </a:prstGeom>
+          <a:noFill/>
+          <a:extLst>
+            <a:ext uri="{909E8E84-426E-40DD-AFC4-6F175D3DCCD1}">
+              <a14:hiddenFill xmlns:a14="http://schemas.microsoft.com/office/drawing/2010/main">
+                <a:solidFill>
+                  <a:srgbClr val="FFFFFF"/>
+                </a:solidFill>
+              </a14:hiddenFill>
+            </a:ext>
+          </a:extLst>
+        </p:spPr>
+      </p:pic>
+      <p:sp>
+        <p:nvSpPr>
+          <p:cNvPr id="2" name="Rectangle 1">
+            <a:extLst>
+              <a:ext uri="{FF2B5EF4-FFF2-40B4-BE49-F238E27FC236}">
+                <a16:creationId xmlns:a16="http://schemas.microsoft.com/office/drawing/2014/main" id="{DF1B8298-A232-4723-91AC-B3F08648AB3F}"/>
+              </a:ext>
+            </a:extLst>
+          </p:cNvPr>
+          <p:cNvSpPr/>
+          <p:nvPr/>
+        </p:nvSpPr>
+        <p:spPr>
+          <a:xfrm>
+            <a:off x="2999740" y="2350882"/>
+            <a:ext cx="2476498" cy="971438"/>
+          </a:xfrm>
+          <a:prstGeom prst="rect">
+            <a:avLst/>
+          </a:prstGeom>
+          <a:solidFill>
+            <a:schemeClr val="accent6">
+              <a:lumMod val="20000"/>
+              <a:lumOff val="80000"/>
+            </a:schemeClr>
+          </a:solidFill>
+        </p:spPr>
+        <p:style>
+          <a:lnRef idx="2">
+            <a:schemeClr val="dk1"/>
+          </a:lnRef>
+          <a:fillRef idx="1">
+            <a:schemeClr val="lt1"/>
+          </a:fillRef>
+          <a:effectRef idx="0">
+            <a:schemeClr val="dk1"/>
+          </a:effectRef>
+          <a:fontRef idx="minor">
+            <a:schemeClr val="dk1"/>
+          </a:fontRef>
+        </p:style>
+        <p:txBody>
+          <a:bodyPr rtlCol="0" anchor="ctr"/>
+          <a:lstStyle/>
+          <a:p>
+            <a:pPr algn="ctr"/>
+            <a:r>
+              <a:rPr lang="en-US" b="1" dirty="0"/>
+              <a:t>Scraper</a:t>
+            </a:r>
+            <a:br>
+              <a:rPr lang="en-US" dirty="0"/>
+            </a:br>
+            <a:r>
+              <a:rPr lang="en-US" dirty="0"/>
+              <a:t>Agent</a:t>
+            </a:r>
+            <a:endParaRPr lang="LID4096" dirty="0"/>
+          </a:p>
+        </p:txBody>
+      </p:sp>
+      <p:cxnSp>
+        <p:nvCxnSpPr>
+          <p:cNvPr id="4" name="Straight Arrow Connector 3">
+            <a:extLst>
+              <a:ext uri="{FF2B5EF4-FFF2-40B4-BE49-F238E27FC236}">
+                <a16:creationId xmlns:a16="http://schemas.microsoft.com/office/drawing/2014/main" id="{080ACE8A-92F3-47BE-A907-9AB06186A982}"/>
+              </a:ext>
+            </a:extLst>
+          </p:cNvPr>
+          <p:cNvCxnSpPr>
+            <a:cxnSpLocks/>
+          </p:cNvCxnSpPr>
+          <p:nvPr/>
+        </p:nvCxnSpPr>
+        <p:spPr>
+          <a:xfrm flipH="1" flipV="1">
+            <a:off x="2918460" y="1921609"/>
+            <a:ext cx="1104425" cy="343704"/>
+          </a:xfrm>
+          <a:prstGeom prst="straightConnector1">
+            <a:avLst/>
+          </a:prstGeom>
+          <a:ln>
+            <a:tailEnd type="triangle"/>
+          </a:ln>
+        </p:spPr>
+        <p:style>
+          <a:lnRef idx="1">
+            <a:schemeClr val="dk1"/>
+          </a:lnRef>
+          <a:fillRef idx="0">
+            <a:schemeClr val="dk1"/>
+          </a:fillRef>
+          <a:effectRef idx="0">
+            <a:schemeClr val="dk1"/>
+          </a:effectRef>
+          <a:fontRef idx="minor">
+            <a:schemeClr val="tx1"/>
+          </a:fontRef>
+        </p:style>
+      </p:cxnSp>
+      <p:cxnSp>
+        <p:nvCxnSpPr>
+          <p:cNvPr id="11" name="Straight Arrow Connector 10">
+            <a:extLst>
+              <a:ext uri="{FF2B5EF4-FFF2-40B4-BE49-F238E27FC236}">
+                <a16:creationId xmlns:a16="http://schemas.microsoft.com/office/drawing/2014/main" id="{3DDD3110-2C22-4100-A249-9147599B7B36}"/>
+              </a:ext>
+            </a:extLst>
+          </p:cNvPr>
+          <p:cNvCxnSpPr>
+            <a:cxnSpLocks/>
+            <a:endCxn id="9" idx="2"/>
+          </p:cNvCxnSpPr>
+          <p:nvPr/>
+        </p:nvCxnSpPr>
+        <p:spPr>
+          <a:xfrm flipV="1">
+            <a:off x="4244340" y="1621030"/>
+            <a:ext cx="0" cy="644283"/>
+          </a:xfrm>
+          <a:prstGeom prst="straightConnector1">
+            <a:avLst/>
+          </a:prstGeom>
+          <a:ln>
+            <a:tailEnd type="triangle"/>
+          </a:ln>
+        </p:spPr>
+        <p:style>
+          <a:lnRef idx="1">
+            <a:schemeClr val="dk1"/>
+          </a:lnRef>
+          <a:fillRef idx="0">
+            <a:schemeClr val="dk1"/>
+          </a:fillRef>
+          <a:effectRef idx="0">
+            <a:schemeClr val="dk1"/>
+          </a:effectRef>
+          <a:fontRef idx="minor">
+            <a:schemeClr val="tx1"/>
+          </a:fontRef>
+        </p:style>
+      </p:cxnSp>
+      <p:cxnSp>
+        <p:nvCxnSpPr>
+          <p:cNvPr id="14" name="Straight Arrow Connector 13">
+            <a:extLst>
+              <a:ext uri="{FF2B5EF4-FFF2-40B4-BE49-F238E27FC236}">
+                <a16:creationId xmlns:a16="http://schemas.microsoft.com/office/drawing/2014/main" id="{EF0E679F-CEE6-4FC8-BEA2-8FFF5767B9F6}"/>
+              </a:ext>
+            </a:extLst>
+          </p:cNvPr>
+          <p:cNvCxnSpPr>
+            <a:cxnSpLocks/>
+          </p:cNvCxnSpPr>
+          <p:nvPr/>
+        </p:nvCxnSpPr>
+        <p:spPr>
+          <a:xfrm flipH="1">
+            <a:off x="4411029" y="1920837"/>
+            <a:ext cx="1250155" cy="344476"/>
+          </a:xfrm>
+          <a:prstGeom prst="straightConnector1">
+            <a:avLst/>
+          </a:prstGeom>
+          <a:ln>
+            <a:prstDash val="dash"/>
+            <a:headEnd type="none" w="med" len="med"/>
+            <a:tailEnd type="triangle" w="med" len="med"/>
+          </a:ln>
+        </p:spPr>
+        <p:style>
+          <a:lnRef idx="1">
+            <a:schemeClr val="dk1"/>
+          </a:lnRef>
+          <a:fillRef idx="0">
+            <a:schemeClr val="dk1"/>
+          </a:fillRef>
+          <a:effectRef idx="0">
+            <a:schemeClr val="dk1"/>
+          </a:effectRef>
+          <a:fontRef idx="minor">
+            <a:schemeClr val="tx1"/>
+          </a:fontRef>
+        </p:style>
+      </p:cxnSp>
+      <p:cxnSp>
+        <p:nvCxnSpPr>
+          <p:cNvPr id="15" name="Straight Arrow Connector 14">
+            <a:extLst>
+              <a:ext uri="{FF2B5EF4-FFF2-40B4-BE49-F238E27FC236}">
+                <a16:creationId xmlns:a16="http://schemas.microsoft.com/office/drawing/2014/main" id="{72E81A24-E430-47FF-BD31-773153BB2680}"/>
+              </a:ext>
+            </a:extLst>
+          </p:cNvPr>
+          <p:cNvCxnSpPr>
+            <a:cxnSpLocks/>
+            <a:stCxn id="2" idx="2"/>
+            <a:endCxn id="13" idx="0"/>
+          </p:cNvCxnSpPr>
+          <p:nvPr/>
+        </p:nvCxnSpPr>
+        <p:spPr>
+          <a:xfrm>
+            <a:off x="4237989" y="3322320"/>
+            <a:ext cx="7006" cy="904281"/>
+          </a:xfrm>
+          <a:prstGeom prst="straightConnector1">
+            <a:avLst/>
+          </a:prstGeom>
+          <a:ln>
+            <a:prstDash val="sysDash"/>
+            <a:tailEnd type="triangle"/>
+          </a:ln>
+        </p:spPr>
+        <p:style>
+          <a:lnRef idx="1">
+            <a:schemeClr val="dk1"/>
+          </a:lnRef>
+          <a:fillRef idx="0">
+            <a:schemeClr val="dk1"/>
+          </a:fillRef>
+          <a:effectRef idx="0">
+            <a:schemeClr val="dk1"/>
+          </a:effectRef>
+          <a:fontRef idx="minor">
+            <a:schemeClr val="tx1"/>
+          </a:fontRef>
+        </p:style>
+      </p:cxnSp>
+      <p:pic>
+        <p:nvPicPr>
+          <p:cNvPr id="29" name="Picture 2" descr="Promitor - Bringing Azure Monitor metrics where you need them ...">
+            <a:extLst>
+              <a:ext uri="{FF2B5EF4-FFF2-40B4-BE49-F238E27FC236}">
+                <a16:creationId xmlns:a16="http://schemas.microsoft.com/office/drawing/2014/main" id="{CD4A43BB-6989-448C-B653-C938D6228EE1}"/>
               </a:ext>
             </a:extLst>
           </p:cNvPr>
@@ -3645,7 +4148,2781 @@
         </p:blipFill>
         <p:spPr bwMode="auto">
           <a:xfrm>
-            <a:off x="1211995" y="5120440"/>
+            <a:off x="776295" y="2536519"/>
+            <a:ext cx="1788160" cy="600164"/>
+          </a:xfrm>
+          <a:prstGeom prst="rect">
+            <a:avLst/>
+          </a:prstGeom>
+          <a:noFill/>
+          <a:extLst>
+            <a:ext uri="{909E8E84-426E-40DD-AFC4-6F175D3DCCD1}">
+              <a14:hiddenFill xmlns:a14="http://schemas.microsoft.com/office/drawing/2010/main">
+                <a:solidFill>
+                  <a:srgbClr val="FFFFFF"/>
+                </a:solidFill>
+              </a14:hiddenFill>
+            </a:ext>
+          </a:extLst>
+        </p:spPr>
+      </p:pic>
+      <p:grpSp>
+        <p:nvGrpSpPr>
+          <p:cNvPr id="39" name="Group 38">
+            <a:extLst>
+              <a:ext uri="{FF2B5EF4-FFF2-40B4-BE49-F238E27FC236}">
+                <a16:creationId xmlns:a16="http://schemas.microsoft.com/office/drawing/2014/main" id="{EE60B4A5-A490-4AB0-8A98-B7B39CBCEBBF}"/>
+              </a:ext>
+            </a:extLst>
+          </p:cNvPr>
+          <p:cNvGrpSpPr/>
+          <p:nvPr/>
+        </p:nvGrpSpPr>
+        <p:grpSpPr>
+          <a:xfrm>
+            <a:off x="3622310" y="4226601"/>
+            <a:ext cx="1244059" cy="837394"/>
+            <a:chOff x="3622310" y="3854675"/>
+            <a:chExt cx="1244059" cy="837394"/>
+          </a:xfrm>
+        </p:grpSpPr>
+        <p:pic>
+          <p:nvPicPr>
+            <p:cNvPr id="13" name="Picture 10" descr="Azure Monitor (@AzureMonitor) | Twitter">
+              <a:extLst>
+                <a:ext uri="{FF2B5EF4-FFF2-40B4-BE49-F238E27FC236}">
+                  <a16:creationId xmlns:a16="http://schemas.microsoft.com/office/drawing/2014/main" id="{E972978B-6F70-4615-83B3-E213DFB45B23}"/>
+                </a:ext>
+              </a:extLst>
+            </p:cNvPr>
+            <p:cNvPicPr>
+              <a:picLocks noChangeAspect="1" noChangeArrowheads="1"/>
+            </p:cNvPicPr>
+            <p:nvPr/>
+          </p:nvPicPr>
+          <p:blipFill>
+            <a:blip r:embed="rId6">
+              <a:extLst>
+                <a:ext uri="{28A0092B-C50C-407E-A947-70E740481C1C}">
+                  <a14:useLocalDpi xmlns:a14="http://schemas.microsoft.com/office/drawing/2010/main" val="0"/>
+                </a:ext>
+              </a:extLst>
+            </a:blip>
+            <a:srcRect/>
+            <a:stretch>
+              <a:fillRect/>
+            </a:stretch>
+          </p:blipFill>
+          <p:spPr bwMode="auto">
+            <a:xfrm>
+              <a:off x="3999074" y="3854675"/>
+              <a:ext cx="491841" cy="491841"/>
+            </a:xfrm>
+            <a:prstGeom prst="rect">
+              <a:avLst/>
+            </a:prstGeom>
+            <a:noFill/>
+            <a:extLst>
+              <a:ext uri="{909E8E84-426E-40DD-AFC4-6F175D3DCCD1}">
+                <a14:hiddenFill xmlns:a14="http://schemas.microsoft.com/office/drawing/2010/main">
+                  <a:solidFill>
+                    <a:srgbClr val="FFFFFF"/>
+                  </a:solidFill>
+                </a14:hiddenFill>
+              </a:ext>
+            </a:extLst>
+          </p:spPr>
+        </p:pic>
+        <p:sp>
+          <p:nvSpPr>
+            <p:cNvPr id="36" name="TextBox 35">
+              <a:extLst>
+                <a:ext uri="{FF2B5EF4-FFF2-40B4-BE49-F238E27FC236}">
+                  <a16:creationId xmlns:a16="http://schemas.microsoft.com/office/drawing/2014/main" id="{63AE4A1C-6C01-4017-9683-C6D86C604BAB}"/>
+                </a:ext>
+              </a:extLst>
+            </p:cNvPr>
+            <p:cNvSpPr txBox="1"/>
+            <p:nvPr/>
+          </p:nvSpPr>
+          <p:spPr>
+            <a:xfrm>
+              <a:off x="3622310" y="4384292"/>
+              <a:ext cx="1244059" cy="307777"/>
+            </a:xfrm>
+            <a:prstGeom prst="rect">
+              <a:avLst/>
+            </a:prstGeom>
+            <a:noFill/>
+          </p:spPr>
+          <p:txBody>
+            <a:bodyPr wrap="none" rtlCol="0">
+              <a:spAutoFit/>
+            </a:bodyPr>
+            <a:lstStyle/>
+            <a:p>
+              <a:r>
+                <a:rPr lang="en-US" sz="1400" dirty="0"/>
+                <a:t>Azure Monitor</a:t>
+              </a:r>
+              <a:endParaRPr lang="LID4096" sz="1400" dirty="0"/>
+            </a:p>
+          </p:txBody>
+        </p:sp>
+      </p:grpSp>
+      <p:sp>
+        <p:nvSpPr>
+          <p:cNvPr id="40" name="TextBox 39">
+            <a:extLst>
+              <a:ext uri="{FF2B5EF4-FFF2-40B4-BE49-F238E27FC236}">
+                <a16:creationId xmlns:a16="http://schemas.microsoft.com/office/drawing/2014/main" id="{FFB670D0-AB2D-42A9-AFCA-3D9EB5EA1765}"/>
+              </a:ext>
+            </a:extLst>
+          </p:cNvPr>
+          <p:cNvSpPr txBox="1"/>
+          <p:nvPr/>
+        </p:nvSpPr>
+        <p:spPr>
+          <a:xfrm>
+            <a:off x="4319366" y="3665697"/>
+            <a:ext cx="1502334" cy="430887"/>
+          </a:xfrm>
+          <a:prstGeom prst="rect">
+            <a:avLst/>
+          </a:prstGeom>
+          <a:noFill/>
+        </p:spPr>
+        <p:txBody>
+          <a:bodyPr wrap="none" rtlCol="0">
+            <a:spAutoFit/>
+          </a:bodyPr>
+          <a:lstStyle/>
+          <a:p>
+            <a:r>
+              <a:rPr lang="en-US" sz="1100" i="1" dirty="0"/>
+              <a:t>Query declared metrics</a:t>
+            </a:r>
+          </a:p>
+          <a:p>
+            <a:r>
+              <a:rPr lang="en-US" sz="1100" i="1" dirty="0"/>
+              <a:t>for declared resources</a:t>
+            </a:r>
+            <a:endParaRPr lang="LID4096" sz="1100" i="1" dirty="0"/>
+          </a:p>
+        </p:txBody>
+      </p:sp>
+    </p:spTree>
+    <p:extLst>
+      <p:ext uri="{BB962C8B-B14F-4D97-AF65-F5344CB8AC3E}">
+        <p14:creationId xmlns:p14="http://schemas.microsoft.com/office/powerpoint/2010/main" val="1582677050"/>
+      </p:ext>
+    </p:extLst>
+  </p:cSld>
+  <p:clrMapOvr>
+    <a:masterClrMapping/>
+  </p:clrMapOvr>
+</p:sld>
+</file>
+
+<file path=ppt/slides/slide3.xml><?xml version="1.0" encoding="utf-8"?>
+<p:sld xmlns:a="http://schemas.openxmlformats.org/drawingml/2006/main" xmlns:r="http://schemas.openxmlformats.org/officeDocument/2006/relationships" xmlns:p="http://schemas.openxmlformats.org/presentationml/2006/main">
+  <p:cSld>
+    <p:spTree>
+      <p:nvGrpSpPr>
+        <p:cNvPr id="1" name=""/>
+        <p:cNvGrpSpPr/>
+        <p:nvPr/>
+      </p:nvGrpSpPr>
+      <p:grpSpPr>
+        <a:xfrm>
+          <a:off x="0" y="0"/>
+          <a:ext cx="0" cy="0"/>
+          <a:chOff x="0" y="0"/>
+          <a:chExt cx="0" cy="0"/>
+        </a:xfrm>
+      </p:grpSpPr>
+      <p:sp>
+        <p:nvSpPr>
+          <p:cNvPr id="26" name="Rectangle 25">
+            <a:extLst>
+              <a:ext uri="{FF2B5EF4-FFF2-40B4-BE49-F238E27FC236}">
+                <a16:creationId xmlns:a16="http://schemas.microsoft.com/office/drawing/2014/main" id="{659BE901-B66A-471D-A3A8-7BC43DEB9815}"/>
+              </a:ext>
+            </a:extLst>
+          </p:cNvPr>
+          <p:cNvSpPr/>
+          <p:nvPr/>
+        </p:nvSpPr>
+        <p:spPr>
+          <a:xfrm>
+            <a:off x="419101" y="2145681"/>
+            <a:ext cx="9608813" cy="1390000"/>
+          </a:xfrm>
+          <a:prstGeom prst="rect">
+            <a:avLst/>
+          </a:prstGeom>
+        </p:spPr>
+        <p:style>
+          <a:lnRef idx="2">
+            <a:schemeClr val="dk1"/>
+          </a:lnRef>
+          <a:fillRef idx="1">
+            <a:schemeClr val="lt1"/>
+          </a:fillRef>
+          <a:effectRef idx="0">
+            <a:schemeClr val="dk1"/>
+          </a:effectRef>
+          <a:fontRef idx="minor">
+            <a:schemeClr val="dk1"/>
+          </a:fontRef>
+        </p:style>
+        <p:txBody>
+          <a:bodyPr rtlCol="0" anchor="ctr"/>
+          <a:lstStyle/>
+          <a:p>
+            <a:pPr algn="ctr"/>
+            <a:endParaRPr lang="LID4096" dirty="0"/>
+          </a:p>
+        </p:txBody>
+      </p:sp>
+      <p:pic>
+        <p:nvPicPr>
+          <p:cNvPr id="8" name="Picture 2" descr="StatsD Logo | Logos, Tech logos, Gaming logos">
+            <a:extLst>
+              <a:ext uri="{FF2B5EF4-FFF2-40B4-BE49-F238E27FC236}">
+                <a16:creationId xmlns:a16="http://schemas.microsoft.com/office/drawing/2014/main" id="{A831F2BA-C1BF-45DD-A426-92DBB667254B}"/>
+              </a:ext>
+            </a:extLst>
+          </p:cNvPr>
+          <p:cNvPicPr>
+            <a:picLocks noChangeAspect="1" noChangeArrowheads="1"/>
+          </p:cNvPicPr>
+          <p:nvPr/>
+        </p:nvPicPr>
+        <p:blipFill rotWithShape="1">
+          <a:blip r:embed="rId2">
+            <a:extLst>
+              <a:ext uri="{28A0092B-C50C-407E-A947-70E740481C1C}">
+                <a14:useLocalDpi xmlns:a14="http://schemas.microsoft.com/office/drawing/2010/main" val="0"/>
+              </a:ext>
+            </a:extLst>
+          </a:blip>
+          <a:srcRect l="9765" t="27530" r="10000" b="26543"/>
+          <a:stretch/>
+        </p:blipFill>
+        <p:spPr bwMode="auto">
+          <a:xfrm>
+            <a:off x="1510352" y="1451343"/>
+            <a:ext cx="1350634" cy="491140"/>
+          </a:xfrm>
+          <a:prstGeom prst="rect">
+            <a:avLst/>
+          </a:prstGeom>
+          <a:noFill/>
+          <a:extLst>
+            <a:ext uri="{909E8E84-426E-40DD-AFC4-6F175D3DCCD1}">
+              <a14:hiddenFill xmlns:a14="http://schemas.microsoft.com/office/drawing/2010/main">
+                <a:solidFill>
+                  <a:srgbClr val="FFFFFF"/>
+                </a:solidFill>
+              </a14:hiddenFill>
+            </a:ext>
+          </a:extLst>
+        </p:spPr>
+      </p:pic>
+      <p:pic>
+        <p:nvPicPr>
+          <p:cNvPr id="9" name="Picture 4" descr="Statuspage | Atlassian">
+            <a:extLst>
+              <a:ext uri="{FF2B5EF4-FFF2-40B4-BE49-F238E27FC236}">
+                <a16:creationId xmlns:a16="http://schemas.microsoft.com/office/drawing/2014/main" id="{ED0E2EE6-F25D-4B8F-83AA-A9112BCEE768}"/>
+              </a:ext>
+            </a:extLst>
+          </p:cNvPr>
+          <p:cNvPicPr>
+            <a:picLocks noChangeAspect="1" noChangeArrowheads="1"/>
+          </p:cNvPicPr>
+          <p:nvPr/>
+        </p:nvPicPr>
+        <p:blipFill>
+          <a:blip r:embed="rId3">
+            <a:extLst>
+              <a:ext uri="{28A0092B-C50C-407E-A947-70E740481C1C}">
+                <a14:useLocalDpi xmlns:a14="http://schemas.microsoft.com/office/drawing/2010/main" val="0"/>
+              </a:ext>
+            </a:extLst>
+          </a:blip>
+          <a:srcRect/>
+          <a:stretch>
+            <a:fillRect/>
+          </a:stretch>
+        </p:blipFill>
+        <p:spPr bwMode="auto">
+          <a:xfrm>
+            <a:off x="3275569" y="1340040"/>
+            <a:ext cx="1937542" cy="280990"/>
+          </a:xfrm>
+          <a:prstGeom prst="rect">
+            <a:avLst/>
+          </a:prstGeom>
+          <a:noFill/>
+          <a:extLst>
+            <a:ext uri="{909E8E84-426E-40DD-AFC4-6F175D3DCCD1}">
+              <a14:hiddenFill xmlns:a14="http://schemas.microsoft.com/office/drawing/2010/main">
+                <a:solidFill>
+                  <a:srgbClr val="FFFFFF"/>
+                </a:solidFill>
+              </a14:hiddenFill>
+            </a:ext>
+          </a:extLst>
+        </p:spPr>
+      </p:pic>
+      <p:pic>
+        <p:nvPicPr>
+          <p:cNvPr id="10" name="Picture 8">
+            <a:extLst>
+              <a:ext uri="{FF2B5EF4-FFF2-40B4-BE49-F238E27FC236}">
+                <a16:creationId xmlns:a16="http://schemas.microsoft.com/office/drawing/2014/main" id="{CEDA630D-175A-4E24-AD69-628B82FF0939}"/>
+              </a:ext>
+            </a:extLst>
+          </p:cNvPr>
+          <p:cNvPicPr>
+            <a:picLocks noChangeAspect="1" noChangeArrowheads="1"/>
+          </p:cNvPicPr>
+          <p:nvPr/>
+        </p:nvPicPr>
+        <p:blipFill rotWithShape="1">
+          <a:blip r:embed="rId4">
+            <a:extLst>
+              <a:ext uri="{28A0092B-C50C-407E-A947-70E740481C1C}">
+                <a14:useLocalDpi xmlns:a14="http://schemas.microsoft.com/office/drawing/2010/main" val="0"/>
+              </a:ext>
+            </a:extLst>
+          </a:blip>
+          <a:srcRect l="1807" t="16125" r="4250" b="14397"/>
+          <a:stretch/>
+        </p:blipFill>
+        <p:spPr bwMode="auto">
+          <a:xfrm>
+            <a:off x="5657503" y="1451343"/>
+            <a:ext cx="1426410" cy="470266"/>
+          </a:xfrm>
+          <a:prstGeom prst="rect">
+            <a:avLst/>
+          </a:prstGeom>
+          <a:noFill/>
+          <a:extLst>
+            <a:ext uri="{909E8E84-426E-40DD-AFC4-6F175D3DCCD1}">
+              <a14:hiddenFill xmlns:a14="http://schemas.microsoft.com/office/drawing/2010/main">
+                <a:solidFill>
+                  <a:srgbClr val="FFFFFF"/>
+                </a:solidFill>
+              </a14:hiddenFill>
+            </a:ext>
+          </a:extLst>
+        </p:spPr>
+      </p:pic>
+      <p:sp>
+        <p:nvSpPr>
+          <p:cNvPr id="2" name="Rectangle 1">
+            <a:extLst>
+              <a:ext uri="{FF2B5EF4-FFF2-40B4-BE49-F238E27FC236}">
+                <a16:creationId xmlns:a16="http://schemas.microsoft.com/office/drawing/2014/main" id="{DF1B8298-A232-4723-91AC-B3F08648AB3F}"/>
+              </a:ext>
+            </a:extLst>
+          </p:cNvPr>
+          <p:cNvSpPr/>
+          <p:nvPr/>
+        </p:nvSpPr>
+        <p:spPr>
+          <a:xfrm>
+            <a:off x="2999740" y="2350882"/>
+            <a:ext cx="2476498" cy="971438"/>
+          </a:xfrm>
+          <a:prstGeom prst="rect">
+            <a:avLst/>
+          </a:prstGeom>
+          <a:solidFill>
+            <a:schemeClr val="accent6">
+              <a:lumMod val="20000"/>
+              <a:lumOff val="80000"/>
+            </a:schemeClr>
+          </a:solidFill>
+        </p:spPr>
+        <p:style>
+          <a:lnRef idx="2">
+            <a:schemeClr val="dk1"/>
+          </a:lnRef>
+          <a:fillRef idx="1">
+            <a:schemeClr val="lt1"/>
+          </a:fillRef>
+          <a:effectRef idx="0">
+            <a:schemeClr val="dk1"/>
+          </a:effectRef>
+          <a:fontRef idx="minor">
+            <a:schemeClr val="dk1"/>
+          </a:fontRef>
+        </p:style>
+        <p:txBody>
+          <a:bodyPr rtlCol="0" anchor="ctr"/>
+          <a:lstStyle/>
+          <a:p>
+            <a:pPr algn="ctr"/>
+            <a:r>
+              <a:rPr lang="en-US" b="1" dirty="0"/>
+              <a:t>Scraper</a:t>
+            </a:r>
+            <a:br>
+              <a:rPr lang="en-US" dirty="0"/>
+            </a:br>
+            <a:r>
+              <a:rPr lang="en-US" dirty="0"/>
+              <a:t>Agent</a:t>
+            </a:r>
+            <a:endParaRPr lang="LID4096" dirty="0"/>
+          </a:p>
+        </p:txBody>
+      </p:sp>
+      <p:cxnSp>
+        <p:nvCxnSpPr>
+          <p:cNvPr id="4" name="Straight Arrow Connector 3">
+            <a:extLst>
+              <a:ext uri="{FF2B5EF4-FFF2-40B4-BE49-F238E27FC236}">
+                <a16:creationId xmlns:a16="http://schemas.microsoft.com/office/drawing/2014/main" id="{080ACE8A-92F3-47BE-A907-9AB06186A982}"/>
+              </a:ext>
+            </a:extLst>
+          </p:cNvPr>
+          <p:cNvCxnSpPr>
+            <a:cxnSpLocks/>
+          </p:cNvCxnSpPr>
+          <p:nvPr/>
+        </p:nvCxnSpPr>
+        <p:spPr>
+          <a:xfrm flipH="1" flipV="1">
+            <a:off x="2918460" y="1921609"/>
+            <a:ext cx="1104425" cy="343704"/>
+          </a:xfrm>
+          <a:prstGeom prst="straightConnector1">
+            <a:avLst/>
+          </a:prstGeom>
+          <a:ln>
+            <a:tailEnd type="triangle"/>
+          </a:ln>
+        </p:spPr>
+        <p:style>
+          <a:lnRef idx="1">
+            <a:schemeClr val="dk1"/>
+          </a:lnRef>
+          <a:fillRef idx="0">
+            <a:schemeClr val="dk1"/>
+          </a:fillRef>
+          <a:effectRef idx="0">
+            <a:schemeClr val="dk1"/>
+          </a:effectRef>
+          <a:fontRef idx="minor">
+            <a:schemeClr val="tx1"/>
+          </a:fontRef>
+        </p:style>
+      </p:cxnSp>
+      <p:cxnSp>
+        <p:nvCxnSpPr>
+          <p:cNvPr id="11" name="Straight Arrow Connector 10">
+            <a:extLst>
+              <a:ext uri="{FF2B5EF4-FFF2-40B4-BE49-F238E27FC236}">
+                <a16:creationId xmlns:a16="http://schemas.microsoft.com/office/drawing/2014/main" id="{3DDD3110-2C22-4100-A249-9147599B7B36}"/>
+              </a:ext>
+            </a:extLst>
+          </p:cNvPr>
+          <p:cNvCxnSpPr>
+            <a:cxnSpLocks/>
+            <a:endCxn id="9" idx="2"/>
+          </p:cNvCxnSpPr>
+          <p:nvPr/>
+        </p:nvCxnSpPr>
+        <p:spPr>
+          <a:xfrm flipV="1">
+            <a:off x="4244340" y="1621030"/>
+            <a:ext cx="0" cy="644283"/>
+          </a:xfrm>
+          <a:prstGeom prst="straightConnector1">
+            <a:avLst/>
+          </a:prstGeom>
+          <a:ln>
+            <a:tailEnd type="triangle"/>
+          </a:ln>
+        </p:spPr>
+        <p:style>
+          <a:lnRef idx="1">
+            <a:schemeClr val="dk1"/>
+          </a:lnRef>
+          <a:fillRef idx="0">
+            <a:schemeClr val="dk1"/>
+          </a:fillRef>
+          <a:effectRef idx="0">
+            <a:schemeClr val="dk1"/>
+          </a:effectRef>
+          <a:fontRef idx="minor">
+            <a:schemeClr val="tx1"/>
+          </a:fontRef>
+        </p:style>
+      </p:cxnSp>
+      <p:cxnSp>
+        <p:nvCxnSpPr>
+          <p:cNvPr id="14" name="Straight Arrow Connector 13">
+            <a:extLst>
+              <a:ext uri="{FF2B5EF4-FFF2-40B4-BE49-F238E27FC236}">
+                <a16:creationId xmlns:a16="http://schemas.microsoft.com/office/drawing/2014/main" id="{EF0E679F-CEE6-4FC8-BEA2-8FFF5767B9F6}"/>
+              </a:ext>
+            </a:extLst>
+          </p:cNvPr>
+          <p:cNvCxnSpPr>
+            <a:cxnSpLocks/>
+          </p:cNvCxnSpPr>
+          <p:nvPr/>
+        </p:nvCxnSpPr>
+        <p:spPr>
+          <a:xfrm flipH="1">
+            <a:off x="4411029" y="1920837"/>
+            <a:ext cx="1250155" cy="344476"/>
+          </a:xfrm>
+          <a:prstGeom prst="straightConnector1">
+            <a:avLst/>
+          </a:prstGeom>
+          <a:ln>
+            <a:prstDash val="dash"/>
+            <a:headEnd type="none" w="med" len="med"/>
+            <a:tailEnd type="triangle" w="med" len="med"/>
+          </a:ln>
+        </p:spPr>
+        <p:style>
+          <a:lnRef idx="1">
+            <a:schemeClr val="dk1"/>
+          </a:lnRef>
+          <a:fillRef idx="0">
+            <a:schemeClr val="dk1"/>
+          </a:fillRef>
+          <a:effectRef idx="0">
+            <a:schemeClr val="dk1"/>
+          </a:effectRef>
+          <a:fontRef idx="minor">
+            <a:schemeClr val="tx1"/>
+          </a:fontRef>
+        </p:style>
+      </p:cxnSp>
+      <p:cxnSp>
+        <p:nvCxnSpPr>
+          <p:cNvPr id="15" name="Straight Arrow Connector 14">
+            <a:extLst>
+              <a:ext uri="{FF2B5EF4-FFF2-40B4-BE49-F238E27FC236}">
+                <a16:creationId xmlns:a16="http://schemas.microsoft.com/office/drawing/2014/main" id="{72E81A24-E430-47FF-BD31-773153BB2680}"/>
+              </a:ext>
+            </a:extLst>
+          </p:cNvPr>
+          <p:cNvCxnSpPr>
+            <a:cxnSpLocks/>
+            <a:stCxn id="2" idx="2"/>
+            <a:endCxn id="13" idx="0"/>
+          </p:cNvCxnSpPr>
+          <p:nvPr/>
+        </p:nvCxnSpPr>
+        <p:spPr>
+          <a:xfrm>
+            <a:off x="4237989" y="3322320"/>
+            <a:ext cx="7006" cy="904281"/>
+          </a:xfrm>
+          <a:prstGeom prst="straightConnector1">
+            <a:avLst/>
+          </a:prstGeom>
+          <a:ln>
+            <a:prstDash val="sysDash"/>
+            <a:tailEnd type="triangle"/>
+          </a:ln>
+        </p:spPr>
+        <p:style>
+          <a:lnRef idx="1">
+            <a:schemeClr val="dk1"/>
+          </a:lnRef>
+          <a:fillRef idx="0">
+            <a:schemeClr val="dk1"/>
+          </a:fillRef>
+          <a:effectRef idx="0">
+            <a:schemeClr val="dk1"/>
+          </a:effectRef>
+          <a:fontRef idx="minor">
+            <a:schemeClr val="tx1"/>
+          </a:fontRef>
+        </p:style>
+      </p:cxnSp>
+      <p:sp>
+        <p:nvSpPr>
+          <p:cNvPr id="17" name="Rectangle 16">
+            <a:extLst>
+              <a:ext uri="{FF2B5EF4-FFF2-40B4-BE49-F238E27FC236}">
+                <a16:creationId xmlns:a16="http://schemas.microsoft.com/office/drawing/2014/main" id="{A7536292-2517-4CBC-B5B2-F992F59E166F}"/>
+              </a:ext>
+            </a:extLst>
+          </p:cNvPr>
+          <p:cNvSpPr/>
+          <p:nvPr/>
+        </p:nvSpPr>
+        <p:spPr>
+          <a:xfrm>
+            <a:off x="7289987" y="2350882"/>
+            <a:ext cx="2476498" cy="971438"/>
+          </a:xfrm>
+          <a:prstGeom prst="rect">
+            <a:avLst/>
+          </a:prstGeom>
+          <a:solidFill>
+            <a:schemeClr val="accent6">
+              <a:lumMod val="20000"/>
+              <a:lumOff val="80000"/>
+            </a:schemeClr>
+          </a:solidFill>
+        </p:spPr>
+        <p:style>
+          <a:lnRef idx="2">
+            <a:schemeClr val="dk1"/>
+          </a:lnRef>
+          <a:fillRef idx="1">
+            <a:schemeClr val="lt1"/>
+          </a:fillRef>
+          <a:effectRef idx="0">
+            <a:schemeClr val="dk1"/>
+          </a:effectRef>
+          <a:fontRef idx="minor">
+            <a:schemeClr val="dk1"/>
+          </a:fontRef>
+        </p:style>
+        <p:txBody>
+          <a:bodyPr rtlCol="0" anchor="ctr"/>
+          <a:lstStyle/>
+          <a:p>
+            <a:pPr algn="ctr"/>
+            <a:r>
+              <a:rPr lang="en-US" b="1" dirty="0"/>
+              <a:t>Resource Discovery</a:t>
+            </a:r>
+            <a:br>
+              <a:rPr lang="en-US" dirty="0"/>
+            </a:br>
+            <a:r>
+              <a:rPr lang="en-US" dirty="0"/>
+              <a:t>Agent</a:t>
+            </a:r>
+            <a:endParaRPr lang="LID4096" dirty="0"/>
+          </a:p>
+        </p:txBody>
+      </p:sp>
+      <p:cxnSp>
+        <p:nvCxnSpPr>
+          <p:cNvPr id="20" name="Straight Arrow Connector 19">
+            <a:extLst>
+              <a:ext uri="{FF2B5EF4-FFF2-40B4-BE49-F238E27FC236}">
+                <a16:creationId xmlns:a16="http://schemas.microsoft.com/office/drawing/2014/main" id="{F73A3814-732F-4119-B56F-93EAB99E2266}"/>
+              </a:ext>
+            </a:extLst>
+          </p:cNvPr>
+          <p:cNvCxnSpPr>
+            <a:cxnSpLocks/>
+            <a:stCxn id="17" idx="2"/>
+            <a:endCxn id="19" idx="0"/>
+          </p:cNvCxnSpPr>
+          <p:nvPr/>
+        </p:nvCxnSpPr>
+        <p:spPr>
+          <a:xfrm>
+            <a:off x="8528236" y="3322320"/>
+            <a:ext cx="6351" cy="904281"/>
+          </a:xfrm>
+          <a:prstGeom prst="straightConnector1">
+            <a:avLst/>
+          </a:prstGeom>
+          <a:ln>
+            <a:prstDash val="sysDash"/>
+            <a:tailEnd type="triangle"/>
+          </a:ln>
+        </p:spPr>
+        <p:style>
+          <a:lnRef idx="1">
+            <a:schemeClr val="dk1"/>
+          </a:lnRef>
+          <a:fillRef idx="0">
+            <a:schemeClr val="dk1"/>
+          </a:fillRef>
+          <a:effectRef idx="0">
+            <a:schemeClr val="dk1"/>
+          </a:effectRef>
+          <a:fontRef idx="minor">
+            <a:schemeClr val="tx1"/>
+          </a:fontRef>
+        </p:style>
+      </p:cxnSp>
+      <p:cxnSp>
+        <p:nvCxnSpPr>
+          <p:cNvPr id="23" name="Straight Arrow Connector 22">
+            <a:extLst>
+              <a:ext uri="{FF2B5EF4-FFF2-40B4-BE49-F238E27FC236}">
+                <a16:creationId xmlns:a16="http://schemas.microsoft.com/office/drawing/2014/main" id="{90B36813-BA04-460B-8E82-BEDD95FA2500}"/>
+              </a:ext>
+            </a:extLst>
+          </p:cNvPr>
+          <p:cNvCxnSpPr>
+            <a:cxnSpLocks/>
+            <a:stCxn id="2" idx="3"/>
+            <a:endCxn id="17" idx="1"/>
+          </p:cNvCxnSpPr>
+          <p:nvPr/>
+        </p:nvCxnSpPr>
+        <p:spPr>
+          <a:xfrm>
+            <a:off x="5476238" y="2836601"/>
+            <a:ext cx="1813749" cy="0"/>
+          </a:xfrm>
+          <a:prstGeom prst="straightConnector1">
+            <a:avLst/>
+          </a:prstGeom>
+          <a:ln>
+            <a:prstDash val="sysDash"/>
+            <a:tailEnd type="triangle"/>
+          </a:ln>
+        </p:spPr>
+        <p:style>
+          <a:lnRef idx="1">
+            <a:schemeClr val="dk1"/>
+          </a:lnRef>
+          <a:fillRef idx="0">
+            <a:schemeClr val="dk1"/>
+          </a:fillRef>
+          <a:effectRef idx="0">
+            <a:schemeClr val="dk1"/>
+          </a:effectRef>
+          <a:fontRef idx="minor">
+            <a:schemeClr val="tx1"/>
+          </a:fontRef>
+        </p:style>
+      </p:cxnSp>
+      <p:pic>
+        <p:nvPicPr>
+          <p:cNvPr id="29" name="Picture 2" descr="Promitor - Bringing Azure Monitor metrics where you need them ...">
+            <a:extLst>
+              <a:ext uri="{FF2B5EF4-FFF2-40B4-BE49-F238E27FC236}">
+                <a16:creationId xmlns:a16="http://schemas.microsoft.com/office/drawing/2014/main" id="{CD4A43BB-6989-448C-B653-C938D6228EE1}"/>
+              </a:ext>
+            </a:extLst>
+          </p:cNvPr>
+          <p:cNvPicPr>
+            <a:picLocks noChangeAspect="1" noChangeArrowheads="1"/>
+          </p:cNvPicPr>
+          <p:nvPr/>
+        </p:nvPicPr>
+        <p:blipFill>
+          <a:blip r:embed="rId5">
+            <a:extLst>
+              <a:ext uri="{28A0092B-C50C-407E-A947-70E740481C1C}">
+                <a14:useLocalDpi xmlns:a14="http://schemas.microsoft.com/office/drawing/2010/main" val="0"/>
+              </a:ext>
+            </a:extLst>
+          </a:blip>
+          <a:srcRect/>
+          <a:stretch>
+            <a:fillRect/>
+          </a:stretch>
+        </p:blipFill>
+        <p:spPr bwMode="auto">
+          <a:xfrm>
+            <a:off x="776295" y="2536519"/>
+            <a:ext cx="1788160" cy="600164"/>
+          </a:xfrm>
+          <a:prstGeom prst="rect">
+            <a:avLst/>
+          </a:prstGeom>
+          <a:noFill/>
+          <a:extLst>
+            <a:ext uri="{909E8E84-426E-40DD-AFC4-6F175D3DCCD1}">
+              <a14:hiddenFill xmlns:a14="http://schemas.microsoft.com/office/drawing/2010/main">
+                <a:solidFill>
+                  <a:srgbClr val="FFFFFF"/>
+                </a:solidFill>
+              </a14:hiddenFill>
+            </a:ext>
+          </a:extLst>
+        </p:spPr>
+      </p:pic>
+      <p:grpSp>
+        <p:nvGrpSpPr>
+          <p:cNvPr id="39" name="Group 38">
+            <a:extLst>
+              <a:ext uri="{FF2B5EF4-FFF2-40B4-BE49-F238E27FC236}">
+                <a16:creationId xmlns:a16="http://schemas.microsoft.com/office/drawing/2014/main" id="{EE60B4A5-A490-4AB0-8A98-B7B39CBCEBBF}"/>
+              </a:ext>
+            </a:extLst>
+          </p:cNvPr>
+          <p:cNvGrpSpPr/>
+          <p:nvPr/>
+        </p:nvGrpSpPr>
+        <p:grpSpPr>
+          <a:xfrm>
+            <a:off x="3622310" y="4226601"/>
+            <a:ext cx="1244059" cy="837394"/>
+            <a:chOff x="3622310" y="3854675"/>
+            <a:chExt cx="1244059" cy="837394"/>
+          </a:xfrm>
+        </p:grpSpPr>
+        <p:pic>
+          <p:nvPicPr>
+            <p:cNvPr id="13" name="Picture 10" descr="Azure Monitor (@AzureMonitor) | Twitter">
+              <a:extLst>
+                <a:ext uri="{FF2B5EF4-FFF2-40B4-BE49-F238E27FC236}">
+                  <a16:creationId xmlns:a16="http://schemas.microsoft.com/office/drawing/2014/main" id="{E972978B-6F70-4615-83B3-E213DFB45B23}"/>
+                </a:ext>
+              </a:extLst>
+            </p:cNvPr>
+            <p:cNvPicPr>
+              <a:picLocks noChangeAspect="1" noChangeArrowheads="1"/>
+            </p:cNvPicPr>
+            <p:nvPr/>
+          </p:nvPicPr>
+          <p:blipFill>
+            <a:blip r:embed="rId6">
+              <a:extLst>
+                <a:ext uri="{28A0092B-C50C-407E-A947-70E740481C1C}">
+                  <a14:useLocalDpi xmlns:a14="http://schemas.microsoft.com/office/drawing/2010/main" val="0"/>
+                </a:ext>
+              </a:extLst>
+            </a:blip>
+            <a:srcRect/>
+            <a:stretch>
+              <a:fillRect/>
+            </a:stretch>
+          </p:blipFill>
+          <p:spPr bwMode="auto">
+            <a:xfrm>
+              <a:off x="3999074" y="3854675"/>
+              <a:ext cx="491841" cy="491841"/>
+            </a:xfrm>
+            <a:prstGeom prst="rect">
+              <a:avLst/>
+            </a:prstGeom>
+            <a:noFill/>
+            <a:extLst>
+              <a:ext uri="{909E8E84-426E-40DD-AFC4-6F175D3DCCD1}">
+                <a14:hiddenFill xmlns:a14="http://schemas.microsoft.com/office/drawing/2010/main">
+                  <a:solidFill>
+                    <a:srgbClr val="FFFFFF"/>
+                  </a:solidFill>
+                </a14:hiddenFill>
+              </a:ext>
+            </a:extLst>
+          </p:spPr>
+        </p:pic>
+        <p:sp>
+          <p:nvSpPr>
+            <p:cNvPr id="36" name="TextBox 35">
+              <a:extLst>
+                <a:ext uri="{FF2B5EF4-FFF2-40B4-BE49-F238E27FC236}">
+                  <a16:creationId xmlns:a16="http://schemas.microsoft.com/office/drawing/2014/main" id="{63AE4A1C-6C01-4017-9683-C6D86C604BAB}"/>
+                </a:ext>
+              </a:extLst>
+            </p:cNvPr>
+            <p:cNvSpPr txBox="1"/>
+            <p:nvPr/>
+          </p:nvSpPr>
+          <p:spPr>
+            <a:xfrm>
+              <a:off x="3622310" y="4384292"/>
+              <a:ext cx="1244059" cy="307777"/>
+            </a:xfrm>
+            <a:prstGeom prst="rect">
+              <a:avLst/>
+            </a:prstGeom>
+            <a:noFill/>
+          </p:spPr>
+          <p:txBody>
+            <a:bodyPr wrap="none" rtlCol="0">
+              <a:spAutoFit/>
+            </a:bodyPr>
+            <a:lstStyle/>
+            <a:p>
+              <a:r>
+                <a:rPr lang="en-US" sz="1400" dirty="0"/>
+                <a:t>Azure Monitor</a:t>
+              </a:r>
+              <a:endParaRPr lang="LID4096" sz="1400" dirty="0"/>
+            </a:p>
+          </p:txBody>
+        </p:sp>
+      </p:grpSp>
+      <p:grpSp>
+        <p:nvGrpSpPr>
+          <p:cNvPr id="38" name="Group 37">
+            <a:extLst>
+              <a:ext uri="{FF2B5EF4-FFF2-40B4-BE49-F238E27FC236}">
+                <a16:creationId xmlns:a16="http://schemas.microsoft.com/office/drawing/2014/main" id="{FCD9D0A0-A2CD-49C3-BB57-BBCCBF1A7132}"/>
+              </a:ext>
+            </a:extLst>
+          </p:cNvPr>
+          <p:cNvGrpSpPr/>
+          <p:nvPr/>
+        </p:nvGrpSpPr>
+        <p:grpSpPr>
+          <a:xfrm>
+            <a:off x="7634276" y="4226601"/>
+            <a:ext cx="1800621" cy="837392"/>
+            <a:chOff x="6982900" y="3854676"/>
+            <a:chExt cx="1800621" cy="837392"/>
+          </a:xfrm>
+        </p:grpSpPr>
+        <p:pic>
+          <p:nvPicPr>
+            <p:cNvPr id="19" name="Picture 4" descr="Starter query samples - Azure Resource Graph | Microsoft Docs">
+              <a:extLst>
+                <a:ext uri="{FF2B5EF4-FFF2-40B4-BE49-F238E27FC236}">
+                  <a16:creationId xmlns:a16="http://schemas.microsoft.com/office/drawing/2014/main" id="{A482E936-2932-401B-A3F4-9EBA47798CAB}"/>
+                </a:ext>
+              </a:extLst>
+            </p:cNvPr>
+            <p:cNvPicPr>
+              <a:picLocks noChangeAspect="1" noChangeArrowheads="1"/>
+            </p:cNvPicPr>
+            <p:nvPr/>
+          </p:nvPicPr>
+          <p:blipFill>
+            <a:blip r:embed="rId7">
+              <a:extLst>
+                <a:ext uri="{BEBA8EAE-BF5A-486C-A8C5-ECC9F3942E4B}">
+                  <a14:imgProps xmlns:a14="http://schemas.microsoft.com/office/drawing/2010/main">
+                    <a14:imgLayer r:embed="rId8">
+                      <a14:imgEffect>
+                        <a14:backgroundRemoval t="4000" b="95556" l="889" r="93778">
+                          <a14:foregroundMark x1="4889" y1="22222" x2="13333" y2="9333"/>
+                          <a14:foregroundMark x1="1333" y1="16889" x2="1333" y2="16889"/>
+                          <a14:foregroundMark x1="81778" y1="20000" x2="81778" y2="20000"/>
+                          <a14:foregroundMark x1="75111" y1="18667" x2="75111" y2="16444"/>
+                          <a14:foregroundMark x1="67111" y1="16000" x2="89778" y2="18222"/>
+                          <a14:foregroundMark x1="89778" y1="18222" x2="68000" y2="17333"/>
+                          <a14:foregroundMark x1="94222" y1="23111" x2="94222" y2="23111"/>
+                          <a14:foregroundMark x1="79556" y1="4444" x2="79556" y2="4444"/>
+                          <a14:foregroundMark x1="54667" y1="72444" x2="54667" y2="72444"/>
+                          <a14:foregroundMark x1="56889" y1="91556" x2="56889" y2="91556"/>
+                          <a14:foregroundMark x1="56444" y1="95556" x2="56444" y2="95556"/>
+                        </a14:backgroundRemoval>
+                      </a14:imgEffect>
+                    </a14:imgLayer>
+                  </a14:imgProps>
+                </a:ext>
+                <a:ext uri="{28A0092B-C50C-407E-A947-70E740481C1C}">
+                  <a14:useLocalDpi xmlns:a14="http://schemas.microsoft.com/office/drawing/2010/main" val="0"/>
+                </a:ext>
+              </a:extLst>
+            </a:blip>
+            <a:srcRect/>
+            <a:stretch>
+              <a:fillRect/>
+            </a:stretch>
+          </p:blipFill>
+          <p:spPr bwMode="auto">
+            <a:xfrm>
+              <a:off x="7637290" y="3854676"/>
+              <a:ext cx="491842" cy="491842"/>
+            </a:xfrm>
+            <a:prstGeom prst="rect">
+              <a:avLst/>
+            </a:prstGeom>
+            <a:noFill/>
+            <a:extLst>
+              <a:ext uri="{909E8E84-426E-40DD-AFC4-6F175D3DCCD1}">
+                <a14:hiddenFill xmlns:a14="http://schemas.microsoft.com/office/drawing/2010/main">
+                  <a:solidFill>
+                    <a:srgbClr val="FFFFFF"/>
+                  </a:solidFill>
+                </a14:hiddenFill>
+              </a:ext>
+            </a:extLst>
+          </p:spPr>
+        </p:pic>
+        <p:sp>
+          <p:nvSpPr>
+            <p:cNvPr id="37" name="TextBox 36">
+              <a:extLst>
+                <a:ext uri="{FF2B5EF4-FFF2-40B4-BE49-F238E27FC236}">
+                  <a16:creationId xmlns:a16="http://schemas.microsoft.com/office/drawing/2014/main" id="{3FA1E3FC-005E-4898-ADB9-EF3D64D2613D}"/>
+                </a:ext>
+              </a:extLst>
+            </p:cNvPr>
+            <p:cNvSpPr txBox="1"/>
+            <p:nvPr/>
+          </p:nvSpPr>
+          <p:spPr>
+            <a:xfrm>
+              <a:off x="6982900" y="4384291"/>
+              <a:ext cx="1800621" cy="307777"/>
+            </a:xfrm>
+            <a:prstGeom prst="rect">
+              <a:avLst/>
+            </a:prstGeom>
+            <a:noFill/>
+          </p:spPr>
+          <p:txBody>
+            <a:bodyPr wrap="none" rtlCol="0">
+              <a:spAutoFit/>
+            </a:bodyPr>
+            <a:lstStyle/>
+            <a:p>
+              <a:r>
+                <a:rPr lang="en-US" sz="1400" dirty="0"/>
+                <a:t>Azure Resource Graph</a:t>
+              </a:r>
+              <a:endParaRPr lang="LID4096" sz="1400" dirty="0"/>
+            </a:p>
+          </p:txBody>
+        </p:sp>
+      </p:grpSp>
+      <p:sp>
+        <p:nvSpPr>
+          <p:cNvPr id="40" name="TextBox 39">
+            <a:extLst>
+              <a:ext uri="{FF2B5EF4-FFF2-40B4-BE49-F238E27FC236}">
+                <a16:creationId xmlns:a16="http://schemas.microsoft.com/office/drawing/2014/main" id="{FFB670D0-AB2D-42A9-AFCA-3D9EB5EA1765}"/>
+              </a:ext>
+            </a:extLst>
+          </p:cNvPr>
+          <p:cNvSpPr txBox="1"/>
+          <p:nvPr/>
+        </p:nvSpPr>
+        <p:spPr>
+          <a:xfrm>
+            <a:off x="4319366" y="3665697"/>
+            <a:ext cx="2509020" cy="430887"/>
+          </a:xfrm>
+          <a:prstGeom prst="rect">
+            <a:avLst/>
+          </a:prstGeom>
+          <a:noFill/>
+        </p:spPr>
+        <p:txBody>
+          <a:bodyPr wrap="none" rtlCol="0">
+            <a:spAutoFit/>
+          </a:bodyPr>
+          <a:lstStyle/>
+          <a:p>
+            <a:r>
+              <a:rPr lang="en-US" sz="1100" i="1" dirty="0"/>
+              <a:t>Query declared metrics</a:t>
+            </a:r>
+          </a:p>
+          <a:p>
+            <a:r>
+              <a:rPr lang="en-US" sz="1100" i="1" dirty="0"/>
+              <a:t>for declared and/or discovered resources</a:t>
+            </a:r>
+            <a:endParaRPr lang="LID4096" sz="1100" i="1" dirty="0"/>
+          </a:p>
+        </p:txBody>
+      </p:sp>
+      <p:sp>
+        <p:nvSpPr>
+          <p:cNvPr id="41" name="TextBox 40">
+            <a:extLst>
+              <a:ext uri="{FF2B5EF4-FFF2-40B4-BE49-F238E27FC236}">
+                <a16:creationId xmlns:a16="http://schemas.microsoft.com/office/drawing/2014/main" id="{0A9014DC-BB0F-4114-9466-AD9B8008D675}"/>
+              </a:ext>
+            </a:extLst>
+          </p:cNvPr>
+          <p:cNvSpPr txBox="1"/>
+          <p:nvPr/>
+        </p:nvSpPr>
+        <p:spPr>
+          <a:xfrm>
+            <a:off x="8608958" y="3665697"/>
+            <a:ext cx="1858201" cy="430887"/>
+          </a:xfrm>
+          <a:prstGeom prst="rect">
+            <a:avLst/>
+          </a:prstGeom>
+          <a:noFill/>
+        </p:spPr>
+        <p:txBody>
+          <a:bodyPr wrap="none" rtlCol="0">
+            <a:spAutoFit/>
+          </a:bodyPr>
+          <a:lstStyle/>
+          <a:p>
+            <a:r>
+              <a:rPr lang="en-US" sz="1100" i="1" dirty="0"/>
+              <a:t>Query resource based</a:t>
+            </a:r>
+            <a:br>
+              <a:rPr lang="en-US" sz="1100" i="1" dirty="0"/>
+            </a:br>
+            <a:r>
+              <a:rPr lang="en-US" sz="1100" i="1" dirty="0"/>
+              <a:t>on Azure landscape &amp; criteria</a:t>
+            </a:r>
+            <a:endParaRPr lang="LID4096" sz="1100" i="1" dirty="0"/>
+          </a:p>
+        </p:txBody>
+      </p:sp>
+      <p:sp>
+        <p:nvSpPr>
+          <p:cNvPr id="42" name="TextBox 41">
+            <a:extLst>
+              <a:ext uri="{FF2B5EF4-FFF2-40B4-BE49-F238E27FC236}">
+                <a16:creationId xmlns:a16="http://schemas.microsoft.com/office/drawing/2014/main" id="{39CE922B-C9A0-43BB-81BD-5AADFD639DA5}"/>
+              </a:ext>
+            </a:extLst>
+          </p:cNvPr>
+          <p:cNvSpPr txBox="1"/>
+          <p:nvPr/>
+        </p:nvSpPr>
+        <p:spPr>
+          <a:xfrm>
+            <a:off x="5581450" y="2536519"/>
+            <a:ext cx="1603324" cy="600164"/>
+          </a:xfrm>
+          <a:prstGeom prst="rect">
+            <a:avLst/>
+          </a:prstGeom>
+          <a:noFill/>
+        </p:spPr>
+        <p:txBody>
+          <a:bodyPr wrap="none" rtlCol="0">
+            <a:spAutoFit/>
+          </a:bodyPr>
+          <a:lstStyle/>
+          <a:p>
+            <a:r>
+              <a:rPr lang="en-US" sz="1100" i="1" dirty="0"/>
+              <a:t>Get discovered resources</a:t>
+            </a:r>
+            <a:br>
+              <a:rPr lang="en-US" sz="1100" i="1" dirty="0"/>
+            </a:br>
+            <a:br>
+              <a:rPr lang="en-US" sz="1100" i="1" dirty="0"/>
+            </a:br>
+            <a:r>
+              <a:rPr lang="en-US" sz="1100" i="1" dirty="0"/>
+              <a:t>for given discovery group</a:t>
+            </a:r>
+            <a:endParaRPr lang="LID4096" sz="1100" i="1" dirty="0"/>
+          </a:p>
+        </p:txBody>
+      </p:sp>
+    </p:spTree>
+    <p:extLst>
+      <p:ext uri="{BB962C8B-B14F-4D97-AF65-F5344CB8AC3E}">
+        <p14:creationId xmlns:p14="http://schemas.microsoft.com/office/powerpoint/2010/main" val="1101519816"/>
+      </p:ext>
+    </p:extLst>
+  </p:cSld>
+  <p:clrMapOvr>
+    <a:masterClrMapping/>
+  </p:clrMapOvr>
+</p:sld>
+</file>
+
+<file path=ppt/slides/slide4.xml><?xml version="1.0" encoding="utf-8"?>
+<p:sld xmlns:a="http://schemas.openxmlformats.org/drawingml/2006/main" xmlns:r="http://schemas.openxmlformats.org/officeDocument/2006/relationships" xmlns:p="http://schemas.openxmlformats.org/presentationml/2006/main">
+  <p:cSld>
+    <p:spTree>
+      <p:nvGrpSpPr>
+        <p:cNvPr id="1" name=""/>
+        <p:cNvGrpSpPr/>
+        <p:nvPr/>
+      </p:nvGrpSpPr>
+      <p:grpSpPr>
+        <a:xfrm>
+          <a:off x="0" y="0"/>
+          <a:ext cx="0" cy="0"/>
+          <a:chOff x="0" y="0"/>
+          <a:chExt cx="0" cy="0"/>
+        </a:xfrm>
+      </p:grpSpPr>
+      <p:sp>
+        <p:nvSpPr>
+          <p:cNvPr id="26" name="Rectangle 25">
+            <a:extLst>
+              <a:ext uri="{FF2B5EF4-FFF2-40B4-BE49-F238E27FC236}">
+                <a16:creationId xmlns:a16="http://schemas.microsoft.com/office/drawing/2014/main" id="{659BE901-B66A-471D-A3A8-7BC43DEB9815}"/>
+              </a:ext>
+            </a:extLst>
+          </p:cNvPr>
+          <p:cNvSpPr/>
+          <p:nvPr/>
+        </p:nvSpPr>
+        <p:spPr>
+          <a:xfrm>
+            <a:off x="442324" y="2145681"/>
+            <a:ext cx="11307351" cy="2675820"/>
+          </a:xfrm>
+          <a:prstGeom prst="rect">
+            <a:avLst/>
+          </a:prstGeom>
+        </p:spPr>
+        <p:style>
+          <a:lnRef idx="2">
+            <a:schemeClr val="dk1"/>
+          </a:lnRef>
+          <a:fillRef idx="1">
+            <a:schemeClr val="lt1"/>
+          </a:fillRef>
+          <a:effectRef idx="0">
+            <a:schemeClr val="dk1"/>
+          </a:effectRef>
+          <a:fontRef idx="minor">
+            <a:schemeClr val="dk1"/>
+          </a:fontRef>
+        </p:style>
+        <p:txBody>
+          <a:bodyPr rtlCol="0" anchor="ctr"/>
+          <a:lstStyle/>
+          <a:p>
+            <a:pPr algn="ctr"/>
+            <a:endParaRPr lang="LID4096" dirty="0"/>
+          </a:p>
+        </p:txBody>
+      </p:sp>
+      <p:pic>
+        <p:nvPicPr>
+          <p:cNvPr id="8" name="Picture 2" descr="StatsD Logo | Logos, Tech logos, Gaming logos">
+            <a:extLst>
+              <a:ext uri="{FF2B5EF4-FFF2-40B4-BE49-F238E27FC236}">
+                <a16:creationId xmlns:a16="http://schemas.microsoft.com/office/drawing/2014/main" id="{A831F2BA-C1BF-45DD-A426-92DBB667254B}"/>
+              </a:ext>
+            </a:extLst>
+          </p:cNvPr>
+          <p:cNvPicPr>
+            <a:picLocks noChangeAspect="1" noChangeArrowheads="1"/>
+          </p:cNvPicPr>
+          <p:nvPr/>
+        </p:nvPicPr>
+        <p:blipFill rotWithShape="1">
+          <a:blip r:embed="rId2">
+            <a:extLst>
+              <a:ext uri="{28A0092B-C50C-407E-A947-70E740481C1C}">
+                <a14:useLocalDpi xmlns:a14="http://schemas.microsoft.com/office/drawing/2010/main" val="0"/>
+              </a:ext>
+            </a:extLst>
+          </a:blip>
+          <a:srcRect l="9765" t="27530" r="10000" b="26543"/>
+          <a:stretch/>
+        </p:blipFill>
+        <p:spPr bwMode="auto">
+          <a:xfrm>
+            <a:off x="2028440" y="1451343"/>
+            <a:ext cx="1350634" cy="491140"/>
+          </a:xfrm>
+          <a:prstGeom prst="rect">
+            <a:avLst/>
+          </a:prstGeom>
+          <a:noFill/>
+          <a:extLst>
+            <a:ext uri="{909E8E84-426E-40DD-AFC4-6F175D3DCCD1}">
+              <a14:hiddenFill xmlns:a14="http://schemas.microsoft.com/office/drawing/2010/main">
+                <a:solidFill>
+                  <a:srgbClr val="FFFFFF"/>
+                </a:solidFill>
+              </a14:hiddenFill>
+            </a:ext>
+          </a:extLst>
+        </p:spPr>
+      </p:pic>
+      <p:pic>
+        <p:nvPicPr>
+          <p:cNvPr id="9" name="Picture 4" descr="Statuspage | Atlassian">
+            <a:extLst>
+              <a:ext uri="{FF2B5EF4-FFF2-40B4-BE49-F238E27FC236}">
+                <a16:creationId xmlns:a16="http://schemas.microsoft.com/office/drawing/2014/main" id="{ED0E2EE6-F25D-4B8F-83AA-A9112BCEE768}"/>
+              </a:ext>
+            </a:extLst>
+          </p:cNvPr>
+          <p:cNvPicPr>
+            <a:picLocks noChangeAspect="1" noChangeArrowheads="1"/>
+          </p:cNvPicPr>
+          <p:nvPr/>
+        </p:nvPicPr>
+        <p:blipFill>
+          <a:blip r:embed="rId3">
+            <a:extLst>
+              <a:ext uri="{28A0092B-C50C-407E-A947-70E740481C1C}">
+                <a14:useLocalDpi xmlns:a14="http://schemas.microsoft.com/office/drawing/2010/main" val="0"/>
+              </a:ext>
+            </a:extLst>
+          </a:blip>
+          <a:srcRect/>
+          <a:stretch>
+            <a:fillRect/>
+          </a:stretch>
+        </p:blipFill>
+        <p:spPr bwMode="auto">
+          <a:xfrm>
+            <a:off x="3793657" y="1340040"/>
+            <a:ext cx="1937542" cy="280990"/>
+          </a:xfrm>
+          <a:prstGeom prst="rect">
+            <a:avLst/>
+          </a:prstGeom>
+          <a:noFill/>
+          <a:extLst>
+            <a:ext uri="{909E8E84-426E-40DD-AFC4-6F175D3DCCD1}">
+              <a14:hiddenFill xmlns:a14="http://schemas.microsoft.com/office/drawing/2010/main">
+                <a:solidFill>
+                  <a:srgbClr val="FFFFFF"/>
+                </a:solidFill>
+              </a14:hiddenFill>
+            </a:ext>
+          </a:extLst>
+        </p:spPr>
+      </p:pic>
+      <p:pic>
+        <p:nvPicPr>
+          <p:cNvPr id="10" name="Picture 8">
+            <a:extLst>
+              <a:ext uri="{FF2B5EF4-FFF2-40B4-BE49-F238E27FC236}">
+                <a16:creationId xmlns:a16="http://schemas.microsoft.com/office/drawing/2014/main" id="{CEDA630D-175A-4E24-AD69-628B82FF0939}"/>
+              </a:ext>
+            </a:extLst>
+          </p:cNvPr>
+          <p:cNvPicPr>
+            <a:picLocks noChangeAspect="1" noChangeArrowheads="1"/>
+          </p:cNvPicPr>
+          <p:nvPr/>
+        </p:nvPicPr>
+        <p:blipFill rotWithShape="1">
+          <a:blip r:embed="rId4">
+            <a:extLst>
+              <a:ext uri="{28A0092B-C50C-407E-A947-70E740481C1C}">
+                <a14:useLocalDpi xmlns:a14="http://schemas.microsoft.com/office/drawing/2010/main" val="0"/>
+              </a:ext>
+            </a:extLst>
+          </a:blip>
+          <a:srcRect l="1807" t="16125" r="4250" b="14397"/>
+          <a:stretch/>
+        </p:blipFill>
+        <p:spPr bwMode="auto">
+          <a:xfrm>
+            <a:off x="6175591" y="1451343"/>
+            <a:ext cx="1426410" cy="470266"/>
+          </a:xfrm>
+          <a:prstGeom prst="rect">
+            <a:avLst/>
+          </a:prstGeom>
+          <a:noFill/>
+          <a:extLst>
+            <a:ext uri="{909E8E84-426E-40DD-AFC4-6F175D3DCCD1}">
+              <a14:hiddenFill xmlns:a14="http://schemas.microsoft.com/office/drawing/2010/main">
+                <a:solidFill>
+                  <a:srgbClr val="FFFFFF"/>
+                </a:solidFill>
+              </a14:hiddenFill>
+            </a:ext>
+          </a:extLst>
+        </p:spPr>
+      </p:pic>
+      <p:cxnSp>
+        <p:nvCxnSpPr>
+          <p:cNvPr id="4" name="Straight Arrow Connector 3">
+            <a:extLst>
+              <a:ext uri="{FF2B5EF4-FFF2-40B4-BE49-F238E27FC236}">
+                <a16:creationId xmlns:a16="http://schemas.microsoft.com/office/drawing/2014/main" id="{080ACE8A-92F3-47BE-A907-9AB06186A982}"/>
+              </a:ext>
+            </a:extLst>
+          </p:cNvPr>
+          <p:cNvCxnSpPr>
+            <a:cxnSpLocks/>
+          </p:cNvCxnSpPr>
+          <p:nvPr/>
+        </p:nvCxnSpPr>
+        <p:spPr>
+          <a:xfrm flipH="1" flipV="1">
+            <a:off x="3436548" y="1921609"/>
+            <a:ext cx="1104425" cy="343704"/>
+          </a:xfrm>
+          <a:prstGeom prst="straightConnector1">
+            <a:avLst/>
+          </a:prstGeom>
+          <a:ln>
+            <a:tailEnd type="triangle"/>
+          </a:ln>
+        </p:spPr>
+        <p:style>
+          <a:lnRef idx="1">
+            <a:schemeClr val="dk1"/>
+          </a:lnRef>
+          <a:fillRef idx="0">
+            <a:schemeClr val="dk1"/>
+          </a:fillRef>
+          <a:effectRef idx="0">
+            <a:schemeClr val="dk1"/>
+          </a:effectRef>
+          <a:fontRef idx="minor">
+            <a:schemeClr val="tx1"/>
+          </a:fontRef>
+        </p:style>
+      </p:cxnSp>
+      <p:cxnSp>
+        <p:nvCxnSpPr>
+          <p:cNvPr id="11" name="Straight Arrow Connector 10">
+            <a:extLst>
+              <a:ext uri="{FF2B5EF4-FFF2-40B4-BE49-F238E27FC236}">
+                <a16:creationId xmlns:a16="http://schemas.microsoft.com/office/drawing/2014/main" id="{3DDD3110-2C22-4100-A249-9147599B7B36}"/>
+              </a:ext>
+            </a:extLst>
+          </p:cNvPr>
+          <p:cNvCxnSpPr>
+            <a:cxnSpLocks/>
+            <a:endCxn id="9" idx="2"/>
+          </p:cNvCxnSpPr>
+          <p:nvPr/>
+        </p:nvCxnSpPr>
+        <p:spPr>
+          <a:xfrm flipV="1">
+            <a:off x="4762428" y="1621030"/>
+            <a:ext cx="0" cy="644283"/>
+          </a:xfrm>
+          <a:prstGeom prst="straightConnector1">
+            <a:avLst/>
+          </a:prstGeom>
+          <a:ln>
+            <a:tailEnd type="triangle"/>
+          </a:ln>
+        </p:spPr>
+        <p:style>
+          <a:lnRef idx="1">
+            <a:schemeClr val="dk1"/>
+          </a:lnRef>
+          <a:fillRef idx="0">
+            <a:schemeClr val="dk1"/>
+          </a:fillRef>
+          <a:effectRef idx="0">
+            <a:schemeClr val="dk1"/>
+          </a:effectRef>
+          <a:fontRef idx="minor">
+            <a:schemeClr val="tx1"/>
+          </a:fontRef>
+        </p:style>
+      </p:cxnSp>
+      <p:cxnSp>
+        <p:nvCxnSpPr>
+          <p:cNvPr id="14" name="Straight Arrow Connector 13">
+            <a:extLst>
+              <a:ext uri="{FF2B5EF4-FFF2-40B4-BE49-F238E27FC236}">
+                <a16:creationId xmlns:a16="http://schemas.microsoft.com/office/drawing/2014/main" id="{EF0E679F-CEE6-4FC8-BEA2-8FFF5767B9F6}"/>
+              </a:ext>
+            </a:extLst>
+          </p:cNvPr>
+          <p:cNvCxnSpPr>
+            <a:cxnSpLocks/>
+          </p:cNvCxnSpPr>
+          <p:nvPr/>
+        </p:nvCxnSpPr>
+        <p:spPr>
+          <a:xfrm flipH="1">
+            <a:off x="4929117" y="1920837"/>
+            <a:ext cx="1250155" cy="344476"/>
+          </a:xfrm>
+          <a:prstGeom prst="straightConnector1">
+            <a:avLst/>
+          </a:prstGeom>
+          <a:ln>
+            <a:prstDash val="dash"/>
+            <a:headEnd type="none" w="med" len="med"/>
+            <a:tailEnd type="triangle" w="med" len="med"/>
+          </a:ln>
+        </p:spPr>
+        <p:style>
+          <a:lnRef idx="1">
+            <a:schemeClr val="dk1"/>
+          </a:lnRef>
+          <a:fillRef idx="0">
+            <a:schemeClr val="dk1"/>
+          </a:fillRef>
+          <a:effectRef idx="0">
+            <a:schemeClr val="dk1"/>
+          </a:effectRef>
+          <a:fontRef idx="minor">
+            <a:schemeClr val="tx1"/>
+          </a:fontRef>
+        </p:style>
+      </p:cxnSp>
+      <p:cxnSp>
+        <p:nvCxnSpPr>
+          <p:cNvPr id="15" name="Straight Arrow Connector 14">
+            <a:extLst>
+              <a:ext uri="{FF2B5EF4-FFF2-40B4-BE49-F238E27FC236}">
+                <a16:creationId xmlns:a16="http://schemas.microsoft.com/office/drawing/2014/main" id="{72E81A24-E430-47FF-BD31-773153BB2680}"/>
+              </a:ext>
+            </a:extLst>
+          </p:cNvPr>
+          <p:cNvCxnSpPr>
+            <a:cxnSpLocks/>
+            <a:stCxn id="24" idx="2"/>
+            <a:endCxn id="13" idx="0"/>
+          </p:cNvCxnSpPr>
+          <p:nvPr/>
+        </p:nvCxnSpPr>
+        <p:spPr>
+          <a:xfrm>
+            <a:off x="4762427" y="4521133"/>
+            <a:ext cx="656" cy="1019085"/>
+          </a:xfrm>
+          <a:prstGeom prst="straightConnector1">
+            <a:avLst/>
+          </a:prstGeom>
+          <a:ln>
+            <a:prstDash val="sysDash"/>
+            <a:tailEnd type="triangle"/>
+          </a:ln>
+        </p:spPr>
+        <p:style>
+          <a:lnRef idx="1">
+            <a:schemeClr val="dk1"/>
+          </a:lnRef>
+          <a:fillRef idx="0">
+            <a:schemeClr val="dk1"/>
+          </a:fillRef>
+          <a:effectRef idx="0">
+            <a:schemeClr val="dk1"/>
+          </a:effectRef>
+          <a:fontRef idx="minor">
+            <a:schemeClr val="tx1"/>
+          </a:fontRef>
+        </p:style>
+      </p:cxnSp>
+      <p:cxnSp>
+        <p:nvCxnSpPr>
+          <p:cNvPr id="20" name="Straight Arrow Connector 19">
+            <a:extLst>
+              <a:ext uri="{FF2B5EF4-FFF2-40B4-BE49-F238E27FC236}">
+                <a16:creationId xmlns:a16="http://schemas.microsoft.com/office/drawing/2014/main" id="{F73A3814-732F-4119-B56F-93EAB99E2266}"/>
+              </a:ext>
+            </a:extLst>
+          </p:cNvPr>
+          <p:cNvCxnSpPr>
+            <a:cxnSpLocks/>
+            <a:endCxn id="19" idx="0"/>
+          </p:cNvCxnSpPr>
+          <p:nvPr/>
+        </p:nvCxnSpPr>
+        <p:spPr>
+          <a:xfrm>
+            <a:off x="9046324" y="2988292"/>
+            <a:ext cx="6351" cy="2551926"/>
+          </a:xfrm>
+          <a:prstGeom prst="straightConnector1">
+            <a:avLst/>
+          </a:prstGeom>
+          <a:ln>
+            <a:prstDash val="sysDash"/>
+            <a:tailEnd type="triangle"/>
+          </a:ln>
+        </p:spPr>
+        <p:style>
+          <a:lnRef idx="1">
+            <a:schemeClr val="dk1"/>
+          </a:lnRef>
+          <a:fillRef idx="0">
+            <a:schemeClr val="dk1"/>
+          </a:fillRef>
+          <a:effectRef idx="0">
+            <a:schemeClr val="dk1"/>
+          </a:effectRef>
+          <a:fontRef idx="minor">
+            <a:schemeClr val="tx1"/>
+          </a:fontRef>
+        </p:style>
+      </p:cxnSp>
+      <p:pic>
+        <p:nvPicPr>
+          <p:cNvPr id="29" name="Picture 2" descr="Promitor - Bringing Azure Monitor metrics where you need them ...">
+            <a:extLst>
+              <a:ext uri="{FF2B5EF4-FFF2-40B4-BE49-F238E27FC236}">
+                <a16:creationId xmlns:a16="http://schemas.microsoft.com/office/drawing/2014/main" id="{CD4A43BB-6989-448C-B653-C938D6228EE1}"/>
+              </a:ext>
+            </a:extLst>
+          </p:cNvPr>
+          <p:cNvPicPr>
+            <a:picLocks noChangeAspect="1" noChangeArrowheads="1"/>
+          </p:cNvPicPr>
+          <p:nvPr/>
+        </p:nvPicPr>
+        <p:blipFill>
+          <a:blip r:embed="rId5">
+            <a:extLst>
+              <a:ext uri="{28A0092B-C50C-407E-A947-70E740481C1C}">
+                <a14:useLocalDpi xmlns:a14="http://schemas.microsoft.com/office/drawing/2010/main" val="0"/>
+              </a:ext>
+            </a:extLst>
+          </a:blip>
+          <a:srcRect/>
+          <a:stretch>
+            <a:fillRect/>
+          </a:stretch>
+        </p:blipFill>
+        <p:spPr bwMode="auto">
+          <a:xfrm>
+            <a:off x="841740" y="3128918"/>
+            <a:ext cx="1788160" cy="600164"/>
+          </a:xfrm>
+          <a:prstGeom prst="rect">
+            <a:avLst/>
+          </a:prstGeom>
+          <a:noFill/>
+          <a:extLst>
+            <a:ext uri="{909E8E84-426E-40DD-AFC4-6F175D3DCCD1}">
+              <a14:hiddenFill xmlns:a14="http://schemas.microsoft.com/office/drawing/2010/main">
+                <a:solidFill>
+                  <a:srgbClr val="FFFFFF"/>
+                </a:solidFill>
+              </a14:hiddenFill>
+            </a:ext>
+          </a:extLst>
+        </p:spPr>
+      </p:pic>
+      <p:grpSp>
+        <p:nvGrpSpPr>
+          <p:cNvPr id="39" name="Group 38">
+            <a:extLst>
+              <a:ext uri="{FF2B5EF4-FFF2-40B4-BE49-F238E27FC236}">
+                <a16:creationId xmlns:a16="http://schemas.microsoft.com/office/drawing/2014/main" id="{EE60B4A5-A490-4AB0-8A98-B7B39CBCEBBF}"/>
+              </a:ext>
+            </a:extLst>
+          </p:cNvPr>
+          <p:cNvGrpSpPr/>
+          <p:nvPr/>
+        </p:nvGrpSpPr>
+        <p:grpSpPr>
+          <a:xfrm>
+            <a:off x="4140398" y="5540218"/>
+            <a:ext cx="1244059" cy="837394"/>
+            <a:chOff x="3622310" y="3854675"/>
+            <a:chExt cx="1244059" cy="837394"/>
+          </a:xfrm>
+        </p:grpSpPr>
+        <p:pic>
+          <p:nvPicPr>
+            <p:cNvPr id="13" name="Picture 10" descr="Azure Monitor (@AzureMonitor) | Twitter">
+              <a:extLst>
+                <a:ext uri="{FF2B5EF4-FFF2-40B4-BE49-F238E27FC236}">
+                  <a16:creationId xmlns:a16="http://schemas.microsoft.com/office/drawing/2014/main" id="{E972978B-6F70-4615-83B3-E213DFB45B23}"/>
+                </a:ext>
+              </a:extLst>
+            </p:cNvPr>
+            <p:cNvPicPr>
+              <a:picLocks noChangeAspect="1" noChangeArrowheads="1"/>
+            </p:cNvPicPr>
+            <p:nvPr/>
+          </p:nvPicPr>
+          <p:blipFill>
+            <a:blip r:embed="rId6">
+              <a:extLst>
+                <a:ext uri="{28A0092B-C50C-407E-A947-70E740481C1C}">
+                  <a14:useLocalDpi xmlns:a14="http://schemas.microsoft.com/office/drawing/2010/main" val="0"/>
+                </a:ext>
+              </a:extLst>
+            </a:blip>
+            <a:srcRect/>
+            <a:stretch>
+              <a:fillRect/>
+            </a:stretch>
+          </p:blipFill>
+          <p:spPr bwMode="auto">
+            <a:xfrm>
+              <a:off x="3999074" y="3854675"/>
+              <a:ext cx="491841" cy="491841"/>
+            </a:xfrm>
+            <a:prstGeom prst="rect">
+              <a:avLst/>
+            </a:prstGeom>
+            <a:noFill/>
+            <a:extLst>
+              <a:ext uri="{909E8E84-426E-40DD-AFC4-6F175D3DCCD1}">
+                <a14:hiddenFill xmlns:a14="http://schemas.microsoft.com/office/drawing/2010/main">
+                  <a:solidFill>
+                    <a:srgbClr val="FFFFFF"/>
+                  </a:solidFill>
+                </a14:hiddenFill>
+              </a:ext>
+            </a:extLst>
+          </p:spPr>
+        </p:pic>
+        <p:sp>
+          <p:nvSpPr>
+            <p:cNvPr id="36" name="TextBox 35">
+              <a:extLst>
+                <a:ext uri="{FF2B5EF4-FFF2-40B4-BE49-F238E27FC236}">
+                  <a16:creationId xmlns:a16="http://schemas.microsoft.com/office/drawing/2014/main" id="{63AE4A1C-6C01-4017-9683-C6D86C604BAB}"/>
+                </a:ext>
+              </a:extLst>
+            </p:cNvPr>
+            <p:cNvSpPr txBox="1"/>
+            <p:nvPr/>
+          </p:nvSpPr>
+          <p:spPr>
+            <a:xfrm>
+              <a:off x="3622310" y="4384292"/>
+              <a:ext cx="1244059" cy="307777"/>
+            </a:xfrm>
+            <a:prstGeom prst="rect">
+              <a:avLst/>
+            </a:prstGeom>
+            <a:noFill/>
+          </p:spPr>
+          <p:txBody>
+            <a:bodyPr wrap="none" rtlCol="0">
+              <a:spAutoFit/>
+            </a:bodyPr>
+            <a:lstStyle/>
+            <a:p>
+              <a:r>
+                <a:rPr lang="en-US" sz="1400" dirty="0"/>
+                <a:t>Azure Monitor</a:t>
+              </a:r>
+              <a:endParaRPr lang="LID4096" sz="1400" dirty="0"/>
+            </a:p>
+          </p:txBody>
+        </p:sp>
+      </p:grpSp>
+      <p:grpSp>
+        <p:nvGrpSpPr>
+          <p:cNvPr id="38" name="Group 37">
+            <a:extLst>
+              <a:ext uri="{FF2B5EF4-FFF2-40B4-BE49-F238E27FC236}">
+                <a16:creationId xmlns:a16="http://schemas.microsoft.com/office/drawing/2014/main" id="{FCD9D0A0-A2CD-49C3-BB57-BBCCBF1A7132}"/>
+              </a:ext>
+            </a:extLst>
+          </p:cNvPr>
+          <p:cNvGrpSpPr/>
+          <p:nvPr/>
+        </p:nvGrpSpPr>
+        <p:grpSpPr>
+          <a:xfrm>
+            <a:off x="8152364" y="5540218"/>
+            <a:ext cx="1800621" cy="837392"/>
+            <a:chOff x="6982900" y="3854676"/>
+            <a:chExt cx="1800621" cy="837392"/>
+          </a:xfrm>
+        </p:grpSpPr>
+        <p:pic>
+          <p:nvPicPr>
+            <p:cNvPr id="19" name="Picture 4" descr="Starter query samples - Azure Resource Graph | Microsoft Docs">
+              <a:extLst>
+                <a:ext uri="{FF2B5EF4-FFF2-40B4-BE49-F238E27FC236}">
+                  <a16:creationId xmlns:a16="http://schemas.microsoft.com/office/drawing/2014/main" id="{A482E936-2932-401B-A3F4-9EBA47798CAB}"/>
+                </a:ext>
+              </a:extLst>
+            </p:cNvPr>
+            <p:cNvPicPr>
+              <a:picLocks noChangeAspect="1" noChangeArrowheads="1"/>
+            </p:cNvPicPr>
+            <p:nvPr/>
+          </p:nvPicPr>
+          <p:blipFill>
+            <a:blip r:embed="rId7">
+              <a:extLst>
+                <a:ext uri="{BEBA8EAE-BF5A-486C-A8C5-ECC9F3942E4B}">
+                  <a14:imgProps xmlns:a14="http://schemas.microsoft.com/office/drawing/2010/main">
+                    <a14:imgLayer r:embed="rId8">
+                      <a14:imgEffect>
+                        <a14:backgroundRemoval t="4000" b="95556" l="889" r="93778">
+                          <a14:foregroundMark x1="4889" y1="22222" x2="13333" y2="9333"/>
+                          <a14:foregroundMark x1="1333" y1="16889" x2="1333" y2="16889"/>
+                          <a14:foregroundMark x1="81778" y1="20000" x2="81778" y2="20000"/>
+                          <a14:foregroundMark x1="75111" y1="18667" x2="75111" y2="16444"/>
+                          <a14:foregroundMark x1="67111" y1="16000" x2="89778" y2="18222"/>
+                          <a14:foregroundMark x1="89778" y1="18222" x2="68000" y2="17333"/>
+                          <a14:foregroundMark x1="94222" y1="23111" x2="94222" y2="23111"/>
+                          <a14:foregroundMark x1="79556" y1="4444" x2="79556" y2="4444"/>
+                          <a14:foregroundMark x1="54667" y1="72444" x2="54667" y2="72444"/>
+                          <a14:foregroundMark x1="56889" y1="91556" x2="56889" y2="91556"/>
+                          <a14:foregroundMark x1="56444" y1="95556" x2="56444" y2="95556"/>
+                        </a14:backgroundRemoval>
+                      </a14:imgEffect>
+                    </a14:imgLayer>
+                  </a14:imgProps>
+                </a:ext>
+                <a:ext uri="{28A0092B-C50C-407E-A947-70E740481C1C}">
+                  <a14:useLocalDpi xmlns:a14="http://schemas.microsoft.com/office/drawing/2010/main" val="0"/>
+                </a:ext>
+              </a:extLst>
+            </a:blip>
+            <a:srcRect/>
+            <a:stretch>
+              <a:fillRect/>
+            </a:stretch>
+          </p:blipFill>
+          <p:spPr bwMode="auto">
+            <a:xfrm>
+              <a:off x="7637290" y="3854676"/>
+              <a:ext cx="491842" cy="491842"/>
+            </a:xfrm>
+            <a:prstGeom prst="rect">
+              <a:avLst/>
+            </a:prstGeom>
+            <a:noFill/>
+            <a:extLst>
+              <a:ext uri="{909E8E84-426E-40DD-AFC4-6F175D3DCCD1}">
+                <a14:hiddenFill xmlns:a14="http://schemas.microsoft.com/office/drawing/2010/main">
+                  <a:solidFill>
+                    <a:srgbClr val="FFFFFF"/>
+                  </a:solidFill>
+                </a14:hiddenFill>
+              </a:ext>
+            </a:extLst>
+          </p:spPr>
+        </p:pic>
+        <p:sp>
+          <p:nvSpPr>
+            <p:cNvPr id="37" name="TextBox 36">
+              <a:extLst>
+                <a:ext uri="{FF2B5EF4-FFF2-40B4-BE49-F238E27FC236}">
+                  <a16:creationId xmlns:a16="http://schemas.microsoft.com/office/drawing/2014/main" id="{3FA1E3FC-005E-4898-ADB9-EF3D64D2613D}"/>
+                </a:ext>
+              </a:extLst>
+            </p:cNvPr>
+            <p:cNvSpPr txBox="1"/>
+            <p:nvPr/>
+          </p:nvSpPr>
+          <p:spPr>
+            <a:xfrm>
+              <a:off x="6982900" y="4384291"/>
+              <a:ext cx="1800621" cy="307777"/>
+            </a:xfrm>
+            <a:prstGeom prst="rect">
+              <a:avLst/>
+            </a:prstGeom>
+            <a:noFill/>
+          </p:spPr>
+          <p:txBody>
+            <a:bodyPr wrap="none" rtlCol="0">
+              <a:spAutoFit/>
+            </a:bodyPr>
+            <a:lstStyle/>
+            <a:p>
+              <a:r>
+                <a:rPr lang="en-US" sz="1400" dirty="0"/>
+                <a:t>Azure Resource Graph</a:t>
+              </a:r>
+              <a:endParaRPr lang="LID4096" sz="1400" dirty="0"/>
+            </a:p>
+          </p:txBody>
+        </p:sp>
+      </p:grpSp>
+      <p:sp>
+        <p:nvSpPr>
+          <p:cNvPr id="40" name="TextBox 39">
+            <a:extLst>
+              <a:ext uri="{FF2B5EF4-FFF2-40B4-BE49-F238E27FC236}">
+                <a16:creationId xmlns:a16="http://schemas.microsoft.com/office/drawing/2014/main" id="{FFB670D0-AB2D-42A9-AFCA-3D9EB5EA1765}"/>
+              </a:ext>
+            </a:extLst>
+          </p:cNvPr>
+          <p:cNvSpPr txBox="1"/>
+          <p:nvPr/>
+        </p:nvSpPr>
+        <p:spPr>
+          <a:xfrm>
+            <a:off x="4837454" y="4929465"/>
+            <a:ext cx="2509020" cy="430887"/>
+          </a:xfrm>
+          <a:prstGeom prst="rect">
+            <a:avLst/>
+          </a:prstGeom>
+          <a:noFill/>
+        </p:spPr>
+        <p:txBody>
+          <a:bodyPr wrap="none" rtlCol="0">
+            <a:spAutoFit/>
+          </a:bodyPr>
+          <a:lstStyle/>
+          <a:p>
+            <a:r>
+              <a:rPr lang="en-US" sz="1100" i="1" dirty="0"/>
+              <a:t>Query declared metrics</a:t>
+            </a:r>
+          </a:p>
+          <a:p>
+            <a:r>
+              <a:rPr lang="en-US" sz="1100" i="1" dirty="0"/>
+              <a:t>for declared and/or discovered resources</a:t>
+            </a:r>
+            <a:endParaRPr lang="LID4096" sz="1100" i="1" dirty="0"/>
+          </a:p>
+        </p:txBody>
+      </p:sp>
+      <p:sp>
+        <p:nvSpPr>
+          <p:cNvPr id="41" name="TextBox 40">
+            <a:extLst>
+              <a:ext uri="{FF2B5EF4-FFF2-40B4-BE49-F238E27FC236}">
+                <a16:creationId xmlns:a16="http://schemas.microsoft.com/office/drawing/2014/main" id="{0A9014DC-BB0F-4114-9466-AD9B8008D675}"/>
+              </a:ext>
+            </a:extLst>
+          </p:cNvPr>
+          <p:cNvSpPr txBox="1"/>
+          <p:nvPr/>
+        </p:nvSpPr>
+        <p:spPr>
+          <a:xfrm>
+            <a:off x="9127046" y="4929465"/>
+            <a:ext cx="1858201" cy="430887"/>
+          </a:xfrm>
+          <a:prstGeom prst="rect">
+            <a:avLst/>
+          </a:prstGeom>
+          <a:noFill/>
+        </p:spPr>
+        <p:txBody>
+          <a:bodyPr wrap="none" rtlCol="0">
+            <a:spAutoFit/>
+          </a:bodyPr>
+          <a:lstStyle/>
+          <a:p>
+            <a:r>
+              <a:rPr lang="en-US" sz="1100" i="1" dirty="0"/>
+              <a:t>Query resource based</a:t>
+            </a:r>
+            <a:br>
+              <a:rPr lang="en-US" sz="1100" i="1" dirty="0"/>
+            </a:br>
+            <a:r>
+              <a:rPr lang="en-US" sz="1100" i="1" dirty="0"/>
+              <a:t>on Azure landscape &amp; criteria</a:t>
+            </a:r>
+            <a:endParaRPr lang="LID4096" sz="1100" i="1" dirty="0"/>
+          </a:p>
+        </p:txBody>
+      </p:sp>
+      <p:sp>
+        <p:nvSpPr>
+          <p:cNvPr id="42" name="TextBox 41">
+            <a:extLst>
+              <a:ext uri="{FF2B5EF4-FFF2-40B4-BE49-F238E27FC236}">
+                <a16:creationId xmlns:a16="http://schemas.microsoft.com/office/drawing/2014/main" id="{39CE922B-C9A0-43BB-81BD-5AADFD639DA5}"/>
+              </a:ext>
+            </a:extLst>
+          </p:cNvPr>
+          <p:cNvSpPr txBox="1"/>
+          <p:nvPr/>
+        </p:nvSpPr>
+        <p:spPr>
+          <a:xfrm>
+            <a:off x="6518438" y="4167396"/>
+            <a:ext cx="1617751" cy="430887"/>
+          </a:xfrm>
+          <a:prstGeom prst="rect">
+            <a:avLst/>
+          </a:prstGeom>
+          <a:noFill/>
+        </p:spPr>
+        <p:txBody>
+          <a:bodyPr wrap="none" rtlCol="0">
+            <a:spAutoFit/>
+          </a:bodyPr>
+          <a:lstStyle/>
+          <a:p>
+            <a:r>
+              <a:rPr lang="en-US" sz="1100" i="1" dirty="0"/>
+              <a:t>Get discovered resources</a:t>
+            </a:r>
+            <a:br>
+              <a:rPr lang="en-US" sz="1100" i="1" dirty="0"/>
+            </a:br>
+            <a:r>
+              <a:rPr lang="en-US" sz="1100" i="1" dirty="0"/>
+              <a:t>for given discovery group</a:t>
+            </a:r>
+            <a:endParaRPr lang="LID4096" sz="1100" i="1" dirty="0"/>
+          </a:p>
+        </p:txBody>
+      </p:sp>
+      <p:grpSp>
+        <p:nvGrpSpPr>
+          <p:cNvPr id="3" name="Group 2">
+            <a:extLst>
+              <a:ext uri="{FF2B5EF4-FFF2-40B4-BE49-F238E27FC236}">
+                <a16:creationId xmlns:a16="http://schemas.microsoft.com/office/drawing/2014/main" id="{5EC5BA62-91EC-4C71-B92D-CA3DDC98C66B}"/>
+              </a:ext>
+            </a:extLst>
+          </p:cNvPr>
+          <p:cNvGrpSpPr/>
+          <p:nvPr/>
+        </p:nvGrpSpPr>
+        <p:grpSpPr>
+          <a:xfrm>
+            <a:off x="3029316" y="2375811"/>
+            <a:ext cx="3466222" cy="2145322"/>
+            <a:chOff x="474992" y="3543066"/>
+            <a:chExt cx="3466222" cy="2145322"/>
+          </a:xfrm>
+        </p:grpSpPr>
+        <p:sp>
+          <p:nvSpPr>
+            <p:cNvPr id="24" name="Rectangle 23">
+              <a:extLst>
+                <a:ext uri="{FF2B5EF4-FFF2-40B4-BE49-F238E27FC236}">
+                  <a16:creationId xmlns:a16="http://schemas.microsoft.com/office/drawing/2014/main" id="{08709BF9-8DA7-4AB4-9927-D972782C4D13}"/>
+                </a:ext>
+              </a:extLst>
+            </p:cNvPr>
+            <p:cNvSpPr/>
+            <p:nvPr/>
+          </p:nvSpPr>
+          <p:spPr>
+            <a:xfrm>
+              <a:off x="474992" y="3543066"/>
+              <a:ext cx="3466222" cy="2145322"/>
+            </a:xfrm>
+            <a:prstGeom prst="rect">
+              <a:avLst/>
+            </a:prstGeom>
+            <a:solidFill>
+              <a:schemeClr val="bg1"/>
+            </a:solidFill>
+          </p:spPr>
+          <p:style>
+            <a:lnRef idx="2">
+              <a:schemeClr val="dk1"/>
+            </a:lnRef>
+            <a:fillRef idx="1">
+              <a:schemeClr val="lt1"/>
+            </a:fillRef>
+            <a:effectRef idx="0">
+              <a:schemeClr val="dk1"/>
+            </a:effectRef>
+            <a:fontRef idx="minor">
+              <a:schemeClr val="dk1"/>
+            </a:fontRef>
+          </p:style>
+          <p:txBody>
+            <a:bodyPr rtlCol="0" anchor="t"/>
+            <a:lstStyle/>
+            <a:p>
+              <a:pPr algn="ctr"/>
+              <a:r>
+                <a:rPr lang="en-US" sz="1600" b="1" dirty="0"/>
+                <a:t>Scraper </a:t>
+              </a:r>
+              <a:r>
+                <a:rPr lang="en-US" sz="1600" dirty="0"/>
+                <a:t>Agent</a:t>
+              </a:r>
+              <a:endParaRPr lang="LID4096" sz="1600" dirty="0"/>
+            </a:p>
+          </p:txBody>
+        </p:sp>
+        <p:sp>
+          <p:nvSpPr>
+            <p:cNvPr id="27" name="Rectangle 26">
+              <a:extLst>
+                <a:ext uri="{FF2B5EF4-FFF2-40B4-BE49-F238E27FC236}">
+                  <a16:creationId xmlns:a16="http://schemas.microsoft.com/office/drawing/2014/main" id="{2E6F65D0-0A6F-4AC0-B3E1-00488E9B9BBC}"/>
+                </a:ext>
+              </a:extLst>
+            </p:cNvPr>
+            <p:cNvSpPr/>
+            <p:nvPr/>
+          </p:nvSpPr>
+          <p:spPr>
+            <a:xfrm>
+              <a:off x="666904" y="4557611"/>
+              <a:ext cx="3124910" cy="436315"/>
+            </a:xfrm>
+            <a:prstGeom prst="rect">
+              <a:avLst/>
+            </a:prstGeom>
+            <a:solidFill>
+              <a:schemeClr val="accent6">
+                <a:lumMod val="20000"/>
+                <a:lumOff val="80000"/>
+              </a:schemeClr>
+            </a:solidFill>
+          </p:spPr>
+          <p:style>
+            <a:lnRef idx="2">
+              <a:schemeClr val="dk1"/>
+            </a:lnRef>
+            <a:fillRef idx="1">
+              <a:schemeClr val="lt1"/>
+            </a:fillRef>
+            <a:effectRef idx="0">
+              <a:schemeClr val="dk1"/>
+            </a:effectRef>
+            <a:fontRef idx="minor">
+              <a:schemeClr val="dk1"/>
+            </a:fontRef>
+          </p:style>
+          <p:txBody>
+            <a:bodyPr rtlCol="0" anchor="ctr"/>
+            <a:lstStyle/>
+            <a:p>
+              <a:pPr algn="ctr"/>
+              <a:r>
+                <a:rPr lang="en-US" sz="1400" dirty="0"/>
+                <a:t>REST API</a:t>
+              </a:r>
+              <a:endParaRPr lang="LID4096" sz="1400" dirty="0"/>
+            </a:p>
+          </p:txBody>
+        </p:sp>
+        <p:sp>
+          <p:nvSpPr>
+            <p:cNvPr id="28" name="Rectangle 27">
+              <a:extLst>
+                <a:ext uri="{FF2B5EF4-FFF2-40B4-BE49-F238E27FC236}">
+                  <a16:creationId xmlns:a16="http://schemas.microsoft.com/office/drawing/2014/main" id="{BEA11157-11E4-4C21-B295-E0C2188C9F20}"/>
+                </a:ext>
+              </a:extLst>
+            </p:cNvPr>
+            <p:cNvSpPr/>
+            <p:nvPr/>
+          </p:nvSpPr>
+          <p:spPr>
+            <a:xfrm>
+              <a:off x="666903" y="5099177"/>
+              <a:ext cx="3124912" cy="436315"/>
+            </a:xfrm>
+            <a:prstGeom prst="rect">
+              <a:avLst/>
+            </a:prstGeom>
+            <a:solidFill>
+              <a:schemeClr val="accent6">
+                <a:lumMod val="20000"/>
+                <a:lumOff val="80000"/>
+              </a:schemeClr>
+            </a:solidFill>
+          </p:spPr>
+          <p:style>
+            <a:lnRef idx="2">
+              <a:schemeClr val="dk1"/>
+            </a:lnRef>
+            <a:fillRef idx="1">
+              <a:schemeClr val="lt1"/>
+            </a:fillRef>
+            <a:effectRef idx="0">
+              <a:schemeClr val="dk1"/>
+            </a:effectRef>
+            <a:fontRef idx="minor">
+              <a:schemeClr val="dk1"/>
+            </a:fontRef>
+          </p:style>
+          <p:txBody>
+            <a:bodyPr rtlCol="0" anchor="ctr"/>
+            <a:lstStyle/>
+            <a:p>
+              <a:pPr algn="ctr"/>
+              <a:r>
+                <a:rPr lang="en-US" sz="1400" dirty="0"/>
+                <a:t>Scraping background jobs</a:t>
+              </a:r>
+              <a:endParaRPr lang="LID4096" sz="1400" dirty="0"/>
+            </a:p>
+          </p:txBody>
+        </p:sp>
+        <p:sp>
+          <p:nvSpPr>
+            <p:cNvPr id="30" name="Rectangle 29">
+              <a:extLst>
+                <a:ext uri="{FF2B5EF4-FFF2-40B4-BE49-F238E27FC236}">
+                  <a16:creationId xmlns:a16="http://schemas.microsoft.com/office/drawing/2014/main" id="{3CE46EBD-1B8A-4402-9903-309697F6DAB6}"/>
+                </a:ext>
+              </a:extLst>
+            </p:cNvPr>
+            <p:cNvSpPr/>
+            <p:nvPr/>
+          </p:nvSpPr>
+          <p:spPr>
+            <a:xfrm>
+              <a:off x="666904" y="4016045"/>
+              <a:ext cx="3124910" cy="436315"/>
+            </a:xfrm>
+            <a:prstGeom prst="rect">
+              <a:avLst/>
+            </a:prstGeom>
+            <a:solidFill>
+              <a:schemeClr val="accent6">
+                <a:lumMod val="20000"/>
+                <a:lumOff val="80000"/>
+              </a:schemeClr>
+            </a:solidFill>
+          </p:spPr>
+          <p:style>
+            <a:lnRef idx="2">
+              <a:schemeClr val="dk1"/>
+            </a:lnRef>
+            <a:fillRef idx="1">
+              <a:schemeClr val="lt1"/>
+            </a:fillRef>
+            <a:effectRef idx="0">
+              <a:schemeClr val="dk1"/>
+            </a:effectRef>
+            <a:fontRef idx="minor">
+              <a:schemeClr val="dk1"/>
+            </a:fontRef>
+          </p:style>
+          <p:txBody>
+            <a:bodyPr rtlCol="0" anchor="ctr"/>
+            <a:lstStyle/>
+            <a:p>
+              <a:pPr algn="ctr"/>
+              <a:r>
+                <a:rPr lang="en-US" sz="1400" dirty="0"/>
+                <a:t>Prometheus Scraping Endpoint</a:t>
+              </a:r>
+              <a:endParaRPr lang="LID4096" sz="1400" dirty="0"/>
+            </a:p>
+          </p:txBody>
+        </p:sp>
+      </p:grpSp>
+      <p:sp>
+        <p:nvSpPr>
+          <p:cNvPr id="32" name="Rectangle 31">
+            <a:extLst>
+              <a:ext uri="{FF2B5EF4-FFF2-40B4-BE49-F238E27FC236}">
+                <a16:creationId xmlns:a16="http://schemas.microsoft.com/office/drawing/2014/main" id="{666A5BDC-DA69-41AC-98A2-77FA8BC41241}"/>
+              </a:ext>
+            </a:extLst>
+          </p:cNvPr>
+          <p:cNvSpPr/>
+          <p:nvPr/>
+        </p:nvSpPr>
+        <p:spPr>
+          <a:xfrm>
+            <a:off x="8079250" y="2375811"/>
+            <a:ext cx="3466222" cy="2145322"/>
+          </a:xfrm>
+          <a:prstGeom prst="rect">
+            <a:avLst/>
+          </a:prstGeom>
+          <a:solidFill>
+            <a:schemeClr val="bg1"/>
+          </a:solidFill>
+        </p:spPr>
+        <p:style>
+          <a:lnRef idx="2">
+            <a:schemeClr val="dk1"/>
+          </a:lnRef>
+          <a:fillRef idx="1">
+            <a:schemeClr val="lt1"/>
+          </a:fillRef>
+          <a:effectRef idx="0">
+            <a:schemeClr val="dk1"/>
+          </a:effectRef>
+          <a:fontRef idx="minor">
+            <a:schemeClr val="dk1"/>
+          </a:fontRef>
+        </p:style>
+        <p:txBody>
+          <a:bodyPr rtlCol="0" anchor="t"/>
+          <a:lstStyle/>
+          <a:p>
+            <a:pPr algn="ctr"/>
+            <a:r>
+              <a:rPr lang="en-US" b="1" dirty="0"/>
+              <a:t>Resource Discovery </a:t>
+            </a:r>
+            <a:r>
+              <a:rPr lang="en-US" dirty="0"/>
+              <a:t>Agent</a:t>
+            </a:r>
+            <a:endParaRPr lang="LID4096" dirty="0"/>
+          </a:p>
+        </p:txBody>
+      </p:sp>
+      <p:sp>
+        <p:nvSpPr>
+          <p:cNvPr id="33" name="Rectangle 32">
+            <a:extLst>
+              <a:ext uri="{FF2B5EF4-FFF2-40B4-BE49-F238E27FC236}">
+                <a16:creationId xmlns:a16="http://schemas.microsoft.com/office/drawing/2014/main" id="{B208B3B0-3CA5-4161-A641-7F21FD31E1D8}"/>
+              </a:ext>
+            </a:extLst>
+          </p:cNvPr>
+          <p:cNvSpPr/>
+          <p:nvPr/>
+        </p:nvSpPr>
+        <p:spPr>
+          <a:xfrm>
+            <a:off x="8271162" y="2848232"/>
+            <a:ext cx="3124910" cy="436315"/>
+          </a:xfrm>
+          <a:prstGeom prst="rect">
+            <a:avLst/>
+          </a:prstGeom>
+          <a:solidFill>
+            <a:schemeClr val="accent6">
+              <a:lumMod val="20000"/>
+              <a:lumOff val="80000"/>
+            </a:schemeClr>
+          </a:solidFill>
+        </p:spPr>
+        <p:style>
+          <a:lnRef idx="2">
+            <a:schemeClr val="dk1"/>
+          </a:lnRef>
+          <a:fillRef idx="1">
+            <a:schemeClr val="lt1"/>
+          </a:fillRef>
+          <a:effectRef idx="0">
+            <a:schemeClr val="dk1"/>
+          </a:effectRef>
+          <a:fontRef idx="minor">
+            <a:schemeClr val="dk1"/>
+          </a:fontRef>
+        </p:style>
+        <p:txBody>
+          <a:bodyPr rtlCol="0" anchor="ctr"/>
+          <a:lstStyle/>
+          <a:p>
+            <a:pPr algn="ctr"/>
+            <a:r>
+              <a:rPr lang="en-US" sz="1400" dirty="0"/>
+              <a:t>REST API</a:t>
+            </a:r>
+            <a:endParaRPr lang="LID4096" sz="1400" dirty="0"/>
+          </a:p>
+        </p:txBody>
+      </p:sp>
+      <p:sp>
+        <p:nvSpPr>
+          <p:cNvPr id="34" name="Rectangle 33">
+            <a:extLst>
+              <a:ext uri="{FF2B5EF4-FFF2-40B4-BE49-F238E27FC236}">
+                <a16:creationId xmlns:a16="http://schemas.microsoft.com/office/drawing/2014/main" id="{41EF30AE-824D-49C1-B328-22091875186C}"/>
+              </a:ext>
+            </a:extLst>
+          </p:cNvPr>
+          <p:cNvSpPr/>
+          <p:nvPr/>
+        </p:nvSpPr>
+        <p:spPr>
+          <a:xfrm>
+            <a:off x="8271161" y="3389798"/>
+            <a:ext cx="3124912" cy="436315"/>
+          </a:xfrm>
+          <a:prstGeom prst="rect">
+            <a:avLst/>
+          </a:prstGeom>
+          <a:solidFill>
+            <a:schemeClr val="accent6">
+              <a:lumMod val="20000"/>
+              <a:lumOff val="80000"/>
+            </a:schemeClr>
+          </a:solidFill>
+        </p:spPr>
+        <p:style>
+          <a:lnRef idx="2">
+            <a:schemeClr val="dk1"/>
+          </a:lnRef>
+          <a:fillRef idx="1">
+            <a:schemeClr val="lt1"/>
+          </a:fillRef>
+          <a:effectRef idx="0">
+            <a:schemeClr val="dk1"/>
+          </a:effectRef>
+          <a:fontRef idx="minor">
+            <a:schemeClr val="dk1"/>
+          </a:fontRef>
+        </p:style>
+        <p:txBody>
+          <a:bodyPr rtlCol="0" anchor="ctr"/>
+          <a:lstStyle/>
+          <a:p>
+            <a:pPr algn="ctr"/>
+            <a:r>
+              <a:rPr lang="en-US" sz="1400" dirty="0"/>
+              <a:t>Discovery background jobs </a:t>
+            </a:r>
+            <a:r>
+              <a:rPr lang="en-US" sz="1400" baseline="30000" dirty="0"/>
+              <a:t>(*)</a:t>
+            </a:r>
+            <a:endParaRPr lang="LID4096" sz="1400" baseline="30000" dirty="0"/>
+          </a:p>
+        </p:txBody>
+      </p:sp>
+      <p:cxnSp>
+        <p:nvCxnSpPr>
+          <p:cNvPr id="23" name="Straight Arrow Connector 22">
+            <a:extLst>
+              <a:ext uri="{FF2B5EF4-FFF2-40B4-BE49-F238E27FC236}">
+                <a16:creationId xmlns:a16="http://schemas.microsoft.com/office/drawing/2014/main" id="{90B36813-BA04-460B-8E82-BEDD95FA2500}"/>
+              </a:ext>
+            </a:extLst>
+          </p:cNvPr>
+          <p:cNvCxnSpPr>
+            <a:cxnSpLocks/>
+            <a:stCxn id="28" idx="3"/>
+            <a:endCxn id="33" idx="1"/>
+          </p:cNvCxnSpPr>
+          <p:nvPr/>
+        </p:nvCxnSpPr>
+        <p:spPr>
+          <a:xfrm flipV="1">
+            <a:off x="6346139" y="3066390"/>
+            <a:ext cx="1925023" cy="1083690"/>
+          </a:xfrm>
+          <a:prstGeom prst="bentConnector3">
+            <a:avLst>
+              <a:gd name="adj1" fmla="val 50000"/>
+            </a:avLst>
+          </a:prstGeom>
+          <a:ln>
+            <a:prstDash val="sysDash"/>
+            <a:tailEnd type="triangle"/>
+          </a:ln>
+        </p:spPr>
+        <p:style>
+          <a:lnRef idx="1">
+            <a:schemeClr val="dk1"/>
+          </a:lnRef>
+          <a:fillRef idx="0">
+            <a:schemeClr val="dk1"/>
+          </a:fillRef>
+          <a:effectRef idx="0">
+            <a:schemeClr val="dk1"/>
+          </a:effectRef>
+          <a:fontRef idx="minor">
+            <a:schemeClr val="tx1"/>
+          </a:fontRef>
+        </p:style>
+      </p:cxnSp>
+    </p:spTree>
+    <p:extLst>
+      <p:ext uri="{BB962C8B-B14F-4D97-AF65-F5344CB8AC3E}">
+        <p14:creationId xmlns:p14="http://schemas.microsoft.com/office/powerpoint/2010/main" val="2206080305"/>
+      </p:ext>
+    </p:extLst>
+  </p:cSld>
+  <p:clrMapOvr>
+    <a:masterClrMapping/>
+  </p:clrMapOvr>
+</p:sld>
+</file>
+
+<file path=ppt/slides/slide5.xml><?xml version="1.0" encoding="utf-8"?>
+<p:sld xmlns:a="http://schemas.openxmlformats.org/drawingml/2006/main" xmlns:r="http://schemas.openxmlformats.org/officeDocument/2006/relationships" xmlns:p="http://schemas.openxmlformats.org/presentationml/2006/main">
+  <p:cSld>
+    <p:spTree>
+      <p:nvGrpSpPr>
+        <p:cNvPr id="1" name=""/>
+        <p:cNvGrpSpPr/>
+        <p:nvPr/>
+      </p:nvGrpSpPr>
+      <p:grpSpPr>
+        <a:xfrm>
+          <a:off x="0" y="0"/>
+          <a:ext cx="0" cy="0"/>
+          <a:chOff x="0" y="0"/>
+          <a:chExt cx="0" cy="0"/>
+        </a:xfrm>
+      </p:grpSpPr>
+      <p:pic>
+        <p:nvPicPr>
+          <p:cNvPr id="1026" name="Picture 2" descr="StatsD Logo | Logos, Tech logos, Gaming logos">
+            <a:extLst>
+              <a:ext uri="{FF2B5EF4-FFF2-40B4-BE49-F238E27FC236}">
+                <a16:creationId xmlns:a16="http://schemas.microsoft.com/office/drawing/2014/main" id="{470DAB4B-EB50-4C7D-AB0C-3A498CAB9764}"/>
+              </a:ext>
+            </a:extLst>
+          </p:cNvPr>
+          <p:cNvPicPr>
+            <a:picLocks noChangeAspect="1" noChangeArrowheads="1"/>
+          </p:cNvPicPr>
+          <p:nvPr/>
+        </p:nvPicPr>
+        <p:blipFill rotWithShape="1">
+          <a:blip r:embed="rId2">
+            <a:extLst>
+              <a:ext uri="{28A0092B-C50C-407E-A947-70E740481C1C}">
+                <a14:useLocalDpi xmlns:a14="http://schemas.microsoft.com/office/drawing/2010/main" val="0"/>
+              </a:ext>
+            </a:extLst>
+          </a:blip>
+          <a:srcRect l="9765" t="27530" r="10000" b="26543"/>
+          <a:stretch/>
+        </p:blipFill>
+        <p:spPr bwMode="auto">
+          <a:xfrm>
+            <a:off x="1612901" y="677539"/>
+            <a:ext cx="2308860" cy="839586"/>
+          </a:xfrm>
+          <a:prstGeom prst="rect">
+            <a:avLst/>
+          </a:prstGeom>
+          <a:noFill/>
+          <a:extLst>
+            <a:ext uri="{909E8E84-426E-40DD-AFC4-6F175D3DCCD1}">
+              <a14:hiddenFill xmlns:a14="http://schemas.microsoft.com/office/drawing/2010/main">
+                <a:solidFill>
+                  <a:srgbClr val="FFFFFF"/>
+                </a:solidFill>
+              </a14:hiddenFill>
+            </a:ext>
+          </a:extLst>
+        </p:spPr>
+      </p:pic>
+      <p:pic>
+        <p:nvPicPr>
+          <p:cNvPr id="1028" name="Picture 4" descr="Statuspage | Atlassian">
+            <a:extLst>
+              <a:ext uri="{FF2B5EF4-FFF2-40B4-BE49-F238E27FC236}">
+                <a16:creationId xmlns:a16="http://schemas.microsoft.com/office/drawing/2014/main" id="{31914B54-1771-403D-AD53-037D501A61D0}"/>
+              </a:ext>
+            </a:extLst>
+          </p:cNvPr>
+          <p:cNvPicPr>
+            <a:picLocks noChangeAspect="1" noChangeArrowheads="1"/>
+          </p:cNvPicPr>
+          <p:nvPr/>
+        </p:nvPicPr>
+        <p:blipFill>
+          <a:blip r:embed="rId3">
+            <a:extLst>
+              <a:ext uri="{28A0092B-C50C-407E-A947-70E740481C1C}">
+                <a14:useLocalDpi xmlns:a14="http://schemas.microsoft.com/office/drawing/2010/main" val="0"/>
+              </a:ext>
+            </a:extLst>
+          </a:blip>
+          <a:srcRect/>
+          <a:stretch>
+            <a:fillRect/>
+          </a:stretch>
+        </p:blipFill>
+        <p:spPr bwMode="auto">
+          <a:xfrm>
+            <a:off x="4704082" y="849259"/>
+            <a:ext cx="3312160" cy="480342"/>
+          </a:xfrm>
+          <a:prstGeom prst="rect">
+            <a:avLst/>
+          </a:prstGeom>
+          <a:noFill/>
+          <a:extLst>
+            <a:ext uri="{909E8E84-426E-40DD-AFC4-6F175D3DCCD1}">
+              <a14:hiddenFill xmlns:a14="http://schemas.microsoft.com/office/drawing/2010/main">
+                <a:solidFill>
+                  <a:srgbClr val="FFFFFF"/>
+                </a:solidFill>
+              </a14:hiddenFill>
+            </a:ext>
+          </a:extLst>
+        </p:spPr>
+      </p:pic>
+      <p:pic>
+        <p:nvPicPr>
+          <p:cNvPr id="1032" name="Picture 8">
+            <a:extLst>
+              <a:ext uri="{FF2B5EF4-FFF2-40B4-BE49-F238E27FC236}">
+                <a16:creationId xmlns:a16="http://schemas.microsoft.com/office/drawing/2014/main" id="{22B0F493-77C7-4171-AAEE-F756BB880245}"/>
+              </a:ext>
+            </a:extLst>
+          </p:cNvPr>
+          <p:cNvPicPr>
+            <a:picLocks noChangeAspect="1" noChangeArrowheads="1"/>
+          </p:cNvPicPr>
+          <p:nvPr/>
+        </p:nvPicPr>
+        <p:blipFill rotWithShape="1">
+          <a:blip r:embed="rId4">
+            <a:extLst>
+              <a:ext uri="{28A0092B-C50C-407E-A947-70E740481C1C}">
+                <a14:useLocalDpi xmlns:a14="http://schemas.microsoft.com/office/drawing/2010/main" val="0"/>
+              </a:ext>
+            </a:extLst>
+          </a:blip>
+          <a:srcRect l="1807" t="16125" r="4250" b="14397"/>
+          <a:stretch/>
+        </p:blipFill>
+        <p:spPr bwMode="auto">
+          <a:xfrm>
+            <a:off x="8798563" y="695380"/>
+            <a:ext cx="2438398" cy="803904"/>
+          </a:xfrm>
+          <a:prstGeom prst="rect">
+            <a:avLst/>
+          </a:prstGeom>
+          <a:noFill/>
+          <a:extLst>
+            <a:ext uri="{909E8E84-426E-40DD-AFC4-6F175D3DCCD1}">
+              <a14:hiddenFill xmlns:a14="http://schemas.microsoft.com/office/drawing/2010/main">
+                <a:solidFill>
+                  <a:srgbClr val="FFFFFF"/>
+                </a:solidFill>
+              </a14:hiddenFill>
+            </a:ext>
+          </a:extLst>
+        </p:spPr>
+      </p:pic>
+      <p:pic>
+        <p:nvPicPr>
+          <p:cNvPr id="8" name="Picture 2" descr="StatsD Logo | Logos, Tech logos, Gaming logos">
+            <a:extLst>
+              <a:ext uri="{FF2B5EF4-FFF2-40B4-BE49-F238E27FC236}">
+                <a16:creationId xmlns:a16="http://schemas.microsoft.com/office/drawing/2014/main" id="{A831F2BA-C1BF-45DD-A426-92DBB667254B}"/>
+              </a:ext>
+            </a:extLst>
+          </p:cNvPr>
+          <p:cNvPicPr>
+            <a:picLocks noChangeAspect="1" noChangeArrowheads="1"/>
+          </p:cNvPicPr>
+          <p:nvPr/>
+        </p:nvPicPr>
+        <p:blipFill rotWithShape="1">
+          <a:blip r:embed="rId2">
+            <a:extLst>
+              <a:ext uri="{28A0092B-C50C-407E-A947-70E740481C1C}">
+                <a14:useLocalDpi xmlns:a14="http://schemas.microsoft.com/office/drawing/2010/main" val="0"/>
+              </a:ext>
+            </a:extLst>
+          </a:blip>
+          <a:srcRect l="9765" t="27530" r="10000" b="26543"/>
+          <a:stretch/>
+        </p:blipFill>
+        <p:spPr bwMode="auto">
+          <a:xfrm>
+            <a:off x="3147061" y="3321832"/>
+            <a:ext cx="2308860" cy="839586"/>
+          </a:xfrm>
+          <a:prstGeom prst="rect">
+            <a:avLst/>
+          </a:prstGeom>
+          <a:noFill/>
+          <a:extLst>
+            <a:ext uri="{909E8E84-426E-40DD-AFC4-6F175D3DCCD1}">
+              <a14:hiddenFill xmlns:a14="http://schemas.microsoft.com/office/drawing/2010/main">
+                <a:solidFill>
+                  <a:srgbClr val="FFFFFF"/>
+                </a:solidFill>
+              </a14:hiddenFill>
+            </a:ext>
+          </a:extLst>
+        </p:spPr>
+      </p:pic>
+      <p:pic>
+        <p:nvPicPr>
+          <p:cNvPr id="9" name="Picture 4" descr="Statuspage | Atlassian">
+            <a:extLst>
+              <a:ext uri="{FF2B5EF4-FFF2-40B4-BE49-F238E27FC236}">
+                <a16:creationId xmlns:a16="http://schemas.microsoft.com/office/drawing/2014/main" id="{ED0E2EE6-F25D-4B8F-83AA-A9112BCEE768}"/>
+              </a:ext>
+            </a:extLst>
+          </p:cNvPr>
+          <p:cNvPicPr>
+            <a:picLocks noChangeAspect="1" noChangeArrowheads="1"/>
+          </p:cNvPicPr>
+          <p:nvPr/>
+        </p:nvPicPr>
+        <p:blipFill>
+          <a:blip r:embed="rId3">
+            <a:extLst>
+              <a:ext uri="{28A0092B-C50C-407E-A947-70E740481C1C}">
+                <a14:useLocalDpi xmlns:a14="http://schemas.microsoft.com/office/drawing/2010/main" val="0"/>
+              </a:ext>
+            </a:extLst>
+          </a:blip>
+          <a:srcRect/>
+          <a:stretch>
+            <a:fillRect/>
+          </a:stretch>
+        </p:blipFill>
+        <p:spPr bwMode="auto">
+          <a:xfrm>
+            <a:off x="4704082" y="2505338"/>
+            <a:ext cx="3312160" cy="480342"/>
+          </a:xfrm>
+          <a:prstGeom prst="rect">
+            <a:avLst/>
+          </a:prstGeom>
+          <a:noFill/>
+          <a:extLst>
+            <a:ext uri="{909E8E84-426E-40DD-AFC4-6F175D3DCCD1}">
+              <a14:hiddenFill xmlns:a14="http://schemas.microsoft.com/office/drawing/2010/main">
+                <a:solidFill>
+                  <a:srgbClr val="FFFFFF"/>
+                </a:solidFill>
+              </a14:hiddenFill>
+            </a:ext>
+          </a:extLst>
+        </p:spPr>
+      </p:pic>
+      <p:pic>
+        <p:nvPicPr>
+          <p:cNvPr id="10" name="Picture 8">
+            <a:extLst>
+              <a:ext uri="{FF2B5EF4-FFF2-40B4-BE49-F238E27FC236}">
+                <a16:creationId xmlns:a16="http://schemas.microsoft.com/office/drawing/2014/main" id="{CEDA630D-175A-4E24-AD69-628B82FF0939}"/>
+              </a:ext>
+            </a:extLst>
+          </p:cNvPr>
+          <p:cNvPicPr>
+            <a:picLocks noChangeAspect="1" noChangeArrowheads="1"/>
+          </p:cNvPicPr>
+          <p:nvPr/>
+        </p:nvPicPr>
+        <p:blipFill rotWithShape="1">
+          <a:blip r:embed="rId4">
+            <a:extLst>
+              <a:ext uri="{28A0092B-C50C-407E-A947-70E740481C1C}">
+                <a14:useLocalDpi xmlns:a14="http://schemas.microsoft.com/office/drawing/2010/main" val="0"/>
+              </a:ext>
+            </a:extLst>
+          </a:blip>
+          <a:srcRect l="1807" t="16125" r="4250" b="14397"/>
+          <a:stretch/>
+        </p:blipFill>
+        <p:spPr bwMode="auto">
+          <a:xfrm>
+            <a:off x="7579364" y="3339673"/>
+            <a:ext cx="2438398" cy="803904"/>
+          </a:xfrm>
+          <a:prstGeom prst="rect">
+            <a:avLst/>
+          </a:prstGeom>
+          <a:noFill/>
+          <a:extLst>
+            <a:ext uri="{909E8E84-426E-40DD-AFC4-6F175D3DCCD1}">
+              <a14:hiddenFill xmlns:a14="http://schemas.microsoft.com/office/drawing/2010/main">
+                <a:solidFill>
+                  <a:srgbClr val="FFFFFF"/>
+                </a:solidFill>
+              </a14:hiddenFill>
+            </a:ext>
+          </a:extLst>
+        </p:spPr>
+      </p:pic>
+      <p:pic>
+        <p:nvPicPr>
+          <p:cNvPr id="1034" name="Picture 10" descr="Azure Monitor (@AzureMonitor) | Twitter">
+            <a:extLst>
+              <a:ext uri="{FF2B5EF4-FFF2-40B4-BE49-F238E27FC236}">
+                <a16:creationId xmlns:a16="http://schemas.microsoft.com/office/drawing/2014/main" id="{BE549738-E6C4-4685-9964-8DC70C16E0A9}"/>
+              </a:ext>
+            </a:extLst>
+          </p:cNvPr>
+          <p:cNvPicPr>
+            <a:picLocks noChangeAspect="1" noChangeArrowheads="1"/>
+          </p:cNvPicPr>
+          <p:nvPr/>
+        </p:nvPicPr>
+        <p:blipFill>
+          <a:blip r:embed="rId5">
+            <a:extLst>
+              <a:ext uri="{28A0092B-C50C-407E-A947-70E740481C1C}">
+                <a14:useLocalDpi xmlns:a14="http://schemas.microsoft.com/office/drawing/2010/main" val="0"/>
+              </a:ext>
+            </a:extLst>
+          </a:blip>
+          <a:srcRect/>
+          <a:stretch>
+            <a:fillRect/>
+          </a:stretch>
+        </p:blipFill>
+        <p:spPr bwMode="auto">
+          <a:xfrm>
+            <a:off x="2408335" y="5120440"/>
             <a:ext cx="1270872" cy="1270872"/>
           </a:xfrm>
           <a:prstGeom prst="rect">
@@ -3762,6 +7039,51 @@
           <a:xfrm>
             <a:off x="9247606" y="5207395"/>
             <a:ext cx="1096963" cy="1096963"/>
+          </a:xfrm>
+          <a:prstGeom prst="rect">
+            <a:avLst/>
+          </a:prstGeom>
+          <a:noFill/>
+          <a:extLst>
+            <a:ext uri="{909E8E84-426E-40DD-AFC4-6F175D3DCCD1}">
+              <a14:hiddenFill xmlns:a14="http://schemas.microsoft.com/office/drawing/2010/main">
+                <a:solidFill>
+                  <a:srgbClr val="FFFFFF"/>
+                </a:solidFill>
+              </a14:hiddenFill>
+            </a:ext>
+          </a:extLst>
+        </p:spPr>
+      </p:pic>
+      <p:pic>
+        <p:nvPicPr>
+          <p:cNvPr id="11" name="Picture 2">
+            <a:extLst>
+              <a:ext uri="{FF2B5EF4-FFF2-40B4-BE49-F238E27FC236}">
+                <a16:creationId xmlns:a16="http://schemas.microsoft.com/office/drawing/2014/main" id="{5879FB01-FD1D-408F-9A27-CEA6917872EA}"/>
+              </a:ext>
+            </a:extLst>
+          </p:cNvPr>
+          <p:cNvPicPr>
+            <a:picLocks noChangeAspect="1" noChangeArrowheads="1"/>
+          </p:cNvPicPr>
+          <p:nvPr/>
+        </p:nvPicPr>
+        <p:blipFill rotWithShape="1">
+          <a:blip r:embed="rId9">
+            <a:extLst>
+              <a:ext uri="{28A0092B-C50C-407E-A947-70E740481C1C}">
+                <a14:useLocalDpi xmlns:a14="http://schemas.microsoft.com/office/drawing/2010/main" val="0"/>
+              </a:ext>
+            </a:extLst>
+          </a:blip>
+          <a:srcRect l="19124" r="19156"/>
+          <a:stretch/>
+        </p:blipFill>
+        <p:spPr bwMode="auto">
+          <a:xfrm>
+            <a:off x="465236" y="5154953"/>
+            <a:ext cx="1270872" cy="1081015"/>
           </a:xfrm>
           <a:prstGeom prst="rect">
             <a:avLst/>

</xml_diff>

<commit_message>
feat: Provide Traefik as local reverse proxy and allow "try it now" in Swagger UI (#1898)
</commit_message>
<xml_diff>
--- a/media/schematics/schematics.pptx
+++ b/media/schematics/schematics.pptx
@@ -9,7 +9,10 @@
     <p:sldId id="263" r:id="rId3"/>
     <p:sldId id="264" r:id="rId4"/>
     <p:sldId id="266" r:id="rId5"/>
-    <p:sldId id="256" r:id="rId6"/>
+    <p:sldId id="267" r:id="rId6"/>
+    <p:sldId id="268" r:id="rId7"/>
+    <p:sldId id="269" r:id="rId8"/>
+    <p:sldId id="256" r:id="rId9"/>
   </p:sldIdLst>
   <p:sldSz cx="12192000" cy="6858000"/>
   <p:notesSz cx="6858000" cy="9144000"/>
@@ -119,6 +122,13 @@
             <p14:sldId id="266"/>
           </p14:sldIdLst>
         </p14:section>
+        <p14:section name="Contribution Guide" id="{57E56ED9-F946-43EE-853E-F443A605ABB4}">
+          <p14:sldIdLst>
+            <p14:sldId id="267"/>
+            <p14:sldId id="268"/>
+            <p14:sldId id="269"/>
+          </p14:sldIdLst>
+        </p14:section>
         <p14:section name="Logos" id="{1FCCA3F7-6BF9-486B-941C-AFCB7516BE42}">
           <p14:sldIdLst>
             <p14:sldId id="256"/>
@@ -131,6 +141,594 @@
     </p:ext>
   </p:extLst>
 </p:presentation>
+</file>
+
+<file path=ppt/revisionInfo.xml><?xml version="1.0" encoding="utf-8"?>
+<p1510:revInfo xmlns:a="http://schemas.openxmlformats.org/drawingml/2006/main" xmlns:r="http://schemas.openxmlformats.org/officeDocument/2006/relationships" xmlns:p1510="http://schemas.microsoft.com/office/powerpoint/2015/10/main">
+  <p1510:revLst>
+    <p1510:client id="{DBBCF258-FD50-488A-9B54-B591352DA2AE}" v="65" dt="2021-12-21T07:11:38.486"/>
+  </p1510:revLst>
+</p1510:revInfo>
+</file>
+
+<file path=ppt/changesInfos/changesInfo1.xml><?xml version="1.0" encoding="utf-8"?>
+<pc:chgInfo xmlns:a="http://schemas.openxmlformats.org/drawingml/2006/main" xmlns:r="http://schemas.openxmlformats.org/officeDocument/2006/relationships" xmlns:ac="http://schemas.microsoft.com/office/drawing/2013/main/command" xmlns:pc="http://schemas.microsoft.com/office/powerpoint/2013/main/command">
+  <pc:docChgLst>
+    <pc:chgData name="Tom Kerkhove" userId="631ad559-0cf4-42cc-ad9f-9735c310d0d9" providerId="ADAL" clId="{DBBCF258-FD50-488A-9B54-B591352DA2AE}"/>
+    <pc:docChg chg="undo custSel addSld modSld modSection">
+      <pc:chgData name="Tom Kerkhove" userId="631ad559-0cf4-42cc-ad9f-9735c310d0d9" providerId="ADAL" clId="{DBBCF258-FD50-488A-9B54-B591352DA2AE}" dt="2021-12-21T07:11:38.485" v="305" actId="14826"/>
+      <pc:docMkLst>
+        <pc:docMk/>
+      </pc:docMkLst>
+      <pc:sldChg chg="addSp delSp modSp mod">
+        <pc:chgData name="Tom Kerkhove" userId="631ad559-0cf4-42cc-ad9f-9735c310d0d9" providerId="ADAL" clId="{DBBCF258-FD50-488A-9B54-B591352DA2AE}" dt="2021-12-21T07:11:05.736" v="295" actId="1076"/>
+        <pc:sldMkLst>
+          <pc:docMk/>
+          <pc:sldMk cId="1080269003" sldId="268"/>
+        </pc:sldMkLst>
+        <pc:spChg chg="mod">
+          <ac:chgData name="Tom Kerkhove" userId="631ad559-0cf4-42cc-ad9f-9735c310d0d9" providerId="ADAL" clId="{DBBCF258-FD50-488A-9B54-B591352DA2AE}" dt="2021-12-21T07:02:44.985" v="64" actId="1076"/>
+          <ac:spMkLst>
+            <pc:docMk/>
+            <pc:sldMk cId="1080269003" sldId="268"/>
+            <ac:spMk id="2" creationId="{DF1B8298-A232-4723-91AC-B3F08648AB3F}"/>
+          </ac:spMkLst>
+        </pc:spChg>
+        <pc:spChg chg="mod">
+          <ac:chgData name="Tom Kerkhove" userId="631ad559-0cf4-42cc-ad9f-9735c310d0d9" providerId="ADAL" clId="{DBBCF258-FD50-488A-9B54-B591352DA2AE}" dt="2021-12-21T07:02:44.985" v="64" actId="1076"/>
+          <ac:spMkLst>
+            <pc:docMk/>
+            <pc:sldMk cId="1080269003" sldId="268"/>
+            <ac:spMk id="3" creationId="{9C5E7D04-B76F-49FD-BFFC-F2BC06C62423}"/>
+          </ac:spMkLst>
+        </pc:spChg>
+        <pc:spChg chg="mod">
+          <ac:chgData name="Tom Kerkhove" userId="631ad559-0cf4-42cc-ad9f-9735c310d0d9" providerId="ADAL" clId="{DBBCF258-FD50-488A-9B54-B591352DA2AE}" dt="2021-12-21T07:02:44.985" v="64" actId="1076"/>
+          <ac:spMkLst>
+            <pc:docMk/>
+            <pc:sldMk cId="1080269003" sldId="268"/>
+            <ac:spMk id="6" creationId="{4315D58D-2286-4E77-B3B2-F97BE6A1D17A}"/>
+          </ac:spMkLst>
+        </pc:spChg>
+        <pc:spChg chg="mod">
+          <ac:chgData name="Tom Kerkhove" userId="631ad559-0cf4-42cc-ad9f-9735c310d0d9" providerId="ADAL" clId="{DBBCF258-FD50-488A-9B54-B591352DA2AE}" dt="2021-12-21T07:02:44.985" v="64" actId="1076"/>
+          <ac:spMkLst>
+            <pc:docMk/>
+            <pc:sldMk cId="1080269003" sldId="268"/>
+            <ac:spMk id="17" creationId="{A7536292-2517-4CBC-B5B2-F992F59E166F}"/>
+          </ac:spMkLst>
+        </pc:spChg>
+        <pc:spChg chg="mod">
+          <ac:chgData name="Tom Kerkhove" userId="631ad559-0cf4-42cc-ad9f-9735c310d0d9" providerId="ADAL" clId="{DBBCF258-FD50-488A-9B54-B591352DA2AE}" dt="2021-12-21T07:02:44.985" v="64" actId="1076"/>
+          <ac:spMkLst>
+            <pc:docMk/>
+            <pc:sldMk cId="1080269003" sldId="268"/>
+            <ac:spMk id="26" creationId="{659BE901-B66A-471D-A3A8-7BC43DEB9815}"/>
+          </ac:spMkLst>
+        </pc:spChg>
+        <pc:spChg chg="mod topLvl">
+          <ac:chgData name="Tom Kerkhove" userId="631ad559-0cf4-42cc-ad9f-9735c310d0d9" providerId="ADAL" clId="{DBBCF258-FD50-488A-9B54-B591352DA2AE}" dt="2021-12-21T07:02:44.985" v="64" actId="1076"/>
+          <ac:spMkLst>
+            <pc:docMk/>
+            <pc:sldMk cId="1080269003" sldId="268"/>
+            <ac:spMk id="47" creationId="{A56628AA-F737-46AE-AE30-500E0465EE2A}"/>
+          </ac:spMkLst>
+        </pc:spChg>
+        <pc:spChg chg="add del">
+          <ac:chgData name="Tom Kerkhove" userId="631ad559-0cf4-42cc-ad9f-9735c310d0d9" providerId="ADAL" clId="{DBBCF258-FD50-488A-9B54-B591352DA2AE}" dt="2021-12-21T06:59:52.041" v="11" actId="22"/>
+          <ac:spMkLst>
+            <pc:docMk/>
+            <pc:sldMk cId="1080269003" sldId="268"/>
+            <ac:spMk id="61" creationId="{6980AF1D-B41D-4D0A-88EE-1F75AF483110}"/>
+          </ac:spMkLst>
+        </pc:spChg>
+        <pc:spChg chg="add mod">
+          <ac:chgData name="Tom Kerkhove" userId="631ad559-0cf4-42cc-ad9f-9735c310d0d9" providerId="ADAL" clId="{DBBCF258-FD50-488A-9B54-B591352DA2AE}" dt="2021-12-21T07:02:44.985" v="64" actId="1076"/>
+          <ac:spMkLst>
+            <pc:docMk/>
+            <pc:sldMk cId="1080269003" sldId="268"/>
+            <ac:spMk id="62" creationId="{C8FE18F7-21AE-4DA8-BA9C-41186F831A55}"/>
+          </ac:spMkLst>
+        </pc:spChg>
+        <pc:spChg chg="add mod">
+          <ac:chgData name="Tom Kerkhove" userId="631ad559-0cf4-42cc-ad9f-9735c310d0d9" providerId="ADAL" clId="{DBBCF258-FD50-488A-9B54-B591352DA2AE}" dt="2021-12-21T07:02:44.985" v="64" actId="1076"/>
+          <ac:spMkLst>
+            <pc:docMk/>
+            <pc:sldMk cId="1080269003" sldId="268"/>
+            <ac:spMk id="63" creationId="{80759581-330F-420A-AB2F-CC14DB746802}"/>
+          </ac:spMkLst>
+        </pc:spChg>
+        <pc:spChg chg="mod">
+          <ac:chgData name="Tom Kerkhove" userId="631ad559-0cf4-42cc-ad9f-9735c310d0d9" providerId="ADAL" clId="{DBBCF258-FD50-488A-9B54-B591352DA2AE}" dt="2021-12-21T07:02:59.277" v="83" actId="1035"/>
+          <ac:spMkLst>
+            <pc:docMk/>
+            <pc:sldMk cId="1080269003" sldId="268"/>
+            <ac:spMk id="94" creationId="{0B04B98B-0879-4444-9912-A0C3AEDAF3B7}"/>
+          </ac:spMkLst>
+        </pc:spChg>
+        <pc:spChg chg="mod">
+          <ac:chgData name="Tom Kerkhove" userId="631ad559-0cf4-42cc-ad9f-9735c310d0d9" providerId="ADAL" clId="{DBBCF258-FD50-488A-9B54-B591352DA2AE}" dt="2021-12-21T07:02:59.277" v="83" actId="1035"/>
+          <ac:spMkLst>
+            <pc:docMk/>
+            <pc:sldMk cId="1080269003" sldId="268"/>
+            <ac:spMk id="97" creationId="{56B263F7-B210-4406-98C7-AABD2FECF3FF}"/>
+          </ac:spMkLst>
+        </pc:spChg>
+        <pc:spChg chg="add mod">
+          <ac:chgData name="Tom Kerkhove" userId="631ad559-0cf4-42cc-ad9f-9735c310d0d9" providerId="ADAL" clId="{DBBCF258-FD50-488A-9B54-B591352DA2AE}" dt="2021-12-21T07:11:05.736" v="295" actId="1076"/>
+          <ac:spMkLst>
+            <pc:docMk/>
+            <pc:sldMk cId="1080269003" sldId="268"/>
+            <ac:spMk id="114" creationId="{953929AF-FF2C-4F68-826C-B563E8CDFD0A}"/>
+          </ac:spMkLst>
+        </pc:spChg>
+        <pc:spChg chg="add mod">
+          <ac:chgData name="Tom Kerkhove" userId="631ad559-0cf4-42cc-ad9f-9735c310d0d9" providerId="ADAL" clId="{DBBCF258-FD50-488A-9B54-B591352DA2AE}" dt="2021-12-21T07:11:03.315" v="294" actId="1076"/>
+          <ac:spMkLst>
+            <pc:docMk/>
+            <pc:sldMk cId="1080269003" sldId="268"/>
+            <ac:spMk id="116" creationId="{E13A2D58-F236-4ACA-B066-3EBFEE541FDF}"/>
+          </ac:spMkLst>
+        </pc:spChg>
+        <pc:spChg chg="add del">
+          <ac:chgData name="Tom Kerkhove" userId="631ad559-0cf4-42cc-ad9f-9735c310d0d9" providerId="ADAL" clId="{DBBCF258-FD50-488A-9B54-B591352DA2AE}" dt="2021-12-21T07:10:53.771" v="291" actId="478"/>
+          <ac:spMkLst>
+            <pc:docMk/>
+            <pc:sldMk cId="1080269003" sldId="268"/>
+            <ac:spMk id="118" creationId="{922D3623-B9B3-4BDF-956D-25CB18B9A34F}"/>
+          </ac:spMkLst>
+        </pc:spChg>
+        <pc:spChg chg="add del">
+          <ac:chgData name="Tom Kerkhove" userId="631ad559-0cf4-42cc-ad9f-9735c310d0d9" providerId="ADAL" clId="{DBBCF258-FD50-488A-9B54-B591352DA2AE}" dt="2021-12-21T07:10:53.771" v="291" actId="478"/>
+          <ac:spMkLst>
+            <pc:docMk/>
+            <pc:sldMk cId="1080269003" sldId="268"/>
+            <ac:spMk id="120" creationId="{C190579F-EA04-4CBA-9C1C-A97CFE1017F6}"/>
+          </ac:spMkLst>
+        </pc:spChg>
+        <pc:grpChg chg="mod topLvl">
+          <ac:chgData name="Tom Kerkhove" userId="631ad559-0cf4-42cc-ad9f-9735c310d0d9" providerId="ADAL" clId="{DBBCF258-FD50-488A-9B54-B591352DA2AE}" dt="2021-12-21T07:02:44.985" v="64" actId="1076"/>
+          <ac:grpSpMkLst>
+            <pc:docMk/>
+            <pc:sldMk cId="1080269003" sldId="268"/>
+            <ac:grpSpMk id="45" creationId="{EBC70A22-5AF3-4819-8498-7E8EED3D95E9}"/>
+          </ac:grpSpMkLst>
+        </pc:grpChg>
+        <pc:grpChg chg="del">
+          <ac:chgData name="Tom Kerkhove" userId="631ad559-0cf4-42cc-ad9f-9735c310d0d9" providerId="ADAL" clId="{DBBCF258-FD50-488A-9B54-B591352DA2AE}" dt="2021-12-21T06:59:46.361" v="7" actId="165"/>
+          <ac:grpSpMkLst>
+            <pc:docMk/>
+            <pc:sldMk cId="1080269003" sldId="268"/>
+            <ac:grpSpMk id="52" creationId="{8897269E-6536-4CEB-8017-FAACB2C9DAAF}"/>
+          </ac:grpSpMkLst>
+        </pc:grpChg>
+        <pc:grpChg chg="mod">
+          <ac:chgData name="Tom Kerkhove" userId="631ad559-0cf4-42cc-ad9f-9735c310d0d9" providerId="ADAL" clId="{DBBCF258-FD50-488A-9B54-B591352DA2AE}" dt="2021-12-21T07:02:44.985" v="64" actId="1076"/>
+          <ac:grpSpMkLst>
+            <pc:docMk/>
+            <pc:sldMk cId="1080269003" sldId="268"/>
+            <ac:grpSpMk id="53" creationId="{E6119613-5F28-443B-8BB1-42A6D38E7916}"/>
+          </ac:grpSpMkLst>
+        </pc:grpChg>
+        <pc:grpChg chg="del mod">
+          <ac:chgData name="Tom Kerkhove" userId="631ad559-0cf4-42cc-ad9f-9735c310d0d9" providerId="ADAL" clId="{DBBCF258-FD50-488A-9B54-B591352DA2AE}" dt="2021-12-21T07:10:32.453" v="268" actId="478"/>
+          <ac:grpSpMkLst>
+            <pc:docMk/>
+            <pc:sldMk cId="1080269003" sldId="268"/>
+            <ac:grpSpMk id="54" creationId="{FDB13242-B4D1-4371-97FE-9D20C0208857}"/>
+          </ac:grpSpMkLst>
+        </pc:grpChg>
+        <pc:grpChg chg="add mod">
+          <ac:chgData name="Tom Kerkhove" userId="631ad559-0cf4-42cc-ad9f-9735c310d0d9" providerId="ADAL" clId="{DBBCF258-FD50-488A-9B54-B591352DA2AE}" dt="2021-12-21T07:02:44.985" v="64" actId="1076"/>
+          <ac:grpSpMkLst>
+            <pc:docMk/>
+            <pc:sldMk cId="1080269003" sldId="268"/>
+            <ac:grpSpMk id="65" creationId="{3CBE6387-19D3-4EF3-A0A0-F413876942F7}"/>
+          </ac:grpSpMkLst>
+        </pc:grpChg>
+        <pc:grpChg chg="add mod">
+          <ac:chgData name="Tom Kerkhove" userId="631ad559-0cf4-42cc-ad9f-9735c310d0d9" providerId="ADAL" clId="{DBBCF258-FD50-488A-9B54-B591352DA2AE}" dt="2021-12-21T07:02:59.277" v="83" actId="1035"/>
+          <ac:grpSpMkLst>
+            <pc:docMk/>
+            <pc:sldMk cId="1080269003" sldId="268"/>
+            <ac:grpSpMk id="92" creationId="{77F1662A-51A6-4CB4-B688-9A6EDD68D55E}"/>
+          </ac:grpSpMkLst>
+        </pc:grpChg>
+        <pc:grpChg chg="add mod">
+          <ac:chgData name="Tom Kerkhove" userId="631ad559-0cf4-42cc-ad9f-9735c310d0d9" providerId="ADAL" clId="{DBBCF258-FD50-488A-9B54-B591352DA2AE}" dt="2021-12-21T07:02:59.277" v="83" actId="1035"/>
+          <ac:grpSpMkLst>
+            <pc:docMk/>
+            <pc:sldMk cId="1080269003" sldId="268"/>
+            <ac:grpSpMk id="95" creationId="{1650958C-4DF8-4B3A-A217-7521C08CA5E9}"/>
+          </ac:grpSpMkLst>
+        </pc:grpChg>
+        <pc:picChg chg="mod">
+          <ac:chgData name="Tom Kerkhove" userId="631ad559-0cf4-42cc-ad9f-9735c310d0d9" providerId="ADAL" clId="{DBBCF258-FD50-488A-9B54-B591352DA2AE}" dt="2021-12-21T07:02:44.985" v="64" actId="1076"/>
+          <ac:picMkLst>
+            <pc:docMk/>
+            <pc:sldMk cId="1080269003" sldId="268"/>
+            <ac:picMk id="9" creationId="{ED0E2EE6-F25D-4B8F-83AA-A9112BCEE768}"/>
+          </ac:picMkLst>
+        </pc:picChg>
+        <pc:picChg chg="mod">
+          <ac:chgData name="Tom Kerkhove" userId="631ad559-0cf4-42cc-ad9f-9735c310d0d9" providerId="ADAL" clId="{DBBCF258-FD50-488A-9B54-B591352DA2AE}" dt="2021-12-21T07:02:44.985" v="64" actId="1076"/>
+          <ac:picMkLst>
+            <pc:docMk/>
+            <pc:sldMk cId="1080269003" sldId="268"/>
+            <ac:picMk id="10" creationId="{CEDA630D-175A-4E24-AD69-628B82FF0939}"/>
+          </ac:picMkLst>
+        </pc:picChg>
+        <pc:picChg chg="mod">
+          <ac:chgData name="Tom Kerkhove" userId="631ad559-0cf4-42cc-ad9f-9735c310d0d9" providerId="ADAL" clId="{DBBCF258-FD50-488A-9B54-B591352DA2AE}" dt="2021-12-21T07:02:44.985" v="64" actId="1076"/>
+          <ac:picMkLst>
+            <pc:docMk/>
+            <pc:sldMk cId="1080269003" sldId="268"/>
+            <ac:picMk id="29" creationId="{CD4A43BB-6989-448C-B653-C938D6228EE1}"/>
+          </ac:picMkLst>
+        </pc:picChg>
+        <pc:picChg chg="add mod">
+          <ac:chgData name="Tom Kerkhove" userId="631ad559-0cf4-42cc-ad9f-9735c310d0d9" providerId="ADAL" clId="{DBBCF258-FD50-488A-9B54-B591352DA2AE}" dt="2021-12-21T07:10:46.981" v="288" actId="1076"/>
+          <ac:picMkLst>
+            <pc:docMk/>
+            <pc:sldMk cId="1080269003" sldId="268"/>
+            <ac:picMk id="56" creationId="{9D637B57-5981-459B-AC54-94A8AEDD67BA}"/>
+          </ac:picMkLst>
+        </pc:picChg>
+        <pc:picChg chg="mod">
+          <ac:chgData name="Tom Kerkhove" userId="631ad559-0cf4-42cc-ad9f-9735c310d0d9" providerId="ADAL" clId="{DBBCF258-FD50-488A-9B54-B591352DA2AE}" dt="2021-12-21T07:02:59.277" v="83" actId="1035"/>
+          <ac:picMkLst>
+            <pc:docMk/>
+            <pc:sldMk cId="1080269003" sldId="268"/>
+            <ac:picMk id="93" creationId="{8A243155-9046-40A7-AD57-0C899B9361BC}"/>
+          </ac:picMkLst>
+        </pc:picChg>
+        <pc:picChg chg="mod">
+          <ac:chgData name="Tom Kerkhove" userId="631ad559-0cf4-42cc-ad9f-9735c310d0d9" providerId="ADAL" clId="{DBBCF258-FD50-488A-9B54-B591352DA2AE}" dt="2021-12-21T07:02:59.277" v="83" actId="1035"/>
+          <ac:picMkLst>
+            <pc:docMk/>
+            <pc:sldMk cId="1080269003" sldId="268"/>
+            <ac:picMk id="96" creationId="{2ADDDB2F-C460-4EDE-A1BC-55A87092B731}"/>
+          </ac:picMkLst>
+        </pc:picChg>
+        <pc:picChg chg="mod">
+          <ac:chgData name="Tom Kerkhove" userId="631ad559-0cf4-42cc-ad9f-9735c310d0d9" providerId="ADAL" clId="{DBBCF258-FD50-488A-9B54-B591352DA2AE}" dt="2021-12-21T07:02:44.985" v="64" actId="1076"/>
+          <ac:picMkLst>
+            <pc:docMk/>
+            <pc:sldMk cId="1080269003" sldId="268"/>
+            <ac:picMk id="1026" creationId="{37F49E22-50A5-4C29-8965-69495B15B9FE}"/>
+          </ac:picMkLst>
+        </pc:picChg>
+        <pc:picChg chg="mod">
+          <ac:chgData name="Tom Kerkhove" userId="631ad559-0cf4-42cc-ad9f-9735c310d0d9" providerId="ADAL" clId="{DBBCF258-FD50-488A-9B54-B591352DA2AE}" dt="2021-12-21T07:02:44.985" v="64" actId="1076"/>
+          <ac:picMkLst>
+            <pc:docMk/>
+            <pc:sldMk cId="1080269003" sldId="268"/>
+            <ac:picMk id="1028" creationId="{32E0A0BE-E810-4EF4-949E-10FFDC71E520}"/>
+          </ac:picMkLst>
+        </pc:picChg>
+        <pc:picChg chg="mod">
+          <ac:chgData name="Tom Kerkhove" userId="631ad559-0cf4-42cc-ad9f-9735c310d0d9" providerId="ADAL" clId="{DBBCF258-FD50-488A-9B54-B591352DA2AE}" dt="2021-12-21T07:02:44.985" v="64" actId="1076"/>
+          <ac:picMkLst>
+            <pc:docMk/>
+            <pc:sldMk cId="1080269003" sldId="268"/>
+            <ac:picMk id="1030" creationId="{046F0A51-BBB9-4F17-801A-69684EB923C7}"/>
+          </ac:picMkLst>
+        </pc:picChg>
+        <pc:cxnChg chg="mod">
+          <ac:chgData name="Tom Kerkhove" userId="631ad559-0cf4-42cc-ad9f-9735c310d0d9" providerId="ADAL" clId="{DBBCF258-FD50-488A-9B54-B591352DA2AE}" dt="2021-12-21T07:02:44.985" v="64" actId="1076"/>
+          <ac:cxnSpMkLst>
+            <pc:docMk/>
+            <pc:sldMk cId="1080269003" sldId="268"/>
+            <ac:cxnSpMk id="12" creationId="{0F1A70A0-68D7-4FBE-BD81-F87DCE8921F5}"/>
+          </ac:cxnSpMkLst>
+        </pc:cxnChg>
+        <pc:cxnChg chg="mod">
+          <ac:chgData name="Tom Kerkhove" userId="631ad559-0cf4-42cc-ad9f-9735c310d0d9" providerId="ADAL" clId="{DBBCF258-FD50-488A-9B54-B591352DA2AE}" dt="2021-12-21T07:02:44.985" v="64" actId="1076"/>
+          <ac:cxnSpMkLst>
+            <pc:docMk/>
+            <pc:sldMk cId="1080269003" sldId="268"/>
+            <ac:cxnSpMk id="15" creationId="{72E81A24-E430-47FF-BD31-773153BB2680}"/>
+          </ac:cxnSpMkLst>
+        </pc:cxnChg>
+        <pc:cxnChg chg="mod">
+          <ac:chgData name="Tom Kerkhove" userId="631ad559-0cf4-42cc-ad9f-9735c310d0d9" providerId="ADAL" clId="{DBBCF258-FD50-488A-9B54-B591352DA2AE}" dt="2021-12-21T07:02:44.985" v="64" actId="1076"/>
+          <ac:cxnSpMkLst>
+            <pc:docMk/>
+            <pc:sldMk cId="1080269003" sldId="268"/>
+            <ac:cxnSpMk id="21" creationId="{BAE1B440-87C8-4D06-8556-58FB14D17510}"/>
+          </ac:cxnSpMkLst>
+        </pc:cxnChg>
+        <pc:cxnChg chg="mod">
+          <ac:chgData name="Tom Kerkhove" userId="631ad559-0cf4-42cc-ad9f-9735c310d0d9" providerId="ADAL" clId="{DBBCF258-FD50-488A-9B54-B591352DA2AE}" dt="2021-12-21T07:02:44.985" v="64" actId="1076"/>
+          <ac:cxnSpMkLst>
+            <pc:docMk/>
+            <pc:sldMk cId="1080269003" sldId="268"/>
+            <ac:cxnSpMk id="23" creationId="{90B36813-BA04-460B-8E82-BEDD95FA2500}"/>
+          </ac:cxnSpMkLst>
+        </pc:cxnChg>
+        <pc:cxnChg chg="mod">
+          <ac:chgData name="Tom Kerkhove" userId="631ad559-0cf4-42cc-ad9f-9735c310d0d9" providerId="ADAL" clId="{DBBCF258-FD50-488A-9B54-B591352DA2AE}" dt="2021-12-21T07:02:44.985" v="64" actId="1076"/>
+          <ac:cxnSpMkLst>
+            <pc:docMk/>
+            <pc:sldMk cId="1080269003" sldId="268"/>
+            <ac:cxnSpMk id="27" creationId="{A6FE7C94-FF74-4A7C-9909-25DBF4CD6AC2}"/>
+          </ac:cxnSpMkLst>
+        </pc:cxnChg>
+        <pc:cxnChg chg="add del mod">
+          <ac:chgData name="Tom Kerkhove" userId="631ad559-0cf4-42cc-ad9f-9735c310d0d9" providerId="ADAL" clId="{DBBCF258-FD50-488A-9B54-B591352DA2AE}" dt="2021-12-21T07:10:35.101" v="272" actId="478"/>
+          <ac:cxnSpMkLst>
+            <pc:docMk/>
+            <pc:sldMk cId="1080269003" sldId="268"/>
+            <ac:cxnSpMk id="57" creationId="{5C1C2740-EC81-4A12-86FE-EC3ED67121EB}"/>
+          </ac:cxnSpMkLst>
+        </pc:cxnChg>
+        <pc:cxnChg chg="add del mod">
+          <ac:chgData name="Tom Kerkhove" userId="631ad559-0cf4-42cc-ad9f-9735c310d0d9" providerId="ADAL" clId="{DBBCF258-FD50-488A-9B54-B591352DA2AE}" dt="2021-12-21T07:10:32.968" v="269" actId="478"/>
+          <ac:cxnSpMkLst>
+            <pc:docMk/>
+            <pc:sldMk cId="1080269003" sldId="268"/>
+            <ac:cxnSpMk id="70" creationId="{DC7DB0CD-66E3-4BE6-9602-CFE20B344A6F}"/>
+          </ac:cxnSpMkLst>
+        </pc:cxnChg>
+        <pc:cxnChg chg="add del mod">
+          <ac:chgData name="Tom Kerkhove" userId="631ad559-0cf4-42cc-ad9f-9735c310d0d9" providerId="ADAL" clId="{DBBCF258-FD50-488A-9B54-B591352DA2AE}" dt="2021-12-21T07:10:34.221" v="271" actId="478"/>
+          <ac:cxnSpMkLst>
+            <pc:docMk/>
+            <pc:sldMk cId="1080269003" sldId="268"/>
+            <ac:cxnSpMk id="74" creationId="{0DBB484A-508A-4C5E-8A91-D592BB0C1810}"/>
+          </ac:cxnSpMkLst>
+        </pc:cxnChg>
+        <pc:cxnChg chg="add del mod">
+          <ac:chgData name="Tom Kerkhove" userId="631ad559-0cf4-42cc-ad9f-9735c310d0d9" providerId="ADAL" clId="{DBBCF258-FD50-488A-9B54-B591352DA2AE}" dt="2021-12-21T07:10:33.462" v="270" actId="478"/>
+          <ac:cxnSpMkLst>
+            <pc:docMk/>
+            <pc:sldMk cId="1080269003" sldId="268"/>
+            <ac:cxnSpMk id="78" creationId="{DE4D253F-F35B-459B-B318-955ABA6B579A}"/>
+          </ac:cxnSpMkLst>
+        </pc:cxnChg>
+        <pc:cxnChg chg="add del mod">
+          <ac:chgData name="Tom Kerkhove" userId="631ad559-0cf4-42cc-ad9f-9735c310d0d9" providerId="ADAL" clId="{DBBCF258-FD50-488A-9B54-B591352DA2AE}" dt="2021-12-21T07:02:19.933" v="55" actId="478"/>
+          <ac:cxnSpMkLst>
+            <pc:docMk/>
+            <pc:sldMk cId="1080269003" sldId="268"/>
+            <ac:cxnSpMk id="89" creationId="{547E7AF7-F5CF-4FB6-892B-07E1FA09D744}"/>
+          </ac:cxnSpMkLst>
+        </pc:cxnChg>
+        <pc:cxnChg chg="add mod">
+          <ac:chgData name="Tom Kerkhove" userId="631ad559-0cf4-42cc-ad9f-9735c310d0d9" providerId="ADAL" clId="{DBBCF258-FD50-488A-9B54-B591352DA2AE}" dt="2021-12-21T07:03:13.486" v="86" actId="693"/>
+          <ac:cxnSpMkLst>
+            <pc:docMk/>
+            <pc:sldMk cId="1080269003" sldId="268"/>
+            <ac:cxnSpMk id="91" creationId="{87B784F0-5D0E-4EBE-A1A3-5548CCCCE074}"/>
+          </ac:cxnSpMkLst>
+        </pc:cxnChg>
+        <pc:cxnChg chg="add mod">
+          <ac:chgData name="Tom Kerkhove" userId="631ad559-0cf4-42cc-ad9f-9735c310d0d9" providerId="ADAL" clId="{DBBCF258-FD50-488A-9B54-B591352DA2AE}" dt="2021-12-21T07:03:13.486" v="86" actId="693"/>
+          <ac:cxnSpMkLst>
+            <pc:docMk/>
+            <pc:sldMk cId="1080269003" sldId="268"/>
+            <ac:cxnSpMk id="102" creationId="{2A76A497-8EDD-4B51-A912-162817016642}"/>
+          </ac:cxnSpMkLst>
+        </pc:cxnChg>
+        <pc:cxnChg chg="add mod">
+          <ac:chgData name="Tom Kerkhove" userId="631ad559-0cf4-42cc-ad9f-9735c310d0d9" providerId="ADAL" clId="{DBBCF258-FD50-488A-9B54-B591352DA2AE}" dt="2021-12-21T07:11:00.712" v="293" actId="14100"/>
+          <ac:cxnSpMkLst>
+            <pc:docMk/>
+            <pc:sldMk cId="1080269003" sldId="268"/>
+            <ac:cxnSpMk id="112" creationId="{D55F0418-6C74-4193-A924-56B44736A4C2}"/>
+          </ac:cxnSpMkLst>
+        </pc:cxnChg>
+        <pc:cxnChg chg="add mod">
+          <ac:chgData name="Tom Kerkhove" userId="631ad559-0cf4-42cc-ad9f-9735c310d0d9" providerId="ADAL" clId="{DBBCF258-FD50-488A-9B54-B591352DA2AE}" dt="2021-12-21T07:10:57.553" v="292" actId="14100"/>
+          <ac:cxnSpMkLst>
+            <pc:docMk/>
+            <pc:sldMk cId="1080269003" sldId="268"/>
+            <ac:cxnSpMk id="113" creationId="{5615E08A-4816-411D-8A19-F10AC9E13CBD}"/>
+          </ac:cxnSpMkLst>
+        </pc:cxnChg>
+      </pc:sldChg>
+      <pc:sldChg chg="addSp delSp modSp add mod">
+        <pc:chgData name="Tom Kerkhove" userId="631ad559-0cf4-42cc-ad9f-9735c310d0d9" providerId="ADAL" clId="{DBBCF258-FD50-488A-9B54-B591352DA2AE}" dt="2021-12-21T07:11:38.485" v="305" actId="14826"/>
+        <pc:sldMkLst>
+          <pc:docMk/>
+          <pc:sldMk cId="136988369" sldId="269"/>
+        </pc:sldMkLst>
+        <pc:spChg chg="mod topLvl">
+          <ac:chgData name="Tom Kerkhove" userId="631ad559-0cf4-42cc-ad9f-9735c310d0d9" providerId="ADAL" clId="{DBBCF258-FD50-488A-9B54-B591352DA2AE}" dt="2021-12-21T07:06:18.738" v="159" actId="1076"/>
+          <ac:spMkLst>
+            <pc:docMk/>
+            <pc:sldMk cId="136988369" sldId="269"/>
+            <ac:spMk id="3" creationId="{9C5E7D04-B76F-49FD-BFFC-F2BC06C62423}"/>
+          </ac:spMkLst>
+        </pc:spChg>
+        <pc:spChg chg="add del mod">
+          <ac:chgData name="Tom Kerkhove" userId="631ad559-0cf4-42cc-ad9f-9735c310d0d9" providerId="ADAL" clId="{DBBCF258-FD50-488A-9B54-B591352DA2AE}" dt="2021-12-21T07:05:47.072" v="134" actId="478"/>
+          <ac:spMkLst>
+            <pc:docMk/>
+            <pc:sldMk cId="136988369" sldId="269"/>
+            <ac:spMk id="19" creationId="{2BBA7522-8BF0-4B41-BD86-556049CFBAFE}"/>
+          </ac:spMkLst>
+        </pc:spChg>
+        <pc:spChg chg="add mod">
+          <ac:chgData name="Tom Kerkhove" userId="631ad559-0cf4-42cc-ad9f-9735c310d0d9" providerId="ADAL" clId="{DBBCF258-FD50-488A-9B54-B591352DA2AE}" dt="2021-12-21T07:06:55.581" v="193" actId="20577"/>
+          <ac:spMkLst>
+            <pc:docMk/>
+            <pc:sldMk cId="136988369" sldId="269"/>
+            <ac:spMk id="22" creationId="{06E9F5EF-EFB5-478D-A539-64DB3C53FD14}"/>
+          </ac:spMkLst>
+        </pc:spChg>
+        <pc:spChg chg="add mod">
+          <ac:chgData name="Tom Kerkhove" userId="631ad559-0cf4-42cc-ad9f-9735c310d0d9" providerId="ADAL" clId="{DBBCF258-FD50-488A-9B54-B591352DA2AE}" dt="2021-12-21T07:06:54.574" v="192" actId="20577"/>
+          <ac:spMkLst>
+            <pc:docMk/>
+            <pc:sldMk cId="136988369" sldId="269"/>
+            <ac:spMk id="24" creationId="{B5A10A00-9B69-4B4A-9E44-02A39D8511C9}"/>
+          </ac:spMkLst>
+        </pc:spChg>
+        <pc:spChg chg="add mod">
+          <ac:chgData name="Tom Kerkhove" userId="631ad559-0cf4-42cc-ad9f-9735c310d0d9" providerId="ADAL" clId="{DBBCF258-FD50-488A-9B54-B591352DA2AE}" dt="2021-12-21T07:10:03.825" v="267" actId="1076"/>
+          <ac:spMkLst>
+            <pc:docMk/>
+            <pc:sldMk cId="136988369" sldId="269"/>
+            <ac:spMk id="28" creationId="{85384B44-6855-414A-B536-2D8C433E1847}"/>
+          </ac:spMkLst>
+        </pc:spChg>
+        <pc:spChg chg="add mod">
+          <ac:chgData name="Tom Kerkhove" userId="631ad559-0cf4-42cc-ad9f-9735c310d0d9" providerId="ADAL" clId="{DBBCF258-FD50-488A-9B54-B591352DA2AE}" dt="2021-12-21T07:09:56.989" v="265" actId="1076"/>
+          <ac:spMkLst>
+            <pc:docMk/>
+            <pc:sldMk cId="136988369" sldId="269"/>
+            <ac:spMk id="30" creationId="{61CE4008-432C-407E-811F-1913AA1D83D7}"/>
+          </ac:spMkLst>
+        </pc:spChg>
+        <pc:spChg chg="add del mod">
+          <ac:chgData name="Tom Kerkhove" userId="631ad559-0cf4-42cc-ad9f-9735c310d0d9" providerId="ADAL" clId="{DBBCF258-FD50-488A-9B54-B591352DA2AE}" dt="2021-12-21T07:09:42.452" v="259" actId="478"/>
+          <ac:spMkLst>
+            <pc:docMk/>
+            <pc:sldMk cId="136988369" sldId="269"/>
+            <ac:spMk id="34" creationId="{753DE2A2-787A-48BE-B4D1-B1BFAD373DA0}"/>
+          </ac:spMkLst>
+        </pc:spChg>
+        <pc:spChg chg="add del mod">
+          <ac:chgData name="Tom Kerkhove" userId="631ad559-0cf4-42cc-ad9f-9735c310d0d9" providerId="ADAL" clId="{DBBCF258-FD50-488A-9B54-B591352DA2AE}" dt="2021-12-21T07:09:51.524" v="263" actId="478"/>
+          <ac:spMkLst>
+            <pc:docMk/>
+            <pc:sldMk cId="136988369" sldId="269"/>
+            <ac:spMk id="35" creationId="{7AD4A76C-F962-4732-9BD1-6E3F4AD334A1}"/>
+          </ac:spMkLst>
+        </pc:spChg>
+        <pc:spChg chg="add del mod">
+          <ac:chgData name="Tom Kerkhove" userId="631ad559-0cf4-42cc-ad9f-9735c310d0d9" providerId="ADAL" clId="{DBBCF258-FD50-488A-9B54-B591352DA2AE}" dt="2021-12-21T07:09:04.751" v="249" actId="478"/>
+          <ac:spMkLst>
+            <pc:docMk/>
+            <pc:sldMk cId="136988369" sldId="269"/>
+            <ac:spMk id="49" creationId="{34B8ED1D-B747-4731-BFD1-5A7192445831}"/>
+          </ac:spMkLst>
+        </pc:spChg>
+        <pc:grpChg chg="add mod">
+          <ac:chgData name="Tom Kerkhove" userId="631ad559-0cf4-42cc-ad9f-9735c310d0d9" providerId="ADAL" clId="{DBBCF258-FD50-488A-9B54-B591352DA2AE}" dt="2021-12-21T07:06:18.738" v="159" actId="1076"/>
+          <ac:grpSpMkLst>
+            <pc:docMk/>
+            <pc:sldMk cId="136988369" sldId="269"/>
+            <ac:grpSpMk id="18" creationId="{E689B0D8-EC05-4589-9E21-CEFBE8020F49}"/>
+          </ac:grpSpMkLst>
+        </pc:grpChg>
+        <pc:grpChg chg="del mod">
+          <ac:chgData name="Tom Kerkhove" userId="631ad559-0cf4-42cc-ad9f-9735c310d0d9" providerId="ADAL" clId="{DBBCF258-FD50-488A-9B54-B591352DA2AE}" dt="2021-12-21T07:03:45.192" v="94" actId="165"/>
+          <ac:grpSpMkLst>
+            <pc:docMk/>
+            <pc:sldMk cId="136988369" sldId="269"/>
+            <ac:grpSpMk id="54" creationId="{FDB13242-B4D1-4371-97FE-9D20C0208857}"/>
+          </ac:grpSpMkLst>
+        </pc:grpChg>
+        <pc:picChg chg="del mod">
+          <ac:chgData name="Tom Kerkhove" userId="631ad559-0cf4-42cc-ad9f-9735c310d0d9" providerId="ADAL" clId="{DBBCF258-FD50-488A-9B54-B591352DA2AE}" dt="2021-12-21T07:09:35.294" v="257" actId="478"/>
+          <ac:picMkLst>
+            <pc:docMk/>
+            <pc:sldMk cId="136988369" sldId="269"/>
+            <ac:picMk id="56" creationId="{9D637B57-5981-459B-AC54-94A8AEDD67BA}"/>
+          </ac:picMkLst>
+        </pc:picChg>
+        <pc:picChg chg="add mod">
+          <ac:chgData name="Tom Kerkhove" userId="631ad559-0cf4-42cc-ad9f-9735c310d0d9" providerId="ADAL" clId="{DBBCF258-FD50-488A-9B54-B591352DA2AE}" dt="2021-12-21T07:11:19.009" v="298" actId="1076"/>
+          <ac:picMkLst>
+            <pc:docMk/>
+            <pc:sldMk cId="136988369" sldId="269"/>
+            <ac:picMk id="84" creationId="{401FCF1C-B4C9-4A28-B6CB-9389B35C5652}"/>
+          </ac:picMkLst>
+        </pc:picChg>
+        <pc:picChg chg="add del">
+          <ac:chgData name="Tom Kerkhove" userId="631ad559-0cf4-42cc-ad9f-9735c310d0d9" providerId="ADAL" clId="{DBBCF258-FD50-488A-9B54-B591352DA2AE}" dt="2021-12-21T07:11:21.046" v="300" actId="478"/>
+          <ac:picMkLst>
+            <pc:docMk/>
+            <pc:sldMk cId="136988369" sldId="269"/>
+            <ac:picMk id="85" creationId="{A0207DD4-855B-432E-9A51-38E7E9ABDAB3}"/>
+          </ac:picMkLst>
+        </pc:picChg>
+        <pc:picChg chg="add mod">
+          <ac:chgData name="Tom Kerkhove" userId="631ad559-0cf4-42cc-ad9f-9735c310d0d9" providerId="ADAL" clId="{DBBCF258-FD50-488A-9B54-B591352DA2AE}" dt="2021-12-21T07:11:38.485" v="305" actId="14826"/>
+          <ac:picMkLst>
+            <pc:docMk/>
+            <pc:sldMk cId="136988369" sldId="269"/>
+            <ac:picMk id="86" creationId="{72C34781-8860-47FD-A39C-1EF1C08FF798}"/>
+          </ac:picMkLst>
+        </pc:picChg>
+        <pc:picChg chg="del mod topLvl">
+          <ac:chgData name="Tom Kerkhove" userId="631ad559-0cf4-42cc-ad9f-9735c310d0d9" providerId="ADAL" clId="{DBBCF258-FD50-488A-9B54-B591352DA2AE}" dt="2021-12-21T07:04:34.988" v="106" actId="478"/>
+          <ac:picMkLst>
+            <pc:docMk/>
+            <pc:sldMk cId="136988369" sldId="269"/>
+            <ac:picMk id="1026" creationId="{37F49E22-50A5-4C29-8965-69495B15B9FE}"/>
+          </ac:picMkLst>
+        </pc:picChg>
+        <pc:picChg chg="add mod">
+          <ac:chgData name="Tom Kerkhove" userId="631ad559-0cf4-42cc-ad9f-9735c310d0d9" providerId="ADAL" clId="{DBBCF258-FD50-488A-9B54-B591352DA2AE}" dt="2021-12-21T07:06:18.738" v="159" actId="1076"/>
+          <ac:picMkLst>
+            <pc:docMk/>
+            <pc:sldMk cId="136988369" sldId="269"/>
+            <ac:picMk id="2050" creationId="{67E5E883-7F0B-4AF5-AADB-3C0E265D8C3F}"/>
+          </ac:picMkLst>
+        </pc:picChg>
+        <pc:cxnChg chg="add del mod">
+          <ac:chgData name="Tom Kerkhove" userId="631ad559-0cf4-42cc-ad9f-9735c310d0d9" providerId="ADAL" clId="{DBBCF258-FD50-488A-9B54-B591352DA2AE}" dt="2021-12-21T07:07:27.925" v="208" actId="478"/>
+          <ac:cxnSpMkLst>
+            <pc:docMk/>
+            <pc:sldMk cId="136988369" sldId="269"/>
+            <ac:cxnSpMk id="31" creationId="{6CBC38A2-FFE7-40EA-9D48-D99DB1683DC3}"/>
+          </ac:cxnSpMkLst>
+        </pc:cxnChg>
+        <pc:cxnChg chg="add mod">
+          <ac:chgData name="Tom Kerkhove" userId="631ad559-0cf4-42cc-ad9f-9735c310d0d9" providerId="ADAL" clId="{DBBCF258-FD50-488A-9B54-B591352DA2AE}" dt="2021-12-21T07:10:03.825" v="267" actId="1076"/>
+          <ac:cxnSpMkLst>
+            <pc:docMk/>
+            <pc:sldMk cId="136988369" sldId="269"/>
+            <ac:cxnSpMk id="36" creationId="{A63C92DA-C30F-4E3B-9006-5C3FA4EE256B}"/>
+          </ac:cxnSpMkLst>
+        </pc:cxnChg>
+        <pc:cxnChg chg="add mod">
+          <ac:chgData name="Tom Kerkhove" userId="631ad559-0cf4-42cc-ad9f-9735c310d0d9" providerId="ADAL" clId="{DBBCF258-FD50-488A-9B54-B591352DA2AE}" dt="2021-12-21T07:09:56.989" v="265" actId="1076"/>
+          <ac:cxnSpMkLst>
+            <pc:docMk/>
+            <pc:sldMk cId="136988369" sldId="269"/>
+            <ac:cxnSpMk id="40" creationId="{51260472-4003-4EE3-9B29-6AAF8C9B09C2}"/>
+          </ac:cxnSpMkLst>
+        </pc:cxnChg>
+        <pc:cxnChg chg="del mod">
+          <ac:chgData name="Tom Kerkhove" userId="631ad559-0cf4-42cc-ad9f-9735c310d0d9" providerId="ADAL" clId="{DBBCF258-FD50-488A-9B54-B591352DA2AE}" dt="2021-12-21T07:03:20.962" v="88" actId="478"/>
+          <ac:cxnSpMkLst>
+            <pc:docMk/>
+            <pc:sldMk cId="136988369" sldId="269"/>
+            <ac:cxnSpMk id="57" creationId="{5C1C2740-EC81-4A12-86FE-EC3ED67121EB}"/>
+          </ac:cxnSpMkLst>
+        </pc:cxnChg>
+        <pc:cxnChg chg="del mod">
+          <ac:chgData name="Tom Kerkhove" userId="631ad559-0cf4-42cc-ad9f-9735c310d0d9" providerId="ADAL" clId="{DBBCF258-FD50-488A-9B54-B591352DA2AE}" dt="2021-12-21T07:03:22.112" v="89" actId="478"/>
+          <ac:cxnSpMkLst>
+            <pc:docMk/>
+            <pc:sldMk cId="136988369" sldId="269"/>
+            <ac:cxnSpMk id="70" creationId="{DC7DB0CD-66E3-4BE6-9602-CFE20B344A6F}"/>
+          </ac:cxnSpMkLst>
+        </pc:cxnChg>
+        <pc:cxnChg chg="mod">
+          <ac:chgData name="Tom Kerkhove" userId="631ad559-0cf4-42cc-ad9f-9735c310d0d9" providerId="ADAL" clId="{DBBCF258-FD50-488A-9B54-B591352DA2AE}" dt="2021-12-21T07:06:18.738" v="159" actId="1076"/>
+          <ac:cxnSpMkLst>
+            <pc:docMk/>
+            <pc:sldMk cId="136988369" sldId="269"/>
+            <ac:cxnSpMk id="74" creationId="{0DBB484A-508A-4C5E-8A91-D592BB0C1810}"/>
+          </ac:cxnSpMkLst>
+        </pc:cxnChg>
+        <pc:cxnChg chg="mod">
+          <ac:chgData name="Tom Kerkhove" userId="631ad559-0cf4-42cc-ad9f-9735c310d0d9" providerId="ADAL" clId="{DBBCF258-FD50-488A-9B54-B591352DA2AE}" dt="2021-12-21T07:06:21.932" v="160" actId="14100"/>
+          <ac:cxnSpMkLst>
+            <pc:docMk/>
+            <pc:sldMk cId="136988369" sldId="269"/>
+            <ac:cxnSpMk id="78" creationId="{DE4D253F-F35B-459B-B318-955ABA6B579A}"/>
+          </ac:cxnSpMkLst>
+        </pc:cxnChg>
+      </pc:sldChg>
+    </pc:docChg>
+  </pc:docChgLst>
+</pc:chgInfo>
 </file>
 
 <file path=ppt/slideLayouts/slideLayout1.xml><?xml version="1.0" encoding="utf-8"?>
@@ -282,7 +880,7 @@
           <a:p>
             <a:fld id="{268B1832-4C9F-45AF-916B-E5DF6A83A891}" type="datetimeFigureOut">
               <a:rPr lang="LID4096" smtClean="0"/>
-              <a:t>07/29/2020</a:t>
+              <a:t>12/21/2021</a:t>
             </a:fld>
             <a:endParaRPr lang="LID4096"/>
           </a:p>
@@ -482,7 +1080,7 @@
           <a:p>
             <a:fld id="{268B1832-4C9F-45AF-916B-E5DF6A83A891}" type="datetimeFigureOut">
               <a:rPr lang="LID4096" smtClean="0"/>
-              <a:t>07/29/2020</a:t>
+              <a:t>12/21/2021</a:t>
             </a:fld>
             <a:endParaRPr lang="LID4096"/>
           </a:p>
@@ -692,7 +1290,7 @@
           <a:p>
             <a:fld id="{268B1832-4C9F-45AF-916B-E5DF6A83A891}" type="datetimeFigureOut">
               <a:rPr lang="LID4096" smtClean="0"/>
-              <a:t>07/29/2020</a:t>
+              <a:t>12/21/2021</a:t>
             </a:fld>
             <a:endParaRPr lang="LID4096"/>
           </a:p>
@@ -892,7 +1490,7 @@
           <a:p>
             <a:fld id="{268B1832-4C9F-45AF-916B-E5DF6A83A891}" type="datetimeFigureOut">
               <a:rPr lang="LID4096" smtClean="0"/>
-              <a:t>07/29/2020</a:t>
+              <a:t>12/21/2021</a:t>
             </a:fld>
             <a:endParaRPr lang="LID4096"/>
           </a:p>
@@ -1168,7 +1766,7 @@
           <a:p>
             <a:fld id="{268B1832-4C9F-45AF-916B-E5DF6A83A891}" type="datetimeFigureOut">
               <a:rPr lang="LID4096" smtClean="0"/>
-              <a:t>07/29/2020</a:t>
+              <a:t>12/21/2021</a:t>
             </a:fld>
             <a:endParaRPr lang="LID4096"/>
           </a:p>
@@ -1436,7 +2034,7 @@
           <a:p>
             <a:fld id="{268B1832-4C9F-45AF-916B-E5DF6A83A891}" type="datetimeFigureOut">
               <a:rPr lang="LID4096" smtClean="0"/>
-              <a:t>07/29/2020</a:t>
+              <a:t>12/21/2021</a:t>
             </a:fld>
             <a:endParaRPr lang="LID4096"/>
           </a:p>
@@ -1851,7 +2449,7 @@
           <a:p>
             <a:fld id="{268B1832-4C9F-45AF-916B-E5DF6A83A891}" type="datetimeFigureOut">
               <a:rPr lang="LID4096" smtClean="0"/>
-              <a:t>07/29/2020</a:t>
+              <a:t>12/21/2021</a:t>
             </a:fld>
             <a:endParaRPr lang="LID4096"/>
           </a:p>
@@ -1993,7 +2591,7 @@
           <a:p>
             <a:fld id="{268B1832-4C9F-45AF-916B-E5DF6A83A891}" type="datetimeFigureOut">
               <a:rPr lang="LID4096" smtClean="0"/>
-              <a:t>07/29/2020</a:t>
+              <a:t>12/21/2021</a:t>
             </a:fld>
             <a:endParaRPr lang="LID4096"/>
           </a:p>
@@ -2106,7 +2704,7 @@
           <a:p>
             <a:fld id="{268B1832-4C9F-45AF-916B-E5DF6A83A891}" type="datetimeFigureOut">
               <a:rPr lang="LID4096" smtClean="0"/>
-              <a:t>07/29/2020</a:t>
+              <a:t>12/21/2021</a:t>
             </a:fld>
             <a:endParaRPr lang="LID4096"/>
           </a:p>
@@ -2419,7 +3017,7 @@
           <a:p>
             <a:fld id="{268B1832-4C9F-45AF-916B-E5DF6A83A891}" type="datetimeFigureOut">
               <a:rPr lang="LID4096" smtClean="0"/>
-              <a:t>07/29/2020</a:t>
+              <a:t>12/21/2021</a:t>
             </a:fld>
             <a:endParaRPr lang="LID4096"/>
           </a:p>
@@ -2708,7 +3306,7 @@
           <a:p>
             <a:fld id="{268B1832-4C9F-45AF-916B-E5DF6A83A891}" type="datetimeFigureOut">
               <a:rPr lang="LID4096" smtClean="0"/>
-              <a:t>07/29/2020</a:t>
+              <a:t>12/21/2021</a:t>
             </a:fld>
             <a:endParaRPr lang="LID4096"/>
           </a:p>
@@ -2951,7 +3549,7 @@
           <a:p>
             <a:fld id="{268B1832-4C9F-45AF-916B-E5DF6A83A891}" type="datetimeFigureOut">
               <a:rPr lang="LID4096" smtClean="0"/>
-              <a:t>07/29/2020</a:t>
+              <a:t>12/21/2021</a:t>
             </a:fld>
             <a:endParaRPr lang="LID4096"/>
           </a:p>
@@ -6619,6 +7217,4213 @@
           <a:chExt cx="0" cy="0"/>
         </a:xfrm>
       </p:grpSpPr>
+      <p:sp>
+        <p:nvSpPr>
+          <p:cNvPr id="26" name="Rectangle 25">
+            <a:extLst>
+              <a:ext uri="{FF2B5EF4-FFF2-40B4-BE49-F238E27FC236}">
+                <a16:creationId xmlns:a16="http://schemas.microsoft.com/office/drawing/2014/main" id="{659BE901-B66A-471D-A3A8-7BC43DEB9815}"/>
+              </a:ext>
+            </a:extLst>
+          </p:cNvPr>
+          <p:cNvSpPr/>
+          <p:nvPr/>
+        </p:nvSpPr>
+        <p:spPr>
+          <a:xfrm>
+            <a:off x="419101" y="2145681"/>
+            <a:ext cx="9608813" cy="1390000"/>
+          </a:xfrm>
+          <a:prstGeom prst="rect">
+            <a:avLst/>
+          </a:prstGeom>
+        </p:spPr>
+        <p:style>
+          <a:lnRef idx="2">
+            <a:schemeClr val="dk1"/>
+          </a:lnRef>
+          <a:fillRef idx="1">
+            <a:schemeClr val="lt1"/>
+          </a:fillRef>
+          <a:effectRef idx="0">
+            <a:schemeClr val="dk1"/>
+          </a:effectRef>
+          <a:fontRef idx="minor">
+            <a:schemeClr val="dk1"/>
+          </a:fontRef>
+        </p:style>
+        <p:txBody>
+          <a:bodyPr rtlCol="0" anchor="ctr"/>
+          <a:lstStyle/>
+          <a:p>
+            <a:pPr algn="ctr"/>
+            <a:endParaRPr lang="LID4096" dirty="0"/>
+          </a:p>
+        </p:txBody>
+      </p:sp>
+      <p:pic>
+        <p:nvPicPr>
+          <p:cNvPr id="8" name="Picture 2" descr="StatsD Logo | Logos, Tech logos, Gaming logos">
+            <a:extLst>
+              <a:ext uri="{FF2B5EF4-FFF2-40B4-BE49-F238E27FC236}">
+                <a16:creationId xmlns:a16="http://schemas.microsoft.com/office/drawing/2014/main" id="{A831F2BA-C1BF-45DD-A426-92DBB667254B}"/>
+              </a:ext>
+            </a:extLst>
+          </p:cNvPr>
+          <p:cNvPicPr>
+            <a:picLocks noChangeAspect="1" noChangeArrowheads="1"/>
+          </p:cNvPicPr>
+          <p:nvPr/>
+        </p:nvPicPr>
+        <p:blipFill rotWithShape="1">
+          <a:blip r:embed="rId2">
+            <a:extLst>
+              <a:ext uri="{28A0092B-C50C-407E-A947-70E740481C1C}">
+                <a14:useLocalDpi xmlns:a14="http://schemas.microsoft.com/office/drawing/2010/main" val="0"/>
+              </a:ext>
+            </a:extLst>
+          </a:blip>
+          <a:srcRect l="9765" t="27530" r="10000" b="26543"/>
+          <a:stretch/>
+        </p:blipFill>
+        <p:spPr bwMode="auto">
+          <a:xfrm>
+            <a:off x="1510352" y="1451343"/>
+            <a:ext cx="1350634" cy="491140"/>
+          </a:xfrm>
+          <a:prstGeom prst="rect">
+            <a:avLst/>
+          </a:prstGeom>
+          <a:noFill/>
+          <a:extLst>
+            <a:ext uri="{909E8E84-426E-40DD-AFC4-6F175D3DCCD1}">
+              <a14:hiddenFill xmlns:a14="http://schemas.microsoft.com/office/drawing/2010/main">
+                <a:solidFill>
+                  <a:srgbClr val="FFFFFF"/>
+                </a:solidFill>
+              </a14:hiddenFill>
+            </a:ext>
+          </a:extLst>
+        </p:spPr>
+      </p:pic>
+      <p:pic>
+        <p:nvPicPr>
+          <p:cNvPr id="9" name="Picture 4" descr="Statuspage | Atlassian">
+            <a:extLst>
+              <a:ext uri="{FF2B5EF4-FFF2-40B4-BE49-F238E27FC236}">
+                <a16:creationId xmlns:a16="http://schemas.microsoft.com/office/drawing/2014/main" id="{ED0E2EE6-F25D-4B8F-83AA-A9112BCEE768}"/>
+              </a:ext>
+            </a:extLst>
+          </p:cNvPr>
+          <p:cNvPicPr>
+            <a:picLocks noChangeAspect="1" noChangeArrowheads="1"/>
+          </p:cNvPicPr>
+          <p:nvPr/>
+        </p:nvPicPr>
+        <p:blipFill>
+          <a:blip r:embed="rId3">
+            <a:extLst>
+              <a:ext uri="{28A0092B-C50C-407E-A947-70E740481C1C}">
+                <a14:useLocalDpi xmlns:a14="http://schemas.microsoft.com/office/drawing/2010/main" val="0"/>
+              </a:ext>
+            </a:extLst>
+          </a:blip>
+          <a:srcRect/>
+          <a:stretch>
+            <a:fillRect/>
+          </a:stretch>
+        </p:blipFill>
+        <p:spPr bwMode="auto">
+          <a:xfrm>
+            <a:off x="3275569" y="1340040"/>
+            <a:ext cx="1937542" cy="280990"/>
+          </a:xfrm>
+          <a:prstGeom prst="rect">
+            <a:avLst/>
+          </a:prstGeom>
+          <a:noFill/>
+          <a:extLst>
+            <a:ext uri="{909E8E84-426E-40DD-AFC4-6F175D3DCCD1}">
+              <a14:hiddenFill xmlns:a14="http://schemas.microsoft.com/office/drawing/2010/main">
+                <a:solidFill>
+                  <a:srgbClr val="FFFFFF"/>
+                </a:solidFill>
+              </a14:hiddenFill>
+            </a:ext>
+          </a:extLst>
+        </p:spPr>
+      </p:pic>
+      <p:pic>
+        <p:nvPicPr>
+          <p:cNvPr id="10" name="Picture 8">
+            <a:extLst>
+              <a:ext uri="{FF2B5EF4-FFF2-40B4-BE49-F238E27FC236}">
+                <a16:creationId xmlns:a16="http://schemas.microsoft.com/office/drawing/2014/main" id="{CEDA630D-175A-4E24-AD69-628B82FF0939}"/>
+              </a:ext>
+            </a:extLst>
+          </p:cNvPr>
+          <p:cNvPicPr>
+            <a:picLocks noChangeAspect="1" noChangeArrowheads="1"/>
+          </p:cNvPicPr>
+          <p:nvPr/>
+        </p:nvPicPr>
+        <p:blipFill rotWithShape="1">
+          <a:blip r:embed="rId4">
+            <a:extLst>
+              <a:ext uri="{28A0092B-C50C-407E-A947-70E740481C1C}">
+                <a14:useLocalDpi xmlns:a14="http://schemas.microsoft.com/office/drawing/2010/main" val="0"/>
+              </a:ext>
+            </a:extLst>
+          </a:blip>
+          <a:srcRect l="1807" t="16125" r="4250" b="14397"/>
+          <a:stretch/>
+        </p:blipFill>
+        <p:spPr bwMode="auto">
+          <a:xfrm>
+            <a:off x="5657503" y="1451343"/>
+            <a:ext cx="1426410" cy="470266"/>
+          </a:xfrm>
+          <a:prstGeom prst="rect">
+            <a:avLst/>
+          </a:prstGeom>
+          <a:noFill/>
+          <a:extLst>
+            <a:ext uri="{909E8E84-426E-40DD-AFC4-6F175D3DCCD1}">
+              <a14:hiddenFill xmlns:a14="http://schemas.microsoft.com/office/drawing/2010/main">
+                <a:solidFill>
+                  <a:srgbClr val="FFFFFF"/>
+                </a:solidFill>
+              </a14:hiddenFill>
+            </a:ext>
+          </a:extLst>
+        </p:spPr>
+      </p:pic>
+      <p:sp>
+        <p:nvSpPr>
+          <p:cNvPr id="2" name="Rectangle 1">
+            <a:extLst>
+              <a:ext uri="{FF2B5EF4-FFF2-40B4-BE49-F238E27FC236}">
+                <a16:creationId xmlns:a16="http://schemas.microsoft.com/office/drawing/2014/main" id="{DF1B8298-A232-4723-91AC-B3F08648AB3F}"/>
+              </a:ext>
+            </a:extLst>
+          </p:cNvPr>
+          <p:cNvSpPr/>
+          <p:nvPr/>
+        </p:nvSpPr>
+        <p:spPr>
+          <a:xfrm>
+            <a:off x="2999740" y="2350882"/>
+            <a:ext cx="2476498" cy="971438"/>
+          </a:xfrm>
+          <a:prstGeom prst="rect">
+            <a:avLst/>
+          </a:prstGeom>
+          <a:solidFill>
+            <a:schemeClr val="accent6">
+              <a:lumMod val="20000"/>
+              <a:lumOff val="80000"/>
+            </a:schemeClr>
+          </a:solidFill>
+        </p:spPr>
+        <p:style>
+          <a:lnRef idx="2">
+            <a:schemeClr val="dk1"/>
+          </a:lnRef>
+          <a:fillRef idx="1">
+            <a:schemeClr val="lt1"/>
+          </a:fillRef>
+          <a:effectRef idx="0">
+            <a:schemeClr val="dk1"/>
+          </a:effectRef>
+          <a:fontRef idx="minor">
+            <a:schemeClr val="dk1"/>
+          </a:fontRef>
+        </p:style>
+        <p:txBody>
+          <a:bodyPr rtlCol="0" anchor="ctr"/>
+          <a:lstStyle/>
+          <a:p>
+            <a:pPr algn="ctr"/>
+            <a:r>
+              <a:rPr lang="en-US" b="1" dirty="0"/>
+              <a:t>Scraper</a:t>
+            </a:r>
+            <a:br>
+              <a:rPr lang="en-US" dirty="0"/>
+            </a:br>
+            <a:r>
+              <a:rPr lang="en-US" dirty="0"/>
+              <a:t>Agent</a:t>
+            </a:r>
+            <a:endParaRPr lang="LID4096" dirty="0"/>
+          </a:p>
+        </p:txBody>
+      </p:sp>
+      <p:cxnSp>
+        <p:nvCxnSpPr>
+          <p:cNvPr id="4" name="Straight Arrow Connector 3">
+            <a:extLst>
+              <a:ext uri="{FF2B5EF4-FFF2-40B4-BE49-F238E27FC236}">
+                <a16:creationId xmlns:a16="http://schemas.microsoft.com/office/drawing/2014/main" id="{080ACE8A-92F3-47BE-A907-9AB06186A982}"/>
+              </a:ext>
+            </a:extLst>
+          </p:cNvPr>
+          <p:cNvCxnSpPr>
+            <a:cxnSpLocks/>
+          </p:cNvCxnSpPr>
+          <p:nvPr/>
+        </p:nvCxnSpPr>
+        <p:spPr>
+          <a:xfrm flipH="1" flipV="1">
+            <a:off x="2918460" y="1921609"/>
+            <a:ext cx="1104425" cy="343704"/>
+          </a:xfrm>
+          <a:prstGeom prst="straightConnector1">
+            <a:avLst/>
+          </a:prstGeom>
+          <a:ln>
+            <a:tailEnd type="triangle"/>
+          </a:ln>
+        </p:spPr>
+        <p:style>
+          <a:lnRef idx="1">
+            <a:schemeClr val="dk1"/>
+          </a:lnRef>
+          <a:fillRef idx="0">
+            <a:schemeClr val="dk1"/>
+          </a:fillRef>
+          <a:effectRef idx="0">
+            <a:schemeClr val="dk1"/>
+          </a:effectRef>
+          <a:fontRef idx="minor">
+            <a:schemeClr val="tx1"/>
+          </a:fontRef>
+        </p:style>
+      </p:cxnSp>
+      <p:cxnSp>
+        <p:nvCxnSpPr>
+          <p:cNvPr id="11" name="Straight Arrow Connector 10">
+            <a:extLst>
+              <a:ext uri="{FF2B5EF4-FFF2-40B4-BE49-F238E27FC236}">
+                <a16:creationId xmlns:a16="http://schemas.microsoft.com/office/drawing/2014/main" id="{3DDD3110-2C22-4100-A249-9147599B7B36}"/>
+              </a:ext>
+            </a:extLst>
+          </p:cNvPr>
+          <p:cNvCxnSpPr>
+            <a:cxnSpLocks/>
+            <a:endCxn id="9" idx="2"/>
+          </p:cNvCxnSpPr>
+          <p:nvPr/>
+        </p:nvCxnSpPr>
+        <p:spPr>
+          <a:xfrm flipV="1">
+            <a:off x="4244340" y="1621030"/>
+            <a:ext cx="0" cy="644283"/>
+          </a:xfrm>
+          <a:prstGeom prst="straightConnector1">
+            <a:avLst/>
+          </a:prstGeom>
+          <a:ln>
+            <a:tailEnd type="triangle"/>
+          </a:ln>
+        </p:spPr>
+        <p:style>
+          <a:lnRef idx="1">
+            <a:schemeClr val="dk1"/>
+          </a:lnRef>
+          <a:fillRef idx="0">
+            <a:schemeClr val="dk1"/>
+          </a:fillRef>
+          <a:effectRef idx="0">
+            <a:schemeClr val="dk1"/>
+          </a:effectRef>
+          <a:fontRef idx="minor">
+            <a:schemeClr val="tx1"/>
+          </a:fontRef>
+        </p:style>
+      </p:cxnSp>
+      <p:cxnSp>
+        <p:nvCxnSpPr>
+          <p:cNvPr id="14" name="Straight Arrow Connector 13">
+            <a:extLst>
+              <a:ext uri="{FF2B5EF4-FFF2-40B4-BE49-F238E27FC236}">
+                <a16:creationId xmlns:a16="http://schemas.microsoft.com/office/drawing/2014/main" id="{EF0E679F-CEE6-4FC8-BEA2-8FFF5767B9F6}"/>
+              </a:ext>
+            </a:extLst>
+          </p:cNvPr>
+          <p:cNvCxnSpPr>
+            <a:cxnSpLocks/>
+          </p:cNvCxnSpPr>
+          <p:nvPr/>
+        </p:nvCxnSpPr>
+        <p:spPr>
+          <a:xfrm flipH="1">
+            <a:off x="4411029" y="1920837"/>
+            <a:ext cx="1250155" cy="344476"/>
+          </a:xfrm>
+          <a:prstGeom prst="straightConnector1">
+            <a:avLst/>
+          </a:prstGeom>
+          <a:ln>
+            <a:prstDash val="dash"/>
+            <a:headEnd type="none" w="med" len="med"/>
+            <a:tailEnd type="triangle" w="med" len="med"/>
+          </a:ln>
+        </p:spPr>
+        <p:style>
+          <a:lnRef idx="1">
+            <a:schemeClr val="dk1"/>
+          </a:lnRef>
+          <a:fillRef idx="0">
+            <a:schemeClr val="dk1"/>
+          </a:fillRef>
+          <a:effectRef idx="0">
+            <a:schemeClr val="dk1"/>
+          </a:effectRef>
+          <a:fontRef idx="minor">
+            <a:schemeClr val="tx1"/>
+          </a:fontRef>
+        </p:style>
+      </p:cxnSp>
+      <p:cxnSp>
+        <p:nvCxnSpPr>
+          <p:cNvPr id="15" name="Straight Arrow Connector 14">
+            <a:extLst>
+              <a:ext uri="{FF2B5EF4-FFF2-40B4-BE49-F238E27FC236}">
+                <a16:creationId xmlns:a16="http://schemas.microsoft.com/office/drawing/2014/main" id="{72E81A24-E430-47FF-BD31-773153BB2680}"/>
+              </a:ext>
+            </a:extLst>
+          </p:cNvPr>
+          <p:cNvCxnSpPr>
+            <a:cxnSpLocks/>
+            <a:stCxn id="2" idx="2"/>
+            <a:endCxn id="13" idx="0"/>
+          </p:cNvCxnSpPr>
+          <p:nvPr/>
+        </p:nvCxnSpPr>
+        <p:spPr>
+          <a:xfrm>
+            <a:off x="4237989" y="3322320"/>
+            <a:ext cx="7006" cy="904281"/>
+          </a:xfrm>
+          <a:prstGeom prst="straightConnector1">
+            <a:avLst/>
+          </a:prstGeom>
+          <a:ln>
+            <a:prstDash val="sysDash"/>
+            <a:tailEnd type="triangle"/>
+          </a:ln>
+        </p:spPr>
+        <p:style>
+          <a:lnRef idx="1">
+            <a:schemeClr val="dk1"/>
+          </a:lnRef>
+          <a:fillRef idx="0">
+            <a:schemeClr val="dk1"/>
+          </a:fillRef>
+          <a:effectRef idx="0">
+            <a:schemeClr val="dk1"/>
+          </a:effectRef>
+          <a:fontRef idx="minor">
+            <a:schemeClr val="tx1"/>
+          </a:fontRef>
+        </p:style>
+      </p:cxnSp>
+      <p:sp>
+        <p:nvSpPr>
+          <p:cNvPr id="17" name="Rectangle 16">
+            <a:extLst>
+              <a:ext uri="{FF2B5EF4-FFF2-40B4-BE49-F238E27FC236}">
+                <a16:creationId xmlns:a16="http://schemas.microsoft.com/office/drawing/2014/main" id="{A7536292-2517-4CBC-B5B2-F992F59E166F}"/>
+              </a:ext>
+            </a:extLst>
+          </p:cNvPr>
+          <p:cNvSpPr/>
+          <p:nvPr/>
+        </p:nvSpPr>
+        <p:spPr>
+          <a:xfrm>
+            <a:off x="7289987" y="2350882"/>
+            <a:ext cx="2476498" cy="971438"/>
+          </a:xfrm>
+          <a:prstGeom prst="rect">
+            <a:avLst/>
+          </a:prstGeom>
+          <a:solidFill>
+            <a:schemeClr val="accent6">
+              <a:lumMod val="20000"/>
+              <a:lumOff val="80000"/>
+            </a:schemeClr>
+          </a:solidFill>
+        </p:spPr>
+        <p:style>
+          <a:lnRef idx="2">
+            <a:schemeClr val="dk1"/>
+          </a:lnRef>
+          <a:fillRef idx="1">
+            <a:schemeClr val="lt1"/>
+          </a:fillRef>
+          <a:effectRef idx="0">
+            <a:schemeClr val="dk1"/>
+          </a:effectRef>
+          <a:fontRef idx="minor">
+            <a:schemeClr val="dk1"/>
+          </a:fontRef>
+        </p:style>
+        <p:txBody>
+          <a:bodyPr rtlCol="0" anchor="ctr"/>
+          <a:lstStyle/>
+          <a:p>
+            <a:pPr algn="ctr"/>
+            <a:r>
+              <a:rPr lang="en-US" b="1" dirty="0"/>
+              <a:t>Resource Discovery</a:t>
+            </a:r>
+            <a:br>
+              <a:rPr lang="en-US" dirty="0"/>
+            </a:br>
+            <a:r>
+              <a:rPr lang="en-US" dirty="0"/>
+              <a:t>Agent</a:t>
+            </a:r>
+            <a:endParaRPr lang="LID4096" dirty="0"/>
+          </a:p>
+        </p:txBody>
+      </p:sp>
+      <p:cxnSp>
+        <p:nvCxnSpPr>
+          <p:cNvPr id="20" name="Straight Arrow Connector 19">
+            <a:extLst>
+              <a:ext uri="{FF2B5EF4-FFF2-40B4-BE49-F238E27FC236}">
+                <a16:creationId xmlns:a16="http://schemas.microsoft.com/office/drawing/2014/main" id="{F73A3814-732F-4119-B56F-93EAB99E2266}"/>
+              </a:ext>
+            </a:extLst>
+          </p:cNvPr>
+          <p:cNvCxnSpPr>
+            <a:cxnSpLocks/>
+            <a:stCxn id="17" idx="2"/>
+            <a:endCxn id="19" idx="0"/>
+          </p:cNvCxnSpPr>
+          <p:nvPr/>
+        </p:nvCxnSpPr>
+        <p:spPr>
+          <a:xfrm>
+            <a:off x="8528236" y="3322320"/>
+            <a:ext cx="6351" cy="904281"/>
+          </a:xfrm>
+          <a:prstGeom prst="straightConnector1">
+            <a:avLst/>
+          </a:prstGeom>
+          <a:ln>
+            <a:prstDash val="sysDash"/>
+            <a:tailEnd type="triangle"/>
+          </a:ln>
+        </p:spPr>
+        <p:style>
+          <a:lnRef idx="1">
+            <a:schemeClr val="dk1"/>
+          </a:lnRef>
+          <a:fillRef idx="0">
+            <a:schemeClr val="dk1"/>
+          </a:fillRef>
+          <a:effectRef idx="0">
+            <a:schemeClr val="dk1"/>
+          </a:effectRef>
+          <a:fontRef idx="minor">
+            <a:schemeClr val="tx1"/>
+          </a:fontRef>
+        </p:style>
+      </p:cxnSp>
+      <p:cxnSp>
+        <p:nvCxnSpPr>
+          <p:cNvPr id="23" name="Straight Arrow Connector 22">
+            <a:extLst>
+              <a:ext uri="{FF2B5EF4-FFF2-40B4-BE49-F238E27FC236}">
+                <a16:creationId xmlns:a16="http://schemas.microsoft.com/office/drawing/2014/main" id="{90B36813-BA04-460B-8E82-BEDD95FA2500}"/>
+              </a:ext>
+            </a:extLst>
+          </p:cNvPr>
+          <p:cNvCxnSpPr>
+            <a:cxnSpLocks/>
+            <a:stCxn id="2" idx="3"/>
+            <a:endCxn id="17" idx="1"/>
+          </p:cNvCxnSpPr>
+          <p:nvPr/>
+        </p:nvCxnSpPr>
+        <p:spPr>
+          <a:xfrm>
+            <a:off x="5476238" y="2836601"/>
+            <a:ext cx="1813749" cy="0"/>
+          </a:xfrm>
+          <a:prstGeom prst="straightConnector1">
+            <a:avLst/>
+          </a:prstGeom>
+          <a:ln>
+            <a:prstDash val="sysDash"/>
+            <a:tailEnd type="triangle"/>
+          </a:ln>
+        </p:spPr>
+        <p:style>
+          <a:lnRef idx="1">
+            <a:schemeClr val="dk1"/>
+          </a:lnRef>
+          <a:fillRef idx="0">
+            <a:schemeClr val="dk1"/>
+          </a:fillRef>
+          <a:effectRef idx="0">
+            <a:schemeClr val="dk1"/>
+          </a:effectRef>
+          <a:fontRef idx="minor">
+            <a:schemeClr val="tx1"/>
+          </a:fontRef>
+        </p:style>
+      </p:cxnSp>
+      <p:pic>
+        <p:nvPicPr>
+          <p:cNvPr id="29" name="Picture 2" descr="Promitor - Bringing Azure Monitor metrics where you need them ...">
+            <a:extLst>
+              <a:ext uri="{FF2B5EF4-FFF2-40B4-BE49-F238E27FC236}">
+                <a16:creationId xmlns:a16="http://schemas.microsoft.com/office/drawing/2014/main" id="{CD4A43BB-6989-448C-B653-C938D6228EE1}"/>
+              </a:ext>
+            </a:extLst>
+          </p:cNvPr>
+          <p:cNvPicPr>
+            <a:picLocks noChangeAspect="1" noChangeArrowheads="1"/>
+          </p:cNvPicPr>
+          <p:nvPr/>
+        </p:nvPicPr>
+        <p:blipFill>
+          <a:blip r:embed="rId5">
+            <a:extLst>
+              <a:ext uri="{28A0092B-C50C-407E-A947-70E740481C1C}">
+                <a14:useLocalDpi xmlns:a14="http://schemas.microsoft.com/office/drawing/2010/main" val="0"/>
+              </a:ext>
+            </a:extLst>
+          </a:blip>
+          <a:srcRect/>
+          <a:stretch>
+            <a:fillRect/>
+          </a:stretch>
+        </p:blipFill>
+        <p:spPr bwMode="auto">
+          <a:xfrm>
+            <a:off x="776295" y="2536519"/>
+            <a:ext cx="1788160" cy="600164"/>
+          </a:xfrm>
+          <a:prstGeom prst="rect">
+            <a:avLst/>
+          </a:prstGeom>
+          <a:noFill/>
+          <a:extLst>
+            <a:ext uri="{909E8E84-426E-40DD-AFC4-6F175D3DCCD1}">
+              <a14:hiddenFill xmlns:a14="http://schemas.microsoft.com/office/drawing/2010/main">
+                <a:solidFill>
+                  <a:srgbClr val="FFFFFF"/>
+                </a:solidFill>
+              </a14:hiddenFill>
+            </a:ext>
+          </a:extLst>
+        </p:spPr>
+      </p:pic>
+      <p:grpSp>
+        <p:nvGrpSpPr>
+          <p:cNvPr id="39" name="Group 38">
+            <a:extLst>
+              <a:ext uri="{FF2B5EF4-FFF2-40B4-BE49-F238E27FC236}">
+                <a16:creationId xmlns:a16="http://schemas.microsoft.com/office/drawing/2014/main" id="{EE60B4A5-A490-4AB0-8A98-B7B39CBCEBBF}"/>
+              </a:ext>
+            </a:extLst>
+          </p:cNvPr>
+          <p:cNvGrpSpPr/>
+          <p:nvPr/>
+        </p:nvGrpSpPr>
+        <p:grpSpPr>
+          <a:xfrm>
+            <a:off x="3622310" y="4226601"/>
+            <a:ext cx="1244059" cy="837394"/>
+            <a:chOff x="3622310" y="3854675"/>
+            <a:chExt cx="1244059" cy="837394"/>
+          </a:xfrm>
+        </p:grpSpPr>
+        <p:pic>
+          <p:nvPicPr>
+            <p:cNvPr id="13" name="Picture 10" descr="Azure Monitor (@AzureMonitor) | Twitter">
+              <a:extLst>
+                <a:ext uri="{FF2B5EF4-FFF2-40B4-BE49-F238E27FC236}">
+                  <a16:creationId xmlns:a16="http://schemas.microsoft.com/office/drawing/2014/main" id="{E972978B-6F70-4615-83B3-E213DFB45B23}"/>
+                </a:ext>
+              </a:extLst>
+            </p:cNvPr>
+            <p:cNvPicPr>
+              <a:picLocks noChangeAspect="1" noChangeArrowheads="1"/>
+            </p:cNvPicPr>
+            <p:nvPr/>
+          </p:nvPicPr>
+          <p:blipFill>
+            <a:blip r:embed="rId6">
+              <a:extLst>
+                <a:ext uri="{28A0092B-C50C-407E-A947-70E740481C1C}">
+                  <a14:useLocalDpi xmlns:a14="http://schemas.microsoft.com/office/drawing/2010/main" val="0"/>
+                </a:ext>
+              </a:extLst>
+            </a:blip>
+            <a:srcRect/>
+            <a:stretch>
+              <a:fillRect/>
+            </a:stretch>
+          </p:blipFill>
+          <p:spPr bwMode="auto">
+            <a:xfrm>
+              <a:off x="3999074" y="3854675"/>
+              <a:ext cx="491841" cy="491841"/>
+            </a:xfrm>
+            <a:prstGeom prst="rect">
+              <a:avLst/>
+            </a:prstGeom>
+            <a:noFill/>
+            <a:extLst>
+              <a:ext uri="{909E8E84-426E-40DD-AFC4-6F175D3DCCD1}">
+                <a14:hiddenFill xmlns:a14="http://schemas.microsoft.com/office/drawing/2010/main">
+                  <a:solidFill>
+                    <a:srgbClr val="FFFFFF"/>
+                  </a:solidFill>
+                </a14:hiddenFill>
+              </a:ext>
+            </a:extLst>
+          </p:spPr>
+        </p:pic>
+        <p:sp>
+          <p:nvSpPr>
+            <p:cNvPr id="36" name="TextBox 35">
+              <a:extLst>
+                <a:ext uri="{FF2B5EF4-FFF2-40B4-BE49-F238E27FC236}">
+                  <a16:creationId xmlns:a16="http://schemas.microsoft.com/office/drawing/2014/main" id="{63AE4A1C-6C01-4017-9683-C6D86C604BAB}"/>
+                </a:ext>
+              </a:extLst>
+            </p:cNvPr>
+            <p:cNvSpPr txBox="1"/>
+            <p:nvPr/>
+          </p:nvSpPr>
+          <p:spPr>
+            <a:xfrm>
+              <a:off x="3622310" y="4384292"/>
+              <a:ext cx="1244059" cy="307777"/>
+            </a:xfrm>
+            <a:prstGeom prst="rect">
+              <a:avLst/>
+            </a:prstGeom>
+            <a:noFill/>
+          </p:spPr>
+          <p:txBody>
+            <a:bodyPr wrap="none" rtlCol="0">
+              <a:spAutoFit/>
+            </a:bodyPr>
+            <a:lstStyle/>
+            <a:p>
+              <a:r>
+                <a:rPr lang="en-US" sz="1400" dirty="0"/>
+                <a:t>Azure Monitor</a:t>
+              </a:r>
+              <a:endParaRPr lang="LID4096" sz="1400" dirty="0"/>
+            </a:p>
+          </p:txBody>
+        </p:sp>
+      </p:grpSp>
+      <p:grpSp>
+        <p:nvGrpSpPr>
+          <p:cNvPr id="38" name="Group 37">
+            <a:extLst>
+              <a:ext uri="{FF2B5EF4-FFF2-40B4-BE49-F238E27FC236}">
+                <a16:creationId xmlns:a16="http://schemas.microsoft.com/office/drawing/2014/main" id="{FCD9D0A0-A2CD-49C3-BB57-BBCCBF1A7132}"/>
+              </a:ext>
+            </a:extLst>
+          </p:cNvPr>
+          <p:cNvGrpSpPr/>
+          <p:nvPr/>
+        </p:nvGrpSpPr>
+        <p:grpSpPr>
+          <a:xfrm>
+            <a:off x="7634276" y="4226601"/>
+            <a:ext cx="1800621" cy="837392"/>
+            <a:chOff x="6982900" y="3854676"/>
+            <a:chExt cx="1800621" cy="837392"/>
+          </a:xfrm>
+        </p:grpSpPr>
+        <p:pic>
+          <p:nvPicPr>
+            <p:cNvPr id="19" name="Picture 4" descr="Starter query samples - Azure Resource Graph | Microsoft Docs">
+              <a:extLst>
+                <a:ext uri="{FF2B5EF4-FFF2-40B4-BE49-F238E27FC236}">
+                  <a16:creationId xmlns:a16="http://schemas.microsoft.com/office/drawing/2014/main" id="{A482E936-2932-401B-A3F4-9EBA47798CAB}"/>
+                </a:ext>
+              </a:extLst>
+            </p:cNvPr>
+            <p:cNvPicPr>
+              <a:picLocks noChangeAspect="1" noChangeArrowheads="1"/>
+            </p:cNvPicPr>
+            <p:nvPr/>
+          </p:nvPicPr>
+          <p:blipFill>
+            <a:blip r:embed="rId7">
+              <a:extLst>
+                <a:ext uri="{BEBA8EAE-BF5A-486C-A8C5-ECC9F3942E4B}">
+                  <a14:imgProps xmlns:a14="http://schemas.microsoft.com/office/drawing/2010/main">
+                    <a14:imgLayer r:embed="rId8">
+                      <a14:imgEffect>
+                        <a14:backgroundRemoval t="4000" b="95556" l="889" r="93778">
+                          <a14:foregroundMark x1="4889" y1="22222" x2="13333" y2="9333"/>
+                          <a14:foregroundMark x1="1333" y1="16889" x2="1333" y2="16889"/>
+                          <a14:foregroundMark x1="81778" y1="20000" x2="81778" y2="20000"/>
+                          <a14:foregroundMark x1="75111" y1="18667" x2="75111" y2="16444"/>
+                          <a14:foregroundMark x1="67111" y1="16000" x2="89778" y2="18222"/>
+                          <a14:foregroundMark x1="89778" y1="18222" x2="68000" y2="17333"/>
+                          <a14:foregroundMark x1="94222" y1="23111" x2="94222" y2="23111"/>
+                          <a14:foregroundMark x1="79556" y1="4444" x2="79556" y2="4444"/>
+                          <a14:foregroundMark x1="54667" y1="72444" x2="54667" y2="72444"/>
+                          <a14:foregroundMark x1="56889" y1="91556" x2="56889" y2="91556"/>
+                          <a14:foregroundMark x1="56444" y1="95556" x2="56444" y2="95556"/>
+                        </a14:backgroundRemoval>
+                      </a14:imgEffect>
+                    </a14:imgLayer>
+                  </a14:imgProps>
+                </a:ext>
+                <a:ext uri="{28A0092B-C50C-407E-A947-70E740481C1C}">
+                  <a14:useLocalDpi xmlns:a14="http://schemas.microsoft.com/office/drawing/2010/main" val="0"/>
+                </a:ext>
+              </a:extLst>
+            </a:blip>
+            <a:srcRect/>
+            <a:stretch>
+              <a:fillRect/>
+            </a:stretch>
+          </p:blipFill>
+          <p:spPr bwMode="auto">
+            <a:xfrm>
+              <a:off x="7637290" y="3854676"/>
+              <a:ext cx="491842" cy="491842"/>
+            </a:xfrm>
+            <a:prstGeom prst="rect">
+              <a:avLst/>
+            </a:prstGeom>
+            <a:noFill/>
+            <a:extLst>
+              <a:ext uri="{909E8E84-426E-40DD-AFC4-6F175D3DCCD1}">
+                <a14:hiddenFill xmlns:a14="http://schemas.microsoft.com/office/drawing/2010/main">
+                  <a:solidFill>
+                    <a:srgbClr val="FFFFFF"/>
+                  </a:solidFill>
+                </a14:hiddenFill>
+              </a:ext>
+            </a:extLst>
+          </p:spPr>
+        </p:pic>
+        <p:sp>
+          <p:nvSpPr>
+            <p:cNvPr id="37" name="TextBox 36">
+              <a:extLst>
+                <a:ext uri="{FF2B5EF4-FFF2-40B4-BE49-F238E27FC236}">
+                  <a16:creationId xmlns:a16="http://schemas.microsoft.com/office/drawing/2014/main" id="{3FA1E3FC-005E-4898-ADB9-EF3D64D2613D}"/>
+                </a:ext>
+              </a:extLst>
+            </p:cNvPr>
+            <p:cNvSpPr txBox="1"/>
+            <p:nvPr/>
+          </p:nvSpPr>
+          <p:spPr>
+            <a:xfrm>
+              <a:off x="6982900" y="4384291"/>
+              <a:ext cx="1800621" cy="307777"/>
+            </a:xfrm>
+            <a:prstGeom prst="rect">
+              <a:avLst/>
+            </a:prstGeom>
+            <a:noFill/>
+          </p:spPr>
+          <p:txBody>
+            <a:bodyPr wrap="none" rtlCol="0">
+              <a:spAutoFit/>
+            </a:bodyPr>
+            <a:lstStyle/>
+            <a:p>
+              <a:r>
+                <a:rPr lang="en-US" sz="1400" dirty="0"/>
+                <a:t>Azure Resource Graph</a:t>
+              </a:r>
+              <a:endParaRPr lang="LID4096" sz="1400" dirty="0"/>
+            </a:p>
+          </p:txBody>
+        </p:sp>
+      </p:grpSp>
+      <p:sp>
+        <p:nvSpPr>
+          <p:cNvPr id="40" name="TextBox 39">
+            <a:extLst>
+              <a:ext uri="{FF2B5EF4-FFF2-40B4-BE49-F238E27FC236}">
+                <a16:creationId xmlns:a16="http://schemas.microsoft.com/office/drawing/2014/main" id="{FFB670D0-AB2D-42A9-AFCA-3D9EB5EA1765}"/>
+              </a:ext>
+            </a:extLst>
+          </p:cNvPr>
+          <p:cNvSpPr txBox="1"/>
+          <p:nvPr/>
+        </p:nvSpPr>
+        <p:spPr>
+          <a:xfrm>
+            <a:off x="4319366" y="3665697"/>
+            <a:ext cx="2509020" cy="430887"/>
+          </a:xfrm>
+          <a:prstGeom prst="rect">
+            <a:avLst/>
+          </a:prstGeom>
+          <a:noFill/>
+        </p:spPr>
+        <p:txBody>
+          <a:bodyPr wrap="none" rtlCol="0">
+            <a:spAutoFit/>
+          </a:bodyPr>
+          <a:lstStyle/>
+          <a:p>
+            <a:r>
+              <a:rPr lang="en-US" sz="1100" i="1" dirty="0"/>
+              <a:t>Query declared metrics</a:t>
+            </a:r>
+          </a:p>
+          <a:p>
+            <a:r>
+              <a:rPr lang="en-US" sz="1100" i="1" dirty="0"/>
+              <a:t>for declared and/or discovered resources</a:t>
+            </a:r>
+            <a:endParaRPr lang="LID4096" sz="1100" i="1" dirty="0"/>
+          </a:p>
+        </p:txBody>
+      </p:sp>
+      <p:sp>
+        <p:nvSpPr>
+          <p:cNvPr id="41" name="TextBox 40">
+            <a:extLst>
+              <a:ext uri="{FF2B5EF4-FFF2-40B4-BE49-F238E27FC236}">
+                <a16:creationId xmlns:a16="http://schemas.microsoft.com/office/drawing/2014/main" id="{0A9014DC-BB0F-4114-9466-AD9B8008D675}"/>
+              </a:ext>
+            </a:extLst>
+          </p:cNvPr>
+          <p:cNvSpPr txBox="1"/>
+          <p:nvPr/>
+        </p:nvSpPr>
+        <p:spPr>
+          <a:xfrm>
+            <a:off x="8608958" y="3665697"/>
+            <a:ext cx="1858201" cy="430887"/>
+          </a:xfrm>
+          <a:prstGeom prst="rect">
+            <a:avLst/>
+          </a:prstGeom>
+          <a:noFill/>
+        </p:spPr>
+        <p:txBody>
+          <a:bodyPr wrap="none" rtlCol="0">
+            <a:spAutoFit/>
+          </a:bodyPr>
+          <a:lstStyle/>
+          <a:p>
+            <a:r>
+              <a:rPr lang="en-US" sz="1100" i="1" dirty="0"/>
+              <a:t>Query resource based</a:t>
+            </a:r>
+            <a:br>
+              <a:rPr lang="en-US" sz="1100" i="1" dirty="0"/>
+            </a:br>
+            <a:r>
+              <a:rPr lang="en-US" sz="1100" i="1" dirty="0"/>
+              <a:t>on Azure landscape &amp; criteria</a:t>
+            </a:r>
+            <a:endParaRPr lang="LID4096" sz="1100" i="1" dirty="0"/>
+          </a:p>
+        </p:txBody>
+      </p:sp>
+      <p:sp>
+        <p:nvSpPr>
+          <p:cNvPr id="42" name="TextBox 41">
+            <a:extLst>
+              <a:ext uri="{FF2B5EF4-FFF2-40B4-BE49-F238E27FC236}">
+                <a16:creationId xmlns:a16="http://schemas.microsoft.com/office/drawing/2014/main" id="{39CE922B-C9A0-43BB-81BD-5AADFD639DA5}"/>
+              </a:ext>
+            </a:extLst>
+          </p:cNvPr>
+          <p:cNvSpPr txBox="1"/>
+          <p:nvPr/>
+        </p:nvSpPr>
+        <p:spPr>
+          <a:xfrm>
+            <a:off x="5581450" y="2536519"/>
+            <a:ext cx="1603324" cy="600164"/>
+          </a:xfrm>
+          <a:prstGeom prst="rect">
+            <a:avLst/>
+          </a:prstGeom>
+          <a:noFill/>
+        </p:spPr>
+        <p:txBody>
+          <a:bodyPr wrap="none" rtlCol="0">
+            <a:spAutoFit/>
+          </a:bodyPr>
+          <a:lstStyle/>
+          <a:p>
+            <a:r>
+              <a:rPr lang="en-US" sz="1100" i="1" dirty="0"/>
+              <a:t>Get discovered resources</a:t>
+            </a:r>
+            <a:br>
+              <a:rPr lang="en-US" sz="1100" i="1" dirty="0"/>
+            </a:br>
+            <a:br>
+              <a:rPr lang="en-US" sz="1100" i="1" dirty="0"/>
+            </a:br>
+            <a:r>
+              <a:rPr lang="en-US" sz="1100" i="1" dirty="0"/>
+              <a:t>for given discovery group</a:t>
+            </a:r>
+            <a:endParaRPr lang="LID4096" sz="1100" i="1" dirty="0"/>
+          </a:p>
+        </p:txBody>
+      </p:sp>
+    </p:spTree>
+    <p:extLst>
+      <p:ext uri="{BB962C8B-B14F-4D97-AF65-F5344CB8AC3E}">
+        <p14:creationId xmlns:p14="http://schemas.microsoft.com/office/powerpoint/2010/main" val="1121660994"/>
+      </p:ext>
+    </p:extLst>
+  </p:cSld>
+  <p:clrMapOvr>
+    <a:masterClrMapping/>
+  </p:clrMapOvr>
+</p:sld>
+</file>
+
+<file path=ppt/slides/slide6.xml><?xml version="1.0" encoding="utf-8"?>
+<p:sld xmlns:a="http://schemas.openxmlformats.org/drawingml/2006/main" xmlns:r="http://schemas.openxmlformats.org/officeDocument/2006/relationships" xmlns:p="http://schemas.openxmlformats.org/presentationml/2006/main">
+  <p:cSld>
+    <p:spTree>
+      <p:nvGrpSpPr>
+        <p:cNvPr id="1" name=""/>
+        <p:cNvGrpSpPr/>
+        <p:nvPr/>
+      </p:nvGrpSpPr>
+      <p:grpSpPr>
+        <a:xfrm>
+          <a:off x="0" y="0"/>
+          <a:ext cx="0" cy="0"/>
+          <a:chOff x="0" y="0"/>
+          <a:chExt cx="0" cy="0"/>
+        </a:xfrm>
+      </p:grpSpPr>
+      <p:grpSp>
+        <p:nvGrpSpPr>
+          <p:cNvPr id="53" name="Group 52">
+            <a:extLst>
+              <a:ext uri="{FF2B5EF4-FFF2-40B4-BE49-F238E27FC236}">
+                <a16:creationId xmlns:a16="http://schemas.microsoft.com/office/drawing/2014/main" id="{E6119613-5F28-443B-8BB1-42A6D38E7916}"/>
+              </a:ext>
+            </a:extLst>
+          </p:cNvPr>
+          <p:cNvGrpSpPr/>
+          <p:nvPr/>
+        </p:nvGrpSpPr>
+        <p:grpSpPr>
+          <a:xfrm>
+            <a:off x="1027713" y="5239677"/>
+            <a:ext cx="5753617" cy="1452705"/>
+            <a:chOff x="1330296" y="4699745"/>
+            <a:chExt cx="5753617" cy="1452705"/>
+          </a:xfrm>
+        </p:grpSpPr>
+        <p:pic>
+          <p:nvPicPr>
+            <p:cNvPr id="1030" name="Picture 6">
+              <a:extLst>
+                <a:ext uri="{FF2B5EF4-FFF2-40B4-BE49-F238E27FC236}">
+                  <a16:creationId xmlns:a16="http://schemas.microsoft.com/office/drawing/2014/main" id="{046F0A51-BBB9-4F17-801A-69684EB923C7}"/>
+                </a:ext>
+              </a:extLst>
+            </p:cNvPr>
+            <p:cNvPicPr>
+              <a:picLocks noChangeAspect="1" noChangeArrowheads="1"/>
+            </p:cNvPicPr>
+            <p:nvPr/>
+          </p:nvPicPr>
+          <p:blipFill rotWithShape="1">
+            <a:blip r:embed="rId2">
+              <a:extLst>
+                <a:ext uri="{28A0092B-C50C-407E-A947-70E740481C1C}">
+                  <a14:useLocalDpi xmlns:a14="http://schemas.microsoft.com/office/drawing/2010/main" val="0"/>
+                </a:ext>
+              </a:extLst>
+            </a:blip>
+            <a:srcRect l="4026" t="17466" r="9610" b="10075"/>
+            <a:stretch/>
+          </p:blipFill>
+          <p:spPr bwMode="auto">
+            <a:xfrm>
+              <a:off x="1330296" y="4699745"/>
+              <a:ext cx="1710746" cy="489600"/>
+            </a:xfrm>
+            <a:prstGeom prst="rect">
+              <a:avLst/>
+            </a:prstGeom>
+            <a:noFill/>
+            <a:extLst>
+              <a:ext uri="{909E8E84-426E-40DD-AFC4-6F175D3DCCD1}">
+                <a14:hiddenFill xmlns:a14="http://schemas.microsoft.com/office/drawing/2010/main">
+                  <a:solidFill>
+                    <a:srgbClr val="FFFFFF"/>
+                  </a:solidFill>
+                </a14:hiddenFill>
+              </a:ext>
+            </a:extLst>
+          </p:spPr>
+        </p:pic>
+        <p:pic>
+          <p:nvPicPr>
+            <p:cNvPr id="9" name="Picture 4" descr="Statuspage | Atlassian">
+              <a:extLst>
+                <a:ext uri="{FF2B5EF4-FFF2-40B4-BE49-F238E27FC236}">
+                  <a16:creationId xmlns:a16="http://schemas.microsoft.com/office/drawing/2014/main" id="{ED0E2EE6-F25D-4B8F-83AA-A9112BCEE768}"/>
+                </a:ext>
+              </a:extLst>
+            </p:cNvPr>
+            <p:cNvPicPr>
+              <a:picLocks noChangeAspect="1" noChangeArrowheads="1"/>
+            </p:cNvPicPr>
+            <p:nvPr/>
+          </p:nvPicPr>
+          <p:blipFill>
+            <a:blip r:embed="rId3">
+              <a:extLst>
+                <a:ext uri="{28A0092B-C50C-407E-A947-70E740481C1C}">
+                  <a14:useLocalDpi xmlns:a14="http://schemas.microsoft.com/office/drawing/2010/main" val="0"/>
+                </a:ext>
+              </a:extLst>
+            </a:blip>
+            <a:srcRect/>
+            <a:stretch>
+              <a:fillRect/>
+            </a:stretch>
+          </p:blipFill>
+          <p:spPr bwMode="auto">
+            <a:xfrm>
+              <a:off x="3275569" y="5198039"/>
+              <a:ext cx="1937542" cy="280990"/>
+            </a:xfrm>
+            <a:prstGeom prst="rect">
+              <a:avLst/>
+            </a:prstGeom>
+            <a:noFill/>
+            <a:extLst>
+              <a:ext uri="{909E8E84-426E-40DD-AFC4-6F175D3DCCD1}">
+                <a14:hiddenFill xmlns:a14="http://schemas.microsoft.com/office/drawing/2010/main">
+                  <a:solidFill>
+                    <a:srgbClr val="FFFFFF"/>
+                  </a:solidFill>
+                </a14:hiddenFill>
+              </a:ext>
+            </a:extLst>
+          </p:spPr>
+        </p:pic>
+        <p:pic>
+          <p:nvPicPr>
+            <p:cNvPr id="10" name="Picture 8">
+              <a:extLst>
+                <a:ext uri="{FF2B5EF4-FFF2-40B4-BE49-F238E27FC236}">
+                  <a16:creationId xmlns:a16="http://schemas.microsoft.com/office/drawing/2014/main" id="{CEDA630D-175A-4E24-AD69-628B82FF0939}"/>
+                </a:ext>
+              </a:extLst>
+            </p:cNvPr>
+            <p:cNvPicPr>
+              <a:picLocks noChangeAspect="1" noChangeArrowheads="1"/>
+            </p:cNvPicPr>
+            <p:nvPr/>
+          </p:nvPicPr>
+          <p:blipFill rotWithShape="1">
+            <a:blip r:embed="rId4">
+              <a:extLst>
+                <a:ext uri="{28A0092B-C50C-407E-A947-70E740481C1C}">
+                  <a14:useLocalDpi xmlns:a14="http://schemas.microsoft.com/office/drawing/2010/main" val="0"/>
+                </a:ext>
+              </a:extLst>
+            </a:blip>
+            <a:srcRect l="1807" t="16125" r="4250" b="14397"/>
+            <a:stretch/>
+          </p:blipFill>
+          <p:spPr bwMode="auto">
+            <a:xfrm>
+              <a:off x="5657503" y="4709412"/>
+              <a:ext cx="1426410" cy="470266"/>
+            </a:xfrm>
+            <a:prstGeom prst="rect">
+              <a:avLst/>
+            </a:prstGeom>
+            <a:noFill/>
+            <a:extLst>
+              <a:ext uri="{909E8E84-426E-40DD-AFC4-6F175D3DCCD1}">
+                <a14:hiddenFill xmlns:a14="http://schemas.microsoft.com/office/drawing/2010/main">
+                  <a:solidFill>
+                    <a:srgbClr val="FFFFFF"/>
+                  </a:solidFill>
+                </a14:hiddenFill>
+              </a:ext>
+            </a:extLst>
+          </p:spPr>
+        </p:pic>
+        <p:pic>
+          <p:nvPicPr>
+            <p:cNvPr id="1028" name="Picture 4">
+              <a:extLst>
+                <a:ext uri="{FF2B5EF4-FFF2-40B4-BE49-F238E27FC236}">
+                  <a16:creationId xmlns:a16="http://schemas.microsoft.com/office/drawing/2014/main" id="{32E0A0BE-E810-4EF4-949E-10FFDC71E520}"/>
+                </a:ext>
+              </a:extLst>
+            </p:cNvPr>
+            <p:cNvPicPr>
+              <a:picLocks noChangeAspect="1" noChangeArrowheads="1"/>
+            </p:cNvPicPr>
+            <p:nvPr/>
+          </p:nvPicPr>
+          <p:blipFill rotWithShape="1">
+            <a:blip r:embed="rId5">
+              <a:extLst>
+                <a:ext uri="{28A0092B-C50C-407E-A947-70E740481C1C}">
+                  <a14:useLocalDpi xmlns:a14="http://schemas.microsoft.com/office/drawing/2010/main" val="0"/>
+                </a:ext>
+              </a:extLst>
+            </a:blip>
+            <a:srcRect l="3094" t="15107" r="3094" b="15107"/>
+            <a:stretch/>
+          </p:blipFill>
+          <p:spPr bwMode="auto">
+            <a:xfrm>
+              <a:off x="5736749" y="5680850"/>
+              <a:ext cx="1267917" cy="471600"/>
+            </a:xfrm>
+            <a:prstGeom prst="rect">
+              <a:avLst/>
+            </a:prstGeom>
+            <a:noFill/>
+            <a:extLst>
+              <a:ext uri="{909E8E84-426E-40DD-AFC4-6F175D3DCCD1}">
+                <a14:hiddenFill xmlns:a14="http://schemas.microsoft.com/office/drawing/2010/main">
+                  <a:solidFill>
+                    <a:srgbClr val="FFFFFF"/>
+                  </a:solidFill>
+                </a14:hiddenFill>
+              </a:ext>
+            </a:extLst>
+          </p:spPr>
+        </p:pic>
+        <p:sp>
+          <p:nvSpPr>
+            <p:cNvPr id="6" name="TextBox 5">
+              <a:extLst>
+                <a:ext uri="{FF2B5EF4-FFF2-40B4-BE49-F238E27FC236}">
+                  <a16:creationId xmlns:a16="http://schemas.microsoft.com/office/drawing/2014/main" id="{4315D58D-2286-4E77-B3B2-F97BE6A1D17A}"/>
+                </a:ext>
+              </a:extLst>
+            </p:cNvPr>
+            <p:cNvSpPr txBox="1"/>
+            <p:nvPr/>
+          </p:nvSpPr>
+          <p:spPr>
+            <a:xfrm>
+              <a:off x="1422768" y="5125784"/>
+              <a:ext cx="1525802" cy="307777"/>
+            </a:xfrm>
+            <a:prstGeom prst="rect">
+              <a:avLst/>
+            </a:prstGeom>
+            <a:noFill/>
+          </p:spPr>
+          <p:txBody>
+            <a:bodyPr wrap="none" rtlCol="0">
+              <a:spAutoFit/>
+            </a:bodyPr>
+            <a:lstStyle/>
+            <a:p>
+              <a:r>
+                <a:rPr lang="en-US" sz="1400" i="1" dirty="0" err="1">
+                  <a:latin typeface="+mj-lt"/>
+                </a:rPr>
+                <a:t>StatsD</a:t>
+              </a:r>
+              <a:r>
+                <a:rPr lang="en-US" sz="1400" i="1" dirty="0">
+                  <a:latin typeface="+mj-lt"/>
+                </a:rPr>
+                <a:t>-compatible</a:t>
+              </a:r>
+              <a:endParaRPr lang="LID4096" sz="1400" i="1" dirty="0">
+                <a:latin typeface="+mj-lt"/>
+              </a:endParaRPr>
+            </a:p>
+          </p:txBody>
+        </p:sp>
+        <p:cxnSp>
+          <p:nvCxnSpPr>
+            <p:cNvPr id="27" name="Straight Arrow Connector 26">
+              <a:extLst>
+                <a:ext uri="{FF2B5EF4-FFF2-40B4-BE49-F238E27FC236}">
+                  <a16:creationId xmlns:a16="http://schemas.microsoft.com/office/drawing/2014/main" id="{A6FE7C94-FF74-4A7C-9909-25DBF4CD6AC2}"/>
+                </a:ext>
+              </a:extLst>
+            </p:cNvPr>
+            <p:cNvCxnSpPr>
+              <a:cxnSpLocks/>
+              <a:stCxn id="1028" idx="0"/>
+              <a:endCxn id="10" idx="2"/>
+            </p:cNvCxnSpPr>
+            <p:nvPr/>
+          </p:nvCxnSpPr>
+          <p:spPr>
+            <a:xfrm flipV="1">
+              <a:off x="6370708" y="5179678"/>
+              <a:ext cx="0" cy="501172"/>
+            </a:xfrm>
+            <a:prstGeom prst="straightConnector1">
+              <a:avLst/>
+            </a:prstGeom>
+            <a:ln>
+              <a:prstDash val="solid"/>
+              <a:tailEnd type="triangle"/>
+            </a:ln>
+          </p:spPr>
+          <p:style>
+            <a:lnRef idx="1">
+              <a:schemeClr val="dk1"/>
+            </a:lnRef>
+            <a:fillRef idx="0">
+              <a:schemeClr val="dk1"/>
+            </a:fillRef>
+            <a:effectRef idx="0">
+              <a:schemeClr val="dk1"/>
+            </a:effectRef>
+            <a:fontRef idx="minor">
+              <a:schemeClr val="tx1"/>
+            </a:fontRef>
+          </p:style>
+        </p:cxnSp>
+      </p:grpSp>
+      <p:grpSp>
+        <p:nvGrpSpPr>
+          <p:cNvPr id="65" name="Group 64">
+            <a:extLst>
+              <a:ext uri="{FF2B5EF4-FFF2-40B4-BE49-F238E27FC236}">
+                <a16:creationId xmlns:a16="http://schemas.microsoft.com/office/drawing/2014/main" id="{3CBE6387-19D3-4EF3-A0A0-F413876942F7}"/>
+              </a:ext>
+            </a:extLst>
+          </p:cNvPr>
+          <p:cNvGrpSpPr/>
+          <p:nvPr/>
+        </p:nvGrpSpPr>
+        <p:grpSpPr>
+          <a:xfrm>
+            <a:off x="116518" y="3073211"/>
+            <a:ext cx="9608813" cy="1390000"/>
+            <a:chOff x="419101" y="3073211"/>
+            <a:chExt cx="9608813" cy="1390000"/>
+          </a:xfrm>
+        </p:grpSpPr>
+        <p:grpSp>
+          <p:nvGrpSpPr>
+            <p:cNvPr id="45" name="Group 44">
+              <a:extLst>
+                <a:ext uri="{FF2B5EF4-FFF2-40B4-BE49-F238E27FC236}">
+                  <a16:creationId xmlns:a16="http://schemas.microsoft.com/office/drawing/2014/main" id="{EBC70A22-5AF3-4819-8498-7E8EED3D95E9}"/>
+                </a:ext>
+              </a:extLst>
+            </p:cNvPr>
+            <p:cNvGrpSpPr/>
+            <p:nvPr/>
+          </p:nvGrpSpPr>
+          <p:grpSpPr>
+            <a:xfrm>
+              <a:off x="419101" y="3073211"/>
+              <a:ext cx="9608813" cy="1390000"/>
+              <a:chOff x="419101" y="2145681"/>
+              <a:chExt cx="9608813" cy="1390000"/>
+            </a:xfrm>
+          </p:grpSpPr>
+          <p:sp>
+            <p:nvSpPr>
+              <p:cNvPr id="26" name="Rectangle 25">
+                <a:extLst>
+                  <a:ext uri="{FF2B5EF4-FFF2-40B4-BE49-F238E27FC236}">
+                    <a16:creationId xmlns:a16="http://schemas.microsoft.com/office/drawing/2014/main" id="{659BE901-B66A-471D-A3A8-7BC43DEB9815}"/>
+                  </a:ext>
+                </a:extLst>
+              </p:cNvPr>
+              <p:cNvSpPr/>
+              <p:nvPr/>
+            </p:nvSpPr>
+            <p:spPr>
+              <a:xfrm>
+                <a:off x="419101" y="2145681"/>
+                <a:ext cx="9608813" cy="1390000"/>
+              </a:xfrm>
+              <a:prstGeom prst="rect">
+                <a:avLst/>
+              </a:prstGeom>
+            </p:spPr>
+            <p:style>
+              <a:lnRef idx="2">
+                <a:schemeClr val="dk1"/>
+              </a:lnRef>
+              <a:fillRef idx="1">
+                <a:schemeClr val="lt1"/>
+              </a:fillRef>
+              <a:effectRef idx="0">
+                <a:schemeClr val="dk1"/>
+              </a:effectRef>
+              <a:fontRef idx="minor">
+                <a:schemeClr val="dk1"/>
+              </a:fontRef>
+            </p:style>
+            <p:txBody>
+              <a:bodyPr rtlCol="0" anchor="ctr"/>
+              <a:lstStyle/>
+              <a:p>
+                <a:pPr algn="ctr"/>
+                <a:endParaRPr lang="LID4096" dirty="0"/>
+              </a:p>
+            </p:txBody>
+          </p:sp>
+          <p:sp>
+            <p:nvSpPr>
+              <p:cNvPr id="2" name="Rectangle 1">
+                <a:extLst>
+                  <a:ext uri="{FF2B5EF4-FFF2-40B4-BE49-F238E27FC236}">
+                    <a16:creationId xmlns:a16="http://schemas.microsoft.com/office/drawing/2014/main" id="{DF1B8298-A232-4723-91AC-B3F08648AB3F}"/>
+                  </a:ext>
+                </a:extLst>
+              </p:cNvPr>
+              <p:cNvSpPr/>
+              <p:nvPr/>
+            </p:nvSpPr>
+            <p:spPr>
+              <a:xfrm>
+                <a:off x="2999740" y="2350882"/>
+                <a:ext cx="2476498" cy="971438"/>
+              </a:xfrm>
+              <a:prstGeom prst="rect">
+                <a:avLst/>
+              </a:prstGeom>
+              <a:solidFill>
+                <a:schemeClr val="accent6">
+                  <a:lumMod val="20000"/>
+                  <a:lumOff val="80000"/>
+                </a:schemeClr>
+              </a:solidFill>
+            </p:spPr>
+            <p:style>
+              <a:lnRef idx="2">
+                <a:schemeClr val="dk1"/>
+              </a:lnRef>
+              <a:fillRef idx="1">
+                <a:schemeClr val="lt1"/>
+              </a:fillRef>
+              <a:effectRef idx="0">
+                <a:schemeClr val="dk1"/>
+              </a:effectRef>
+              <a:fontRef idx="minor">
+                <a:schemeClr val="dk1"/>
+              </a:fontRef>
+            </p:style>
+            <p:txBody>
+              <a:bodyPr rtlCol="0" anchor="ctr"/>
+              <a:lstStyle/>
+              <a:p>
+                <a:pPr algn="ctr"/>
+                <a:r>
+                  <a:rPr lang="en-US" b="1" dirty="0"/>
+                  <a:t>Scraper</a:t>
+                </a:r>
+                <a:br>
+                  <a:rPr lang="en-US" dirty="0"/>
+                </a:br>
+                <a:r>
+                  <a:rPr lang="en-US" dirty="0"/>
+                  <a:t>Agent</a:t>
+                </a:r>
+                <a:endParaRPr lang="LID4096" dirty="0"/>
+              </a:p>
+            </p:txBody>
+          </p:sp>
+          <p:sp>
+            <p:nvSpPr>
+              <p:cNvPr id="17" name="Rectangle 16">
+                <a:extLst>
+                  <a:ext uri="{FF2B5EF4-FFF2-40B4-BE49-F238E27FC236}">
+                    <a16:creationId xmlns:a16="http://schemas.microsoft.com/office/drawing/2014/main" id="{A7536292-2517-4CBC-B5B2-F992F59E166F}"/>
+                  </a:ext>
+                </a:extLst>
+              </p:cNvPr>
+              <p:cNvSpPr/>
+              <p:nvPr/>
+            </p:nvSpPr>
+            <p:spPr>
+              <a:xfrm>
+                <a:off x="7289987" y="2350882"/>
+                <a:ext cx="2476498" cy="971438"/>
+              </a:xfrm>
+              <a:prstGeom prst="rect">
+                <a:avLst/>
+              </a:prstGeom>
+              <a:solidFill>
+                <a:schemeClr val="accent6">
+                  <a:lumMod val="20000"/>
+                  <a:lumOff val="80000"/>
+                </a:schemeClr>
+              </a:solidFill>
+            </p:spPr>
+            <p:style>
+              <a:lnRef idx="2">
+                <a:schemeClr val="dk1"/>
+              </a:lnRef>
+              <a:fillRef idx="1">
+                <a:schemeClr val="lt1"/>
+              </a:fillRef>
+              <a:effectRef idx="0">
+                <a:schemeClr val="dk1"/>
+              </a:effectRef>
+              <a:fontRef idx="minor">
+                <a:schemeClr val="dk1"/>
+              </a:fontRef>
+            </p:style>
+            <p:txBody>
+              <a:bodyPr rtlCol="0" anchor="ctr"/>
+              <a:lstStyle/>
+              <a:p>
+                <a:pPr algn="ctr"/>
+                <a:r>
+                  <a:rPr lang="en-US" b="1" dirty="0"/>
+                  <a:t>Resource Discovery</a:t>
+                </a:r>
+                <a:br>
+                  <a:rPr lang="en-US" dirty="0"/>
+                </a:br>
+                <a:r>
+                  <a:rPr lang="en-US" dirty="0"/>
+                  <a:t>Agent</a:t>
+                </a:r>
+                <a:endParaRPr lang="LID4096" dirty="0"/>
+              </a:p>
+            </p:txBody>
+          </p:sp>
+          <p:cxnSp>
+            <p:nvCxnSpPr>
+              <p:cNvPr id="23" name="Straight Arrow Connector 22">
+                <a:extLst>
+                  <a:ext uri="{FF2B5EF4-FFF2-40B4-BE49-F238E27FC236}">
+                    <a16:creationId xmlns:a16="http://schemas.microsoft.com/office/drawing/2014/main" id="{90B36813-BA04-460B-8E82-BEDD95FA2500}"/>
+                  </a:ext>
+                </a:extLst>
+              </p:cNvPr>
+              <p:cNvCxnSpPr>
+                <a:cxnSpLocks/>
+                <a:stCxn id="2" idx="3"/>
+                <a:endCxn id="17" idx="1"/>
+              </p:cNvCxnSpPr>
+              <p:nvPr/>
+            </p:nvCxnSpPr>
+            <p:spPr>
+              <a:xfrm>
+                <a:off x="5476238" y="2836601"/>
+                <a:ext cx="1813749" cy="0"/>
+              </a:xfrm>
+              <a:prstGeom prst="straightConnector1">
+                <a:avLst/>
+              </a:prstGeom>
+              <a:ln>
+                <a:prstDash val="sysDash"/>
+                <a:tailEnd type="triangle"/>
+              </a:ln>
+            </p:spPr>
+            <p:style>
+              <a:lnRef idx="1">
+                <a:schemeClr val="dk1"/>
+              </a:lnRef>
+              <a:fillRef idx="0">
+                <a:schemeClr val="dk1"/>
+              </a:fillRef>
+              <a:effectRef idx="0">
+                <a:schemeClr val="dk1"/>
+              </a:effectRef>
+              <a:fontRef idx="minor">
+                <a:schemeClr val="tx1"/>
+              </a:fontRef>
+            </p:style>
+          </p:cxnSp>
+          <p:pic>
+            <p:nvPicPr>
+              <p:cNvPr id="29" name="Picture 2" descr="Promitor - Bringing Azure Monitor metrics where you need them ...">
+                <a:extLst>
+                  <a:ext uri="{FF2B5EF4-FFF2-40B4-BE49-F238E27FC236}">
+                    <a16:creationId xmlns:a16="http://schemas.microsoft.com/office/drawing/2014/main" id="{CD4A43BB-6989-448C-B653-C938D6228EE1}"/>
+                  </a:ext>
+                </a:extLst>
+              </p:cNvPr>
+              <p:cNvPicPr>
+                <a:picLocks noChangeAspect="1" noChangeArrowheads="1"/>
+              </p:cNvPicPr>
+              <p:nvPr/>
+            </p:nvPicPr>
+            <p:blipFill>
+              <a:blip r:embed="rId6">
+                <a:extLst>
+                  <a:ext uri="{28A0092B-C50C-407E-A947-70E740481C1C}">
+                    <a14:useLocalDpi xmlns:a14="http://schemas.microsoft.com/office/drawing/2010/main" val="0"/>
+                  </a:ext>
+                </a:extLst>
+              </a:blip>
+              <a:srcRect/>
+              <a:stretch>
+                <a:fillRect/>
+              </a:stretch>
+            </p:blipFill>
+            <p:spPr bwMode="auto">
+              <a:xfrm>
+                <a:off x="776295" y="2536519"/>
+                <a:ext cx="1788160" cy="600164"/>
+              </a:xfrm>
+              <a:prstGeom prst="rect">
+                <a:avLst/>
+              </a:prstGeom>
+              <a:noFill/>
+              <a:extLst>
+                <a:ext uri="{909E8E84-426E-40DD-AFC4-6F175D3DCCD1}">
+                  <a14:hiddenFill xmlns:a14="http://schemas.microsoft.com/office/drawing/2010/main">
+                    <a:solidFill>
+                      <a:srgbClr val="FFFFFF"/>
+                    </a:solidFill>
+                  </a14:hiddenFill>
+                </a:ext>
+              </a:extLst>
+            </p:spPr>
+          </p:pic>
+        </p:grpSp>
+        <p:sp>
+          <p:nvSpPr>
+            <p:cNvPr id="47" name="Rectangle 46">
+              <a:extLst>
+                <a:ext uri="{FF2B5EF4-FFF2-40B4-BE49-F238E27FC236}">
+                  <a16:creationId xmlns:a16="http://schemas.microsoft.com/office/drawing/2014/main" id="{A56628AA-F737-46AE-AE30-500E0465EE2A}"/>
+                </a:ext>
+              </a:extLst>
+            </p:cNvPr>
+            <p:cNvSpPr/>
+            <p:nvPr/>
+          </p:nvSpPr>
+          <p:spPr>
+            <a:xfrm>
+              <a:off x="2999740" y="4249850"/>
+              <a:ext cx="2476498" cy="65813"/>
+            </a:xfrm>
+            <a:prstGeom prst="rect">
+              <a:avLst/>
+            </a:prstGeom>
+            <a:noFill/>
+            <a:ln>
+              <a:noFill/>
+            </a:ln>
+          </p:spPr>
+          <p:style>
+            <a:lnRef idx="2">
+              <a:schemeClr val="dk1"/>
+            </a:lnRef>
+            <a:fillRef idx="1">
+              <a:schemeClr val="lt1"/>
+            </a:fillRef>
+            <a:effectRef idx="0">
+              <a:schemeClr val="dk1"/>
+            </a:effectRef>
+            <a:fontRef idx="minor">
+              <a:schemeClr val="dk1"/>
+            </a:fontRef>
+          </p:style>
+          <p:txBody>
+            <a:bodyPr rtlCol="0" anchor="ctr"/>
+            <a:lstStyle/>
+            <a:p>
+              <a:pPr algn="ctr"/>
+              <a:endParaRPr lang="LID4096" dirty="0"/>
+            </a:p>
+          </p:txBody>
+        </p:sp>
+        <p:sp>
+          <p:nvSpPr>
+            <p:cNvPr id="62" name="Rectangle 61">
+              <a:extLst>
+                <a:ext uri="{FF2B5EF4-FFF2-40B4-BE49-F238E27FC236}">
+                  <a16:creationId xmlns:a16="http://schemas.microsoft.com/office/drawing/2014/main" id="{C8FE18F7-21AE-4DA8-BA9C-41186F831A55}"/>
+                </a:ext>
+              </a:extLst>
+            </p:cNvPr>
+            <p:cNvSpPr/>
+            <p:nvPr/>
+          </p:nvSpPr>
+          <p:spPr>
+            <a:xfrm>
+              <a:off x="2999740" y="3212599"/>
+              <a:ext cx="2476498" cy="65813"/>
+            </a:xfrm>
+            <a:prstGeom prst="rect">
+              <a:avLst/>
+            </a:prstGeom>
+            <a:noFill/>
+            <a:ln>
+              <a:noFill/>
+            </a:ln>
+          </p:spPr>
+          <p:style>
+            <a:lnRef idx="2">
+              <a:schemeClr val="dk1"/>
+            </a:lnRef>
+            <a:fillRef idx="1">
+              <a:schemeClr val="lt1"/>
+            </a:fillRef>
+            <a:effectRef idx="0">
+              <a:schemeClr val="dk1"/>
+            </a:effectRef>
+            <a:fontRef idx="minor">
+              <a:schemeClr val="dk1"/>
+            </a:fontRef>
+          </p:style>
+          <p:txBody>
+            <a:bodyPr rtlCol="0" anchor="ctr"/>
+            <a:lstStyle/>
+            <a:p>
+              <a:pPr algn="ctr"/>
+              <a:endParaRPr lang="LID4096" dirty="0"/>
+            </a:p>
+          </p:txBody>
+        </p:sp>
+        <p:sp>
+          <p:nvSpPr>
+            <p:cNvPr id="63" name="Rectangle 62">
+              <a:extLst>
+                <a:ext uri="{FF2B5EF4-FFF2-40B4-BE49-F238E27FC236}">
+                  <a16:creationId xmlns:a16="http://schemas.microsoft.com/office/drawing/2014/main" id="{80759581-330F-420A-AB2F-CC14DB746802}"/>
+                </a:ext>
+              </a:extLst>
+            </p:cNvPr>
+            <p:cNvSpPr/>
+            <p:nvPr/>
+          </p:nvSpPr>
+          <p:spPr>
+            <a:xfrm>
+              <a:off x="7289987" y="3212598"/>
+              <a:ext cx="2476498" cy="65813"/>
+            </a:xfrm>
+            <a:prstGeom prst="rect">
+              <a:avLst/>
+            </a:prstGeom>
+            <a:noFill/>
+            <a:ln>
+              <a:noFill/>
+            </a:ln>
+          </p:spPr>
+          <p:style>
+            <a:lnRef idx="2">
+              <a:schemeClr val="dk1"/>
+            </a:lnRef>
+            <a:fillRef idx="1">
+              <a:schemeClr val="lt1"/>
+            </a:fillRef>
+            <a:effectRef idx="0">
+              <a:schemeClr val="dk1"/>
+            </a:effectRef>
+            <a:fontRef idx="minor">
+              <a:schemeClr val="dk1"/>
+            </a:fontRef>
+          </p:style>
+          <p:txBody>
+            <a:bodyPr rtlCol="0" anchor="ctr"/>
+            <a:lstStyle/>
+            <a:p>
+              <a:pPr algn="ctr"/>
+              <a:endParaRPr lang="LID4096" dirty="0"/>
+            </a:p>
+          </p:txBody>
+        </p:sp>
+      </p:grpSp>
+      <p:cxnSp>
+        <p:nvCxnSpPr>
+          <p:cNvPr id="15" name="Straight Arrow Connector 14">
+            <a:extLst>
+              <a:ext uri="{FF2B5EF4-FFF2-40B4-BE49-F238E27FC236}">
+                <a16:creationId xmlns:a16="http://schemas.microsoft.com/office/drawing/2014/main" id="{72E81A24-E430-47FF-BD31-773153BB2680}"/>
+              </a:ext>
+            </a:extLst>
+          </p:cNvPr>
+          <p:cNvCxnSpPr>
+            <a:cxnSpLocks/>
+            <a:stCxn id="47" idx="2"/>
+            <a:endCxn id="9" idx="0"/>
+          </p:cNvCxnSpPr>
+          <p:nvPr/>
+        </p:nvCxnSpPr>
+        <p:spPr>
+          <a:xfrm>
+            <a:off x="3935406" y="4315663"/>
+            <a:ext cx="6351" cy="1422308"/>
+          </a:xfrm>
+          <a:prstGeom prst="straightConnector1">
+            <a:avLst/>
+          </a:prstGeom>
+          <a:ln>
+            <a:prstDash val="solid"/>
+            <a:tailEnd type="triangle"/>
+          </a:ln>
+        </p:spPr>
+        <p:style>
+          <a:lnRef idx="1">
+            <a:schemeClr val="dk1"/>
+          </a:lnRef>
+          <a:fillRef idx="0">
+            <a:schemeClr val="dk1"/>
+          </a:fillRef>
+          <a:effectRef idx="0">
+            <a:schemeClr val="dk1"/>
+          </a:effectRef>
+          <a:fontRef idx="minor">
+            <a:schemeClr val="tx1"/>
+          </a:fontRef>
+        </p:style>
+      </p:cxnSp>
+      <p:cxnSp>
+        <p:nvCxnSpPr>
+          <p:cNvPr id="12" name="Straight Arrow Connector 11">
+            <a:extLst>
+              <a:ext uri="{FF2B5EF4-FFF2-40B4-BE49-F238E27FC236}">
+                <a16:creationId xmlns:a16="http://schemas.microsoft.com/office/drawing/2014/main" id="{0F1A70A0-68D7-4FBE-BD81-F87DCE8921F5}"/>
+              </a:ext>
+            </a:extLst>
+          </p:cNvPr>
+          <p:cNvCxnSpPr>
+            <a:cxnSpLocks/>
+            <a:endCxn id="1030" idx="0"/>
+          </p:cNvCxnSpPr>
+          <p:nvPr/>
+        </p:nvCxnSpPr>
+        <p:spPr>
+          <a:xfrm flipH="1">
+            <a:off x="1883086" y="4315663"/>
+            <a:ext cx="2052320" cy="924014"/>
+          </a:xfrm>
+          <a:prstGeom prst="straightConnector1">
+            <a:avLst/>
+          </a:prstGeom>
+          <a:ln>
+            <a:prstDash val="solid"/>
+            <a:tailEnd type="triangle"/>
+          </a:ln>
+        </p:spPr>
+        <p:style>
+          <a:lnRef idx="1">
+            <a:schemeClr val="dk1"/>
+          </a:lnRef>
+          <a:fillRef idx="0">
+            <a:schemeClr val="dk1"/>
+          </a:fillRef>
+          <a:effectRef idx="0">
+            <a:schemeClr val="dk1"/>
+          </a:effectRef>
+          <a:fontRef idx="minor">
+            <a:schemeClr val="tx1"/>
+          </a:fontRef>
+        </p:style>
+      </p:cxnSp>
+      <p:cxnSp>
+        <p:nvCxnSpPr>
+          <p:cNvPr id="21" name="Straight Arrow Connector 20">
+            <a:extLst>
+              <a:ext uri="{FF2B5EF4-FFF2-40B4-BE49-F238E27FC236}">
+                <a16:creationId xmlns:a16="http://schemas.microsoft.com/office/drawing/2014/main" id="{BAE1B440-87C8-4D06-8556-58FB14D17510}"/>
+              </a:ext>
+            </a:extLst>
+          </p:cNvPr>
+          <p:cNvCxnSpPr>
+            <a:cxnSpLocks/>
+            <a:stCxn id="10" idx="0"/>
+            <a:endCxn id="47" idx="2"/>
+          </p:cNvCxnSpPr>
+          <p:nvPr/>
+        </p:nvCxnSpPr>
+        <p:spPr>
+          <a:xfrm flipH="1" flipV="1">
+            <a:off x="3935406" y="4315663"/>
+            <a:ext cx="2132719" cy="933681"/>
+          </a:xfrm>
+          <a:prstGeom prst="straightConnector1">
+            <a:avLst/>
+          </a:prstGeom>
+          <a:ln>
+            <a:prstDash val="sysDash"/>
+            <a:tailEnd type="triangle"/>
+          </a:ln>
+        </p:spPr>
+        <p:style>
+          <a:lnRef idx="1">
+            <a:schemeClr val="dk1"/>
+          </a:lnRef>
+          <a:fillRef idx="0">
+            <a:schemeClr val="dk1"/>
+          </a:fillRef>
+          <a:effectRef idx="0">
+            <a:schemeClr val="dk1"/>
+          </a:effectRef>
+          <a:fontRef idx="minor">
+            <a:schemeClr val="tx1"/>
+          </a:fontRef>
+        </p:style>
+      </p:cxnSp>
+      <p:pic>
+        <p:nvPicPr>
+          <p:cNvPr id="56" name="Graphic 55" descr="Programmer male with solid fill">
+            <a:extLst>
+              <a:ext uri="{FF2B5EF4-FFF2-40B4-BE49-F238E27FC236}">
+                <a16:creationId xmlns:a16="http://schemas.microsoft.com/office/drawing/2014/main" id="{9D637B57-5981-459B-AC54-94A8AEDD67BA}"/>
+              </a:ext>
+            </a:extLst>
+          </p:cNvPr>
+          <p:cNvPicPr>
+            <a:picLocks noChangeAspect="1"/>
+          </p:cNvPicPr>
+          <p:nvPr/>
+        </p:nvPicPr>
+        <p:blipFill>
+          <a:blip r:embed="rId7">
+            <a:extLst>
+              <a:ext uri="{28A0092B-C50C-407E-A947-70E740481C1C}">
+                <a14:useLocalDpi xmlns:a14="http://schemas.microsoft.com/office/drawing/2010/main" val="0"/>
+              </a:ext>
+              <a:ext uri="{96DAC541-7B7A-43D3-8B79-37D633B846F1}">
+                <asvg:svgBlip xmlns:asvg="http://schemas.microsoft.com/office/drawing/2016/SVG/main" r:embed="rId8"/>
+              </a:ext>
+            </a:extLst>
+          </a:blip>
+          <a:stretch>
+            <a:fillRect/>
+          </a:stretch>
+        </p:blipFill>
+        <p:spPr>
+          <a:xfrm>
+            <a:off x="5610924" y="1383249"/>
+            <a:ext cx="914400" cy="914400"/>
+          </a:xfrm>
+          <a:prstGeom prst="rect">
+            <a:avLst/>
+          </a:prstGeom>
+        </p:spPr>
+      </p:pic>
+      <p:grpSp>
+        <p:nvGrpSpPr>
+          <p:cNvPr id="92" name="Group 91">
+            <a:extLst>
+              <a:ext uri="{FF2B5EF4-FFF2-40B4-BE49-F238E27FC236}">
+                <a16:creationId xmlns:a16="http://schemas.microsoft.com/office/drawing/2014/main" id="{77F1662A-51A6-4CB4-B688-9A6EDD68D55E}"/>
+              </a:ext>
+            </a:extLst>
+          </p:cNvPr>
+          <p:cNvGrpSpPr/>
+          <p:nvPr/>
+        </p:nvGrpSpPr>
+        <p:grpSpPr>
+          <a:xfrm>
+            <a:off x="10550423" y="4149282"/>
+            <a:ext cx="1244059" cy="837394"/>
+            <a:chOff x="3622310" y="3854675"/>
+            <a:chExt cx="1244059" cy="837394"/>
+          </a:xfrm>
+        </p:grpSpPr>
+        <p:pic>
+          <p:nvPicPr>
+            <p:cNvPr id="93" name="Picture 10" descr="Azure Monitor (@AzureMonitor) | Twitter">
+              <a:extLst>
+                <a:ext uri="{FF2B5EF4-FFF2-40B4-BE49-F238E27FC236}">
+                  <a16:creationId xmlns:a16="http://schemas.microsoft.com/office/drawing/2014/main" id="{8A243155-9046-40A7-AD57-0C899B9361BC}"/>
+                </a:ext>
+              </a:extLst>
+            </p:cNvPr>
+            <p:cNvPicPr>
+              <a:picLocks noChangeAspect="1" noChangeArrowheads="1"/>
+            </p:cNvPicPr>
+            <p:nvPr/>
+          </p:nvPicPr>
+          <p:blipFill>
+            <a:blip r:embed="rId9">
+              <a:extLst>
+                <a:ext uri="{28A0092B-C50C-407E-A947-70E740481C1C}">
+                  <a14:useLocalDpi xmlns:a14="http://schemas.microsoft.com/office/drawing/2010/main" val="0"/>
+                </a:ext>
+              </a:extLst>
+            </a:blip>
+            <a:srcRect/>
+            <a:stretch>
+              <a:fillRect/>
+            </a:stretch>
+          </p:blipFill>
+          <p:spPr bwMode="auto">
+            <a:xfrm>
+              <a:off x="3999074" y="3854675"/>
+              <a:ext cx="491841" cy="491841"/>
+            </a:xfrm>
+            <a:prstGeom prst="rect">
+              <a:avLst/>
+            </a:prstGeom>
+            <a:noFill/>
+            <a:extLst>
+              <a:ext uri="{909E8E84-426E-40DD-AFC4-6F175D3DCCD1}">
+                <a14:hiddenFill xmlns:a14="http://schemas.microsoft.com/office/drawing/2010/main">
+                  <a:solidFill>
+                    <a:srgbClr val="FFFFFF"/>
+                  </a:solidFill>
+                </a14:hiddenFill>
+              </a:ext>
+            </a:extLst>
+          </p:spPr>
+        </p:pic>
+        <p:sp>
+          <p:nvSpPr>
+            <p:cNvPr id="94" name="TextBox 93">
+              <a:extLst>
+                <a:ext uri="{FF2B5EF4-FFF2-40B4-BE49-F238E27FC236}">
+                  <a16:creationId xmlns:a16="http://schemas.microsoft.com/office/drawing/2014/main" id="{0B04B98B-0879-4444-9912-A0C3AEDAF3B7}"/>
+                </a:ext>
+              </a:extLst>
+            </p:cNvPr>
+            <p:cNvSpPr txBox="1"/>
+            <p:nvPr/>
+          </p:nvSpPr>
+          <p:spPr>
+            <a:xfrm>
+              <a:off x="3622310" y="4384292"/>
+              <a:ext cx="1244059" cy="307777"/>
+            </a:xfrm>
+            <a:prstGeom prst="rect">
+              <a:avLst/>
+            </a:prstGeom>
+            <a:noFill/>
+          </p:spPr>
+          <p:txBody>
+            <a:bodyPr wrap="none" rtlCol="0">
+              <a:spAutoFit/>
+            </a:bodyPr>
+            <a:lstStyle/>
+            <a:p>
+              <a:r>
+                <a:rPr lang="en-US" sz="1400" dirty="0"/>
+                <a:t>Azure Monitor</a:t>
+              </a:r>
+              <a:endParaRPr lang="LID4096" sz="1400" dirty="0"/>
+            </a:p>
+          </p:txBody>
+        </p:sp>
+      </p:grpSp>
+      <p:grpSp>
+        <p:nvGrpSpPr>
+          <p:cNvPr id="95" name="Group 94">
+            <a:extLst>
+              <a:ext uri="{FF2B5EF4-FFF2-40B4-BE49-F238E27FC236}">
+                <a16:creationId xmlns:a16="http://schemas.microsoft.com/office/drawing/2014/main" id="{1650958C-4DF8-4B3A-A217-7521C08CA5E9}"/>
+              </a:ext>
+            </a:extLst>
+          </p:cNvPr>
+          <p:cNvGrpSpPr/>
+          <p:nvPr/>
+        </p:nvGrpSpPr>
+        <p:grpSpPr>
+          <a:xfrm>
+            <a:off x="10274861" y="2863521"/>
+            <a:ext cx="1800621" cy="837392"/>
+            <a:chOff x="6982900" y="3854676"/>
+            <a:chExt cx="1800621" cy="837392"/>
+          </a:xfrm>
+        </p:grpSpPr>
+        <p:pic>
+          <p:nvPicPr>
+            <p:cNvPr id="96" name="Picture 4" descr="Starter query samples - Azure Resource Graph | Microsoft Docs">
+              <a:extLst>
+                <a:ext uri="{FF2B5EF4-FFF2-40B4-BE49-F238E27FC236}">
+                  <a16:creationId xmlns:a16="http://schemas.microsoft.com/office/drawing/2014/main" id="{2ADDDB2F-C460-4EDE-A1BC-55A87092B731}"/>
+                </a:ext>
+              </a:extLst>
+            </p:cNvPr>
+            <p:cNvPicPr>
+              <a:picLocks noChangeAspect="1" noChangeArrowheads="1"/>
+            </p:cNvPicPr>
+            <p:nvPr/>
+          </p:nvPicPr>
+          <p:blipFill>
+            <a:blip r:embed="rId10">
+              <a:extLst>
+                <a:ext uri="{BEBA8EAE-BF5A-486C-A8C5-ECC9F3942E4B}">
+                  <a14:imgProps xmlns:a14="http://schemas.microsoft.com/office/drawing/2010/main">
+                    <a14:imgLayer r:embed="rId11">
+                      <a14:imgEffect>
+                        <a14:backgroundRemoval t="4000" b="95556" l="889" r="93778">
+                          <a14:foregroundMark x1="4889" y1="22222" x2="13333" y2="9333"/>
+                          <a14:foregroundMark x1="1333" y1="16889" x2="1333" y2="16889"/>
+                          <a14:foregroundMark x1="81778" y1="20000" x2="81778" y2="20000"/>
+                          <a14:foregroundMark x1="75111" y1="18667" x2="75111" y2="16444"/>
+                          <a14:foregroundMark x1="67111" y1="16000" x2="89778" y2="18222"/>
+                          <a14:foregroundMark x1="89778" y1="18222" x2="68000" y2="17333"/>
+                          <a14:foregroundMark x1="94222" y1="23111" x2="94222" y2="23111"/>
+                          <a14:foregroundMark x1="79556" y1="4444" x2="79556" y2="4444"/>
+                          <a14:foregroundMark x1="54667" y1="72444" x2="54667" y2="72444"/>
+                          <a14:foregroundMark x1="56889" y1="91556" x2="56889" y2="91556"/>
+                          <a14:foregroundMark x1="56444" y1="95556" x2="56444" y2="95556"/>
+                        </a14:backgroundRemoval>
+                      </a14:imgEffect>
+                    </a14:imgLayer>
+                  </a14:imgProps>
+                </a:ext>
+                <a:ext uri="{28A0092B-C50C-407E-A947-70E740481C1C}">
+                  <a14:useLocalDpi xmlns:a14="http://schemas.microsoft.com/office/drawing/2010/main" val="0"/>
+                </a:ext>
+              </a:extLst>
+            </a:blip>
+            <a:srcRect/>
+            <a:stretch>
+              <a:fillRect/>
+            </a:stretch>
+          </p:blipFill>
+          <p:spPr bwMode="auto">
+            <a:xfrm>
+              <a:off x="7637290" y="3854676"/>
+              <a:ext cx="491842" cy="491842"/>
+            </a:xfrm>
+            <a:prstGeom prst="rect">
+              <a:avLst/>
+            </a:prstGeom>
+            <a:noFill/>
+            <a:extLst>
+              <a:ext uri="{909E8E84-426E-40DD-AFC4-6F175D3DCCD1}">
+                <a14:hiddenFill xmlns:a14="http://schemas.microsoft.com/office/drawing/2010/main">
+                  <a:solidFill>
+                    <a:srgbClr val="FFFFFF"/>
+                  </a:solidFill>
+                </a14:hiddenFill>
+              </a:ext>
+            </a:extLst>
+          </p:spPr>
+        </p:pic>
+        <p:sp>
+          <p:nvSpPr>
+            <p:cNvPr id="97" name="TextBox 96">
+              <a:extLst>
+                <a:ext uri="{FF2B5EF4-FFF2-40B4-BE49-F238E27FC236}">
+                  <a16:creationId xmlns:a16="http://schemas.microsoft.com/office/drawing/2014/main" id="{56B263F7-B210-4406-98C7-AABD2FECF3FF}"/>
+                </a:ext>
+              </a:extLst>
+            </p:cNvPr>
+            <p:cNvSpPr txBox="1"/>
+            <p:nvPr/>
+          </p:nvSpPr>
+          <p:spPr>
+            <a:xfrm>
+              <a:off x="6982900" y="4384291"/>
+              <a:ext cx="1800621" cy="307777"/>
+            </a:xfrm>
+            <a:prstGeom prst="rect">
+              <a:avLst/>
+            </a:prstGeom>
+            <a:noFill/>
+          </p:spPr>
+          <p:txBody>
+            <a:bodyPr wrap="none" rtlCol="0">
+              <a:spAutoFit/>
+            </a:bodyPr>
+            <a:lstStyle/>
+            <a:p>
+              <a:r>
+                <a:rPr lang="en-US" sz="1400" dirty="0"/>
+                <a:t>Azure Resource Graph</a:t>
+              </a:r>
+              <a:endParaRPr lang="LID4096" sz="1400" dirty="0"/>
+            </a:p>
+          </p:txBody>
+        </p:sp>
+      </p:grpSp>
+      <p:cxnSp>
+        <p:nvCxnSpPr>
+          <p:cNvPr id="91" name="Straight Arrow Connector 90">
+            <a:extLst>
+              <a:ext uri="{FF2B5EF4-FFF2-40B4-BE49-F238E27FC236}">
+                <a16:creationId xmlns:a16="http://schemas.microsoft.com/office/drawing/2014/main" id="{87B784F0-5D0E-4EBE-A1A3-5548CCCCE074}"/>
+              </a:ext>
+            </a:extLst>
+          </p:cNvPr>
+          <p:cNvCxnSpPr>
+            <a:cxnSpLocks/>
+            <a:stCxn id="26" idx="3"/>
+            <a:endCxn id="96" idx="1"/>
+          </p:cNvCxnSpPr>
+          <p:nvPr/>
+        </p:nvCxnSpPr>
+        <p:spPr>
+          <a:xfrm flipV="1">
+            <a:off x="9725331" y="3109442"/>
+            <a:ext cx="1203920" cy="658769"/>
+          </a:xfrm>
+          <a:prstGeom prst="bentConnector3">
+            <a:avLst>
+              <a:gd name="adj1" fmla="val 36980"/>
+            </a:avLst>
+          </a:prstGeom>
+          <a:ln>
+            <a:prstDash val="lgDash"/>
+            <a:tailEnd type="triangle"/>
+          </a:ln>
+        </p:spPr>
+        <p:style>
+          <a:lnRef idx="1">
+            <a:schemeClr val="dk1"/>
+          </a:lnRef>
+          <a:fillRef idx="0">
+            <a:schemeClr val="dk1"/>
+          </a:fillRef>
+          <a:effectRef idx="0">
+            <a:schemeClr val="dk1"/>
+          </a:effectRef>
+          <a:fontRef idx="minor">
+            <a:schemeClr val="tx1"/>
+          </a:fontRef>
+        </p:style>
+      </p:cxnSp>
+      <p:cxnSp>
+        <p:nvCxnSpPr>
+          <p:cNvPr id="102" name="Straight Arrow Connector 101">
+            <a:extLst>
+              <a:ext uri="{FF2B5EF4-FFF2-40B4-BE49-F238E27FC236}">
+                <a16:creationId xmlns:a16="http://schemas.microsoft.com/office/drawing/2014/main" id="{2A76A497-8EDD-4B51-A912-162817016642}"/>
+              </a:ext>
+            </a:extLst>
+          </p:cNvPr>
+          <p:cNvCxnSpPr>
+            <a:cxnSpLocks/>
+            <a:stCxn id="26" idx="3"/>
+            <a:endCxn id="93" idx="1"/>
+          </p:cNvCxnSpPr>
+          <p:nvPr/>
+        </p:nvCxnSpPr>
+        <p:spPr>
+          <a:xfrm>
+            <a:off x="9725331" y="3768211"/>
+            <a:ext cx="1201856" cy="626992"/>
+          </a:xfrm>
+          <a:prstGeom prst="bentConnector3">
+            <a:avLst>
+              <a:gd name="adj1" fmla="val 36957"/>
+            </a:avLst>
+          </a:prstGeom>
+          <a:ln>
+            <a:prstDash val="lgDash"/>
+            <a:tailEnd type="triangle"/>
+          </a:ln>
+        </p:spPr>
+        <p:style>
+          <a:lnRef idx="1">
+            <a:schemeClr val="dk1"/>
+          </a:lnRef>
+          <a:fillRef idx="0">
+            <a:schemeClr val="dk1"/>
+          </a:fillRef>
+          <a:effectRef idx="0">
+            <a:schemeClr val="dk1"/>
+          </a:effectRef>
+          <a:fontRef idx="minor">
+            <a:schemeClr val="tx1"/>
+          </a:fontRef>
+        </p:style>
+      </p:cxnSp>
+      <p:cxnSp>
+        <p:nvCxnSpPr>
+          <p:cNvPr id="112" name="Straight Arrow Connector 73">
+            <a:extLst>
+              <a:ext uri="{FF2B5EF4-FFF2-40B4-BE49-F238E27FC236}">
+                <a16:creationId xmlns:a16="http://schemas.microsoft.com/office/drawing/2014/main" id="{D55F0418-6C74-4193-A924-56B44736A4C2}"/>
+              </a:ext>
+            </a:extLst>
+          </p:cNvPr>
+          <p:cNvCxnSpPr>
+            <a:cxnSpLocks/>
+            <a:stCxn id="56" idx="2"/>
+            <a:endCxn id="63" idx="0"/>
+          </p:cNvCxnSpPr>
+          <p:nvPr/>
+        </p:nvCxnSpPr>
+        <p:spPr>
+          <a:xfrm rot="16200000" flipH="1">
+            <a:off x="6689414" y="1676358"/>
+            <a:ext cx="914949" cy="2157529"/>
+          </a:xfrm>
+          <a:prstGeom prst="bentConnector3">
+            <a:avLst>
+              <a:gd name="adj1" fmla="val 50000"/>
+            </a:avLst>
+          </a:prstGeom>
+          <a:ln>
+            <a:prstDash val="dash"/>
+            <a:tailEnd type="triangle"/>
+          </a:ln>
+        </p:spPr>
+        <p:style>
+          <a:lnRef idx="1">
+            <a:schemeClr val="dk1"/>
+          </a:lnRef>
+          <a:fillRef idx="0">
+            <a:schemeClr val="dk1"/>
+          </a:fillRef>
+          <a:effectRef idx="0">
+            <a:schemeClr val="dk1"/>
+          </a:effectRef>
+          <a:fontRef idx="minor">
+            <a:schemeClr val="tx1"/>
+          </a:fontRef>
+        </p:style>
+      </p:cxnSp>
+      <p:cxnSp>
+        <p:nvCxnSpPr>
+          <p:cNvPr id="113" name="Straight Arrow Connector 77">
+            <a:extLst>
+              <a:ext uri="{FF2B5EF4-FFF2-40B4-BE49-F238E27FC236}">
+                <a16:creationId xmlns:a16="http://schemas.microsoft.com/office/drawing/2014/main" id="{5615E08A-4816-411D-8A19-F10AC9E13CBD}"/>
+              </a:ext>
+            </a:extLst>
+          </p:cNvPr>
+          <p:cNvCxnSpPr>
+            <a:cxnSpLocks/>
+            <a:stCxn id="56" idx="2"/>
+            <a:endCxn id="62" idx="0"/>
+          </p:cNvCxnSpPr>
+          <p:nvPr/>
+        </p:nvCxnSpPr>
+        <p:spPr>
+          <a:xfrm rot="5400000">
+            <a:off x="4544290" y="1688765"/>
+            <a:ext cx="914950" cy="2132718"/>
+          </a:xfrm>
+          <a:prstGeom prst="bentConnector3">
+            <a:avLst>
+              <a:gd name="adj1" fmla="val 50000"/>
+            </a:avLst>
+          </a:prstGeom>
+          <a:ln>
+            <a:prstDash val="dash"/>
+            <a:tailEnd type="triangle"/>
+          </a:ln>
+        </p:spPr>
+        <p:style>
+          <a:lnRef idx="1">
+            <a:schemeClr val="dk1"/>
+          </a:lnRef>
+          <a:fillRef idx="0">
+            <a:schemeClr val="dk1"/>
+          </a:fillRef>
+          <a:effectRef idx="0">
+            <a:schemeClr val="dk1"/>
+          </a:effectRef>
+          <a:fontRef idx="minor">
+            <a:schemeClr val="tx1"/>
+          </a:fontRef>
+        </p:style>
+      </p:cxnSp>
+      <p:sp>
+        <p:nvSpPr>
+          <p:cNvPr id="114" name="TextBox 113">
+            <a:extLst>
+              <a:ext uri="{FF2B5EF4-FFF2-40B4-BE49-F238E27FC236}">
+                <a16:creationId xmlns:a16="http://schemas.microsoft.com/office/drawing/2014/main" id="{953929AF-FF2C-4F68-826C-B563E8CDFD0A}"/>
+              </a:ext>
+            </a:extLst>
+          </p:cNvPr>
+          <p:cNvSpPr txBox="1"/>
+          <p:nvPr/>
+        </p:nvSpPr>
+        <p:spPr>
+          <a:xfrm>
+            <a:off x="3855003" y="2462214"/>
+            <a:ext cx="1199303" cy="307777"/>
+          </a:xfrm>
+          <a:prstGeom prst="rect">
+            <a:avLst/>
+          </a:prstGeom>
+          <a:noFill/>
+        </p:spPr>
+        <p:txBody>
+          <a:bodyPr wrap="none" rtlCol="0">
+            <a:spAutoFit/>
+          </a:bodyPr>
+          <a:lstStyle/>
+          <a:p>
+            <a:r>
+              <a:rPr lang="en-US" sz="1400" dirty="0"/>
+              <a:t>:888/</a:t>
+            </a:r>
+            <a:r>
+              <a:rPr lang="en-US" sz="1400" dirty="0" err="1"/>
+              <a:t>api</a:t>
+            </a:r>
+            <a:r>
+              <a:rPr lang="en-US" sz="1400" dirty="0"/>
+              <a:t>/docs</a:t>
+            </a:r>
+            <a:endParaRPr lang="LID4096" sz="1400" dirty="0"/>
+          </a:p>
+        </p:txBody>
+      </p:sp>
+      <p:sp>
+        <p:nvSpPr>
+          <p:cNvPr id="116" name="TextBox 115">
+            <a:extLst>
+              <a:ext uri="{FF2B5EF4-FFF2-40B4-BE49-F238E27FC236}">
+                <a16:creationId xmlns:a16="http://schemas.microsoft.com/office/drawing/2014/main" id="{E13A2D58-F236-4ACA-B066-3EBFEE541FDF}"/>
+              </a:ext>
+            </a:extLst>
+          </p:cNvPr>
+          <p:cNvSpPr txBox="1"/>
+          <p:nvPr/>
+        </p:nvSpPr>
+        <p:spPr>
+          <a:xfrm>
+            <a:off x="7081942" y="2412724"/>
+            <a:ext cx="1199303" cy="307777"/>
+          </a:xfrm>
+          <a:prstGeom prst="rect">
+            <a:avLst/>
+          </a:prstGeom>
+          <a:noFill/>
+        </p:spPr>
+        <p:txBody>
+          <a:bodyPr wrap="none" rtlCol="0">
+            <a:spAutoFit/>
+          </a:bodyPr>
+          <a:lstStyle/>
+          <a:p>
+            <a:r>
+              <a:rPr lang="en-US" sz="1400" dirty="0"/>
+              <a:t>:777/</a:t>
+            </a:r>
+            <a:r>
+              <a:rPr lang="en-US" sz="1400" dirty="0" err="1"/>
+              <a:t>api</a:t>
+            </a:r>
+            <a:r>
+              <a:rPr lang="en-US" sz="1400" dirty="0"/>
+              <a:t>/docs</a:t>
+            </a:r>
+            <a:endParaRPr lang="LID4096" sz="1400" dirty="0"/>
+          </a:p>
+        </p:txBody>
+      </p:sp>
+    </p:spTree>
+    <p:extLst>
+      <p:ext uri="{BB962C8B-B14F-4D97-AF65-F5344CB8AC3E}">
+        <p14:creationId xmlns:p14="http://schemas.microsoft.com/office/powerpoint/2010/main" val="1080269003"/>
+      </p:ext>
+    </p:extLst>
+  </p:cSld>
+  <p:clrMapOvr>
+    <a:masterClrMapping/>
+  </p:clrMapOvr>
+</p:sld>
+</file>
+
+<file path=ppt/slides/slide7.xml><?xml version="1.0" encoding="utf-8"?>
+<p:sld xmlns:a="http://schemas.openxmlformats.org/drawingml/2006/main" xmlns:r="http://schemas.openxmlformats.org/officeDocument/2006/relationships" xmlns:p="http://schemas.openxmlformats.org/presentationml/2006/main">
+  <p:cSld>
+    <p:spTree>
+      <p:nvGrpSpPr>
+        <p:cNvPr id="1" name=""/>
+        <p:cNvGrpSpPr/>
+        <p:nvPr/>
+      </p:nvGrpSpPr>
+      <p:grpSpPr>
+        <a:xfrm>
+          <a:off x="0" y="0"/>
+          <a:ext cx="0" cy="0"/>
+          <a:chOff x="0" y="0"/>
+          <a:chExt cx="0" cy="0"/>
+        </a:xfrm>
+      </p:grpSpPr>
+      <p:grpSp>
+        <p:nvGrpSpPr>
+          <p:cNvPr id="53" name="Group 52">
+            <a:extLst>
+              <a:ext uri="{FF2B5EF4-FFF2-40B4-BE49-F238E27FC236}">
+                <a16:creationId xmlns:a16="http://schemas.microsoft.com/office/drawing/2014/main" id="{E6119613-5F28-443B-8BB1-42A6D38E7916}"/>
+              </a:ext>
+            </a:extLst>
+          </p:cNvPr>
+          <p:cNvGrpSpPr/>
+          <p:nvPr/>
+        </p:nvGrpSpPr>
+        <p:grpSpPr>
+          <a:xfrm>
+            <a:off x="1027713" y="5239677"/>
+            <a:ext cx="5753617" cy="1452705"/>
+            <a:chOff x="1330296" y="4699745"/>
+            <a:chExt cx="5753617" cy="1452705"/>
+          </a:xfrm>
+        </p:grpSpPr>
+        <p:pic>
+          <p:nvPicPr>
+            <p:cNvPr id="1030" name="Picture 6">
+              <a:extLst>
+                <a:ext uri="{FF2B5EF4-FFF2-40B4-BE49-F238E27FC236}">
+                  <a16:creationId xmlns:a16="http://schemas.microsoft.com/office/drawing/2014/main" id="{046F0A51-BBB9-4F17-801A-69684EB923C7}"/>
+                </a:ext>
+              </a:extLst>
+            </p:cNvPr>
+            <p:cNvPicPr>
+              <a:picLocks noChangeAspect="1" noChangeArrowheads="1"/>
+            </p:cNvPicPr>
+            <p:nvPr/>
+          </p:nvPicPr>
+          <p:blipFill rotWithShape="1">
+            <a:blip r:embed="rId2">
+              <a:extLst>
+                <a:ext uri="{28A0092B-C50C-407E-A947-70E740481C1C}">
+                  <a14:useLocalDpi xmlns:a14="http://schemas.microsoft.com/office/drawing/2010/main" val="0"/>
+                </a:ext>
+              </a:extLst>
+            </a:blip>
+            <a:srcRect l="4026" t="17466" r="9610" b="10075"/>
+            <a:stretch/>
+          </p:blipFill>
+          <p:spPr bwMode="auto">
+            <a:xfrm>
+              <a:off x="1330296" y="4699745"/>
+              <a:ext cx="1710746" cy="489600"/>
+            </a:xfrm>
+            <a:prstGeom prst="rect">
+              <a:avLst/>
+            </a:prstGeom>
+            <a:noFill/>
+            <a:extLst>
+              <a:ext uri="{909E8E84-426E-40DD-AFC4-6F175D3DCCD1}">
+                <a14:hiddenFill xmlns:a14="http://schemas.microsoft.com/office/drawing/2010/main">
+                  <a:solidFill>
+                    <a:srgbClr val="FFFFFF"/>
+                  </a:solidFill>
+                </a14:hiddenFill>
+              </a:ext>
+            </a:extLst>
+          </p:spPr>
+        </p:pic>
+        <p:pic>
+          <p:nvPicPr>
+            <p:cNvPr id="9" name="Picture 4" descr="Statuspage | Atlassian">
+              <a:extLst>
+                <a:ext uri="{FF2B5EF4-FFF2-40B4-BE49-F238E27FC236}">
+                  <a16:creationId xmlns:a16="http://schemas.microsoft.com/office/drawing/2014/main" id="{ED0E2EE6-F25D-4B8F-83AA-A9112BCEE768}"/>
+                </a:ext>
+              </a:extLst>
+            </p:cNvPr>
+            <p:cNvPicPr>
+              <a:picLocks noChangeAspect="1" noChangeArrowheads="1"/>
+            </p:cNvPicPr>
+            <p:nvPr/>
+          </p:nvPicPr>
+          <p:blipFill>
+            <a:blip r:embed="rId3">
+              <a:extLst>
+                <a:ext uri="{28A0092B-C50C-407E-A947-70E740481C1C}">
+                  <a14:useLocalDpi xmlns:a14="http://schemas.microsoft.com/office/drawing/2010/main" val="0"/>
+                </a:ext>
+              </a:extLst>
+            </a:blip>
+            <a:srcRect/>
+            <a:stretch>
+              <a:fillRect/>
+            </a:stretch>
+          </p:blipFill>
+          <p:spPr bwMode="auto">
+            <a:xfrm>
+              <a:off x="3275569" y="5198039"/>
+              <a:ext cx="1937542" cy="280990"/>
+            </a:xfrm>
+            <a:prstGeom prst="rect">
+              <a:avLst/>
+            </a:prstGeom>
+            <a:noFill/>
+            <a:extLst>
+              <a:ext uri="{909E8E84-426E-40DD-AFC4-6F175D3DCCD1}">
+                <a14:hiddenFill xmlns:a14="http://schemas.microsoft.com/office/drawing/2010/main">
+                  <a:solidFill>
+                    <a:srgbClr val="FFFFFF"/>
+                  </a:solidFill>
+                </a14:hiddenFill>
+              </a:ext>
+            </a:extLst>
+          </p:spPr>
+        </p:pic>
+        <p:pic>
+          <p:nvPicPr>
+            <p:cNvPr id="10" name="Picture 8">
+              <a:extLst>
+                <a:ext uri="{FF2B5EF4-FFF2-40B4-BE49-F238E27FC236}">
+                  <a16:creationId xmlns:a16="http://schemas.microsoft.com/office/drawing/2014/main" id="{CEDA630D-175A-4E24-AD69-628B82FF0939}"/>
+                </a:ext>
+              </a:extLst>
+            </p:cNvPr>
+            <p:cNvPicPr>
+              <a:picLocks noChangeAspect="1" noChangeArrowheads="1"/>
+            </p:cNvPicPr>
+            <p:nvPr/>
+          </p:nvPicPr>
+          <p:blipFill rotWithShape="1">
+            <a:blip r:embed="rId4">
+              <a:extLst>
+                <a:ext uri="{28A0092B-C50C-407E-A947-70E740481C1C}">
+                  <a14:useLocalDpi xmlns:a14="http://schemas.microsoft.com/office/drawing/2010/main" val="0"/>
+                </a:ext>
+              </a:extLst>
+            </a:blip>
+            <a:srcRect l="1807" t="16125" r="4250" b="14397"/>
+            <a:stretch/>
+          </p:blipFill>
+          <p:spPr bwMode="auto">
+            <a:xfrm>
+              <a:off x="5657503" y="4709412"/>
+              <a:ext cx="1426410" cy="470266"/>
+            </a:xfrm>
+            <a:prstGeom prst="rect">
+              <a:avLst/>
+            </a:prstGeom>
+            <a:noFill/>
+            <a:extLst>
+              <a:ext uri="{909E8E84-426E-40DD-AFC4-6F175D3DCCD1}">
+                <a14:hiddenFill xmlns:a14="http://schemas.microsoft.com/office/drawing/2010/main">
+                  <a:solidFill>
+                    <a:srgbClr val="FFFFFF"/>
+                  </a:solidFill>
+                </a14:hiddenFill>
+              </a:ext>
+            </a:extLst>
+          </p:spPr>
+        </p:pic>
+        <p:pic>
+          <p:nvPicPr>
+            <p:cNvPr id="1028" name="Picture 4">
+              <a:extLst>
+                <a:ext uri="{FF2B5EF4-FFF2-40B4-BE49-F238E27FC236}">
+                  <a16:creationId xmlns:a16="http://schemas.microsoft.com/office/drawing/2014/main" id="{32E0A0BE-E810-4EF4-949E-10FFDC71E520}"/>
+                </a:ext>
+              </a:extLst>
+            </p:cNvPr>
+            <p:cNvPicPr>
+              <a:picLocks noChangeAspect="1" noChangeArrowheads="1"/>
+            </p:cNvPicPr>
+            <p:nvPr/>
+          </p:nvPicPr>
+          <p:blipFill rotWithShape="1">
+            <a:blip r:embed="rId5">
+              <a:extLst>
+                <a:ext uri="{28A0092B-C50C-407E-A947-70E740481C1C}">
+                  <a14:useLocalDpi xmlns:a14="http://schemas.microsoft.com/office/drawing/2010/main" val="0"/>
+                </a:ext>
+              </a:extLst>
+            </a:blip>
+            <a:srcRect l="3094" t="15107" r="3094" b="15107"/>
+            <a:stretch/>
+          </p:blipFill>
+          <p:spPr bwMode="auto">
+            <a:xfrm>
+              <a:off x="5736749" y="5680850"/>
+              <a:ext cx="1267917" cy="471600"/>
+            </a:xfrm>
+            <a:prstGeom prst="rect">
+              <a:avLst/>
+            </a:prstGeom>
+            <a:noFill/>
+            <a:extLst>
+              <a:ext uri="{909E8E84-426E-40DD-AFC4-6F175D3DCCD1}">
+                <a14:hiddenFill xmlns:a14="http://schemas.microsoft.com/office/drawing/2010/main">
+                  <a:solidFill>
+                    <a:srgbClr val="FFFFFF"/>
+                  </a:solidFill>
+                </a14:hiddenFill>
+              </a:ext>
+            </a:extLst>
+          </p:spPr>
+        </p:pic>
+        <p:sp>
+          <p:nvSpPr>
+            <p:cNvPr id="6" name="TextBox 5">
+              <a:extLst>
+                <a:ext uri="{FF2B5EF4-FFF2-40B4-BE49-F238E27FC236}">
+                  <a16:creationId xmlns:a16="http://schemas.microsoft.com/office/drawing/2014/main" id="{4315D58D-2286-4E77-B3B2-F97BE6A1D17A}"/>
+                </a:ext>
+              </a:extLst>
+            </p:cNvPr>
+            <p:cNvSpPr txBox="1"/>
+            <p:nvPr/>
+          </p:nvSpPr>
+          <p:spPr>
+            <a:xfrm>
+              <a:off x="1422768" y="5125784"/>
+              <a:ext cx="1525802" cy="307777"/>
+            </a:xfrm>
+            <a:prstGeom prst="rect">
+              <a:avLst/>
+            </a:prstGeom>
+            <a:noFill/>
+          </p:spPr>
+          <p:txBody>
+            <a:bodyPr wrap="none" rtlCol="0">
+              <a:spAutoFit/>
+            </a:bodyPr>
+            <a:lstStyle/>
+            <a:p>
+              <a:r>
+                <a:rPr lang="en-US" sz="1400" i="1" dirty="0" err="1">
+                  <a:latin typeface="+mj-lt"/>
+                </a:rPr>
+                <a:t>StatsD</a:t>
+              </a:r>
+              <a:r>
+                <a:rPr lang="en-US" sz="1400" i="1" dirty="0">
+                  <a:latin typeface="+mj-lt"/>
+                </a:rPr>
+                <a:t>-compatible</a:t>
+              </a:r>
+              <a:endParaRPr lang="LID4096" sz="1400" i="1" dirty="0">
+                <a:latin typeface="+mj-lt"/>
+              </a:endParaRPr>
+            </a:p>
+          </p:txBody>
+        </p:sp>
+        <p:cxnSp>
+          <p:nvCxnSpPr>
+            <p:cNvPr id="27" name="Straight Arrow Connector 26">
+              <a:extLst>
+                <a:ext uri="{FF2B5EF4-FFF2-40B4-BE49-F238E27FC236}">
+                  <a16:creationId xmlns:a16="http://schemas.microsoft.com/office/drawing/2014/main" id="{A6FE7C94-FF74-4A7C-9909-25DBF4CD6AC2}"/>
+                </a:ext>
+              </a:extLst>
+            </p:cNvPr>
+            <p:cNvCxnSpPr>
+              <a:cxnSpLocks/>
+              <a:stCxn id="1028" idx="0"/>
+              <a:endCxn id="10" idx="2"/>
+            </p:cNvCxnSpPr>
+            <p:nvPr/>
+          </p:nvCxnSpPr>
+          <p:spPr>
+            <a:xfrm flipV="1">
+              <a:off x="6370708" y="5179678"/>
+              <a:ext cx="0" cy="501172"/>
+            </a:xfrm>
+            <a:prstGeom prst="straightConnector1">
+              <a:avLst/>
+            </a:prstGeom>
+            <a:ln>
+              <a:prstDash val="solid"/>
+              <a:tailEnd type="triangle"/>
+            </a:ln>
+          </p:spPr>
+          <p:style>
+            <a:lnRef idx="1">
+              <a:schemeClr val="dk1"/>
+            </a:lnRef>
+            <a:fillRef idx="0">
+              <a:schemeClr val="dk1"/>
+            </a:fillRef>
+            <a:effectRef idx="0">
+              <a:schemeClr val="dk1"/>
+            </a:effectRef>
+            <a:fontRef idx="minor">
+              <a:schemeClr val="tx1"/>
+            </a:fontRef>
+          </p:style>
+        </p:cxnSp>
+      </p:grpSp>
+      <p:grpSp>
+        <p:nvGrpSpPr>
+          <p:cNvPr id="65" name="Group 64">
+            <a:extLst>
+              <a:ext uri="{FF2B5EF4-FFF2-40B4-BE49-F238E27FC236}">
+                <a16:creationId xmlns:a16="http://schemas.microsoft.com/office/drawing/2014/main" id="{3CBE6387-19D3-4EF3-A0A0-F413876942F7}"/>
+              </a:ext>
+            </a:extLst>
+          </p:cNvPr>
+          <p:cNvGrpSpPr/>
+          <p:nvPr/>
+        </p:nvGrpSpPr>
+        <p:grpSpPr>
+          <a:xfrm>
+            <a:off x="116518" y="3073211"/>
+            <a:ext cx="9608813" cy="1390000"/>
+            <a:chOff x="419101" y="3073211"/>
+            <a:chExt cx="9608813" cy="1390000"/>
+          </a:xfrm>
+        </p:grpSpPr>
+        <p:grpSp>
+          <p:nvGrpSpPr>
+            <p:cNvPr id="45" name="Group 44">
+              <a:extLst>
+                <a:ext uri="{FF2B5EF4-FFF2-40B4-BE49-F238E27FC236}">
+                  <a16:creationId xmlns:a16="http://schemas.microsoft.com/office/drawing/2014/main" id="{EBC70A22-5AF3-4819-8498-7E8EED3D95E9}"/>
+                </a:ext>
+              </a:extLst>
+            </p:cNvPr>
+            <p:cNvGrpSpPr/>
+            <p:nvPr/>
+          </p:nvGrpSpPr>
+          <p:grpSpPr>
+            <a:xfrm>
+              <a:off x="419101" y="3073211"/>
+              <a:ext cx="9608813" cy="1390000"/>
+              <a:chOff x="419101" y="2145681"/>
+              <a:chExt cx="9608813" cy="1390000"/>
+            </a:xfrm>
+          </p:grpSpPr>
+          <p:sp>
+            <p:nvSpPr>
+              <p:cNvPr id="26" name="Rectangle 25">
+                <a:extLst>
+                  <a:ext uri="{FF2B5EF4-FFF2-40B4-BE49-F238E27FC236}">
+                    <a16:creationId xmlns:a16="http://schemas.microsoft.com/office/drawing/2014/main" id="{659BE901-B66A-471D-A3A8-7BC43DEB9815}"/>
+                  </a:ext>
+                </a:extLst>
+              </p:cNvPr>
+              <p:cNvSpPr/>
+              <p:nvPr/>
+            </p:nvSpPr>
+            <p:spPr>
+              <a:xfrm>
+                <a:off x="419101" y="2145681"/>
+                <a:ext cx="9608813" cy="1390000"/>
+              </a:xfrm>
+              <a:prstGeom prst="rect">
+                <a:avLst/>
+              </a:prstGeom>
+            </p:spPr>
+            <p:style>
+              <a:lnRef idx="2">
+                <a:schemeClr val="dk1"/>
+              </a:lnRef>
+              <a:fillRef idx="1">
+                <a:schemeClr val="lt1"/>
+              </a:fillRef>
+              <a:effectRef idx="0">
+                <a:schemeClr val="dk1"/>
+              </a:effectRef>
+              <a:fontRef idx="minor">
+                <a:schemeClr val="dk1"/>
+              </a:fontRef>
+            </p:style>
+            <p:txBody>
+              <a:bodyPr rtlCol="0" anchor="ctr"/>
+              <a:lstStyle/>
+              <a:p>
+                <a:pPr algn="ctr"/>
+                <a:endParaRPr lang="LID4096" dirty="0"/>
+              </a:p>
+            </p:txBody>
+          </p:sp>
+          <p:sp>
+            <p:nvSpPr>
+              <p:cNvPr id="2" name="Rectangle 1">
+                <a:extLst>
+                  <a:ext uri="{FF2B5EF4-FFF2-40B4-BE49-F238E27FC236}">
+                    <a16:creationId xmlns:a16="http://schemas.microsoft.com/office/drawing/2014/main" id="{DF1B8298-A232-4723-91AC-B3F08648AB3F}"/>
+                  </a:ext>
+                </a:extLst>
+              </p:cNvPr>
+              <p:cNvSpPr/>
+              <p:nvPr/>
+            </p:nvSpPr>
+            <p:spPr>
+              <a:xfrm>
+                <a:off x="2999740" y="2350882"/>
+                <a:ext cx="2476498" cy="971438"/>
+              </a:xfrm>
+              <a:prstGeom prst="rect">
+                <a:avLst/>
+              </a:prstGeom>
+              <a:solidFill>
+                <a:schemeClr val="accent6">
+                  <a:lumMod val="20000"/>
+                  <a:lumOff val="80000"/>
+                </a:schemeClr>
+              </a:solidFill>
+            </p:spPr>
+            <p:style>
+              <a:lnRef idx="2">
+                <a:schemeClr val="dk1"/>
+              </a:lnRef>
+              <a:fillRef idx="1">
+                <a:schemeClr val="lt1"/>
+              </a:fillRef>
+              <a:effectRef idx="0">
+                <a:schemeClr val="dk1"/>
+              </a:effectRef>
+              <a:fontRef idx="minor">
+                <a:schemeClr val="dk1"/>
+              </a:fontRef>
+            </p:style>
+            <p:txBody>
+              <a:bodyPr rtlCol="0" anchor="ctr"/>
+              <a:lstStyle/>
+              <a:p>
+                <a:pPr algn="ctr"/>
+                <a:r>
+                  <a:rPr lang="en-US" b="1" dirty="0"/>
+                  <a:t>Scraper</a:t>
+                </a:r>
+                <a:br>
+                  <a:rPr lang="en-US" dirty="0"/>
+                </a:br>
+                <a:r>
+                  <a:rPr lang="en-US" dirty="0"/>
+                  <a:t>Agent</a:t>
+                </a:r>
+                <a:endParaRPr lang="LID4096" dirty="0"/>
+              </a:p>
+            </p:txBody>
+          </p:sp>
+          <p:sp>
+            <p:nvSpPr>
+              <p:cNvPr id="17" name="Rectangle 16">
+                <a:extLst>
+                  <a:ext uri="{FF2B5EF4-FFF2-40B4-BE49-F238E27FC236}">
+                    <a16:creationId xmlns:a16="http://schemas.microsoft.com/office/drawing/2014/main" id="{A7536292-2517-4CBC-B5B2-F992F59E166F}"/>
+                  </a:ext>
+                </a:extLst>
+              </p:cNvPr>
+              <p:cNvSpPr/>
+              <p:nvPr/>
+            </p:nvSpPr>
+            <p:spPr>
+              <a:xfrm>
+                <a:off x="7289987" y="2350882"/>
+                <a:ext cx="2476498" cy="971438"/>
+              </a:xfrm>
+              <a:prstGeom prst="rect">
+                <a:avLst/>
+              </a:prstGeom>
+              <a:solidFill>
+                <a:schemeClr val="accent6">
+                  <a:lumMod val="20000"/>
+                  <a:lumOff val="80000"/>
+                </a:schemeClr>
+              </a:solidFill>
+            </p:spPr>
+            <p:style>
+              <a:lnRef idx="2">
+                <a:schemeClr val="dk1"/>
+              </a:lnRef>
+              <a:fillRef idx="1">
+                <a:schemeClr val="lt1"/>
+              </a:fillRef>
+              <a:effectRef idx="0">
+                <a:schemeClr val="dk1"/>
+              </a:effectRef>
+              <a:fontRef idx="minor">
+                <a:schemeClr val="dk1"/>
+              </a:fontRef>
+            </p:style>
+            <p:txBody>
+              <a:bodyPr rtlCol="0" anchor="ctr"/>
+              <a:lstStyle/>
+              <a:p>
+                <a:pPr algn="ctr"/>
+                <a:r>
+                  <a:rPr lang="en-US" b="1" dirty="0"/>
+                  <a:t>Resource Discovery</a:t>
+                </a:r>
+                <a:br>
+                  <a:rPr lang="en-US" dirty="0"/>
+                </a:br>
+                <a:r>
+                  <a:rPr lang="en-US" dirty="0"/>
+                  <a:t>Agent</a:t>
+                </a:r>
+                <a:endParaRPr lang="LID4096" dirty="0"/>
+              </a:p>
+            </p:txBody>
+          </p:sp>
+          <p:cxnSp>
+            <p:nvCxnSpPr>
+              <p:cNvPr id="23" name="Straight Arrow Connector 22">
+                <a:extLst>
+                  <a:ext uri="{FF2B5EF4-FFF2-40B4-BE49-F238E27FC236}">
+                    <a16:creationId xmlns:a16="http://schemas.microsoft.com/office/drawing/2014/main" id="{90B36813-BA04-460B-8E82-BEDD95FA2500}"/>
+                  </a:ext>
+                </a:extLst>
+              </p:cNvPr>
+              <p:cNvCxnSpPr>
+                <a:cxnSpLocks/>
+                <a:stCxn id="2" idx="3"/>
+                <a:endCxn id="17" idx="1"/>
+              </p:cNvCxnSpPr>
+              <p:nvPr/>
+            </p:nvCxnSpPr>
+            <p:spPr>
+              <a:xfrm>
+                <a:off x="5476238" y="2836601"/>
+                <a:ext cx="1813749" cy="0"/>
+              </a:xfrm>
+              <a:prstGeom prst="straightConnector1">
+                <a:avLst/>
+              </a:prstGeom>
+              <a:ln>
+                <a:prstDash val="sysDash"/>
+                <a:tailEnd type="triangle"/>
+              </a:ln>
+            </p:spPr>
+            <p:style>
+              <a:lnRef idx="1">
+                <a:schemeClr val="dk1"/>
+              </a:lnRef>
+              <a:fillRef idx="0">
+                <a:schemeClr val="dk1"/>
+              </a:fillRef>
+              <a:effectRef idx="0">
+                <a:schemeClr val="dk1"/>
+              </a:effectRef>
+              <a:fontRef idx="minor">
+                <a:schemeClr val="tx1"/>
+              </a:fontRef>
+            </p:style>
+          </p:cxnSp>
+          <p:pic>
+            <p:nvPicPr>
+              <p:cNvPr id="29" name="Picture 2" descr="Promitor - Bringing Azure Monitor metrics where you need them ...">
+                <a:extLst>
+                  <a:ext uri="{FF2B5EF4-FFF2-40B4-BE49-F238E27FC236}">
+                    <a16:creationId xmlns:a16="http://schemas.microsoft.com/office/drawing/2014/main" id="{CD4A43BB-6989-448C-B653-C938D6228EE1}"/>
+                  </a:ext>
+                </a:extLst>
+              </p:cNvPr>
+              <p:cNvPicPr>
+                <a:picLocks noChangeAspect="1" noChangeArrowheads="1"/>
+              </p:cNvPicPr>
+              <p:nvPr/>
+            </p:nvPicPr>
+            <p:blipFill>
+              <a:blip r:embed="rId6">
+                <a:extLst>
+                  <a:ext uri="{28A0092B-C50C-407E-A947-70E740481C1C}">
+                    <a14:useLocalDpi xmlns:a14="http://schemas.microsoft.com/office/drawing/2010/main" val="0"/>
+                  </a:ext>
+                </a:extLst>
+              </a:blip>
+              <a:srcRect/>
+              <a:stretch>
+                <a:fillRect/>
+              </a:stretch>
+            </p:blipFill>
+            <p:spPr bwMode="auto">
+              <a:xfrm>
+                <a:off x="776295" y="2536519"/>
+                <a:ext cx="1788160" cy="600164"/>
+              </a:xfrm>
+              <a:prstGeom prst="rect">
+                <a:avLst/>
+              </a:prstGeom>
+              <a:noFill/>
+              <a:extLst>
+                <a:ext uri="{909E8E84-426E-40DD-AFC4-6F175D3DCCD1}">
+                  <a14:hiddenFill xmlns:a14="http://schemas.microsoft.com/office/drawing/2010/main">
+                    <a:solidFill>
+                      <a:srgbClr val="FFFFFF"/>
+                    </a:solidFill>
+                  </a14:hiddenFill>
+                </a:ext>
+              </a:extLst>
+            </p:spPr>
+          </p:pic>
+        </p:grpSp>
+        <p:sp>
+          <p:nvSpPr>
+            <p:cNvPr id="47" name="Rectangle 46">
+              <a:extLst>
+                <a:ext uri="{FF2B5EF4-FFF2-40B4-BE49-F238E27FC236}">
+                  <a16:creationId xmlns:a16="http://schemas.microsoft.com/office/drawing/2014/main" id="{A56628AA-F737-46AE-AE30-500E0465EE2A}"/>
+                </a:ext>
+              </a:extLst>
+            </p:cNvPr>
+            <p:cNvSpPr/>
+            <p:nvPr/>
+          </p:nvSpPr>
+          <p:spPr>
+            <a:xfrm>
+              <a:off x="2999740" y="4249850"/>
+              <a:ext cx="2476498" cy="65813"/>
+            </a:xfrm>
+            <a:prstGeom prst="rect">
+              <a:avLst/>
+            </a:prstGeom>
+            <a:noFill/>
+            <a:ln>
+              <a:noFill/>
+            </a:ln>
+          </p:spPr>
+          <p:style>
+            <a:lnRef idx="2">
+              <a:schemeClr val="dk1"/>
+            </a:lnRef>
+            <a:fillRef idx="1">
+              <a:schemeClr val="lt1"/>
+            </a:fillRef>
+            <a:effectRef idx="0">
+              <a:schemeClr val="dk1"/>
+            </a:effectRef>
+            <a:fontRef idx="minor">
+              <a:schemeClr val="dk1"/>
+            </a:fontRef>
+          </p:style>
+          <p:txBody>
+            <a:bodyPr rtlCol="0" anchor="ctr"/>
+            <a:lstStyle/>
+            <a:p>
+              <a:pPr algn="ctr"/>
+              <a:endParaRPr lang="LID4096" dirty="0"/>
+            </a:p>
+          </p:txBody>
+        </p:sp>
+        <p:sp>
+          <p:nvSpPr>
+            <p:cNvPr id="62" name="Rectangle 61">
+              <a:extLst>
+                <a:ext uri="{FF2B5EF4-FFF2-40B4-BE49-F238E27FC236}">
+                  <a16:creationId xmlns:a16="http://schemas.microsoft.com/office/drawing/2014/main" id="{C8FE18F7-21AE-4DA8-BA9C-41186F831A55}"/>
+                </a:ext>
+              </a:extLst>
+            </p:cNvPr>
+            <p:cNvSpPr/>
+            <p:nvPr/>
+          </p:nvSpPr>
+          <p:spPr>
+            <a:xfrm>
+              <a:off x="2999740" y="3212599"/>
+              <a:ext cx="2476498" cy="65813"/>
+            </a:xfrm>
+            <a:prstGeom prst="rect">
+              <a:avLst/>
+            </a:prstGeom>
+            <a:noFill/>
+            <a:ln>
+              <a:noFill/>
+            </a:ln>
+          </p:spPr>
+          <p:style>
+            <a:lnRef idx="2">
+              <a:schemeClr val="dk1"/>
+            </a:lnRef>
+            <a:fillRef idx="1">
+              <a:schemeClr val="lt1"/>
+            </a:fillRef>
+            <a:effectRef idx="0">
+              <a:schemeClr val="dk1"/>
+            </a:effectRef>
+            <a:fontRef idx="minor">
+              <a:schemeClr val="dk1"/>
+            </a:fontRef>
+          </p:style>
+          <p:txBody>
+            <a:bodyPr rtlCol="0" anchor="ctr"/>
+            <a:lstStyle/>
+            <a:p>
+              <a:pPr algn="ctr"/>
+              <a:endParaRPr lang="LID4096" dirty="0"/>
+            </a:p>
+          </p:txBody>
+        </p:sp>
+        <p:sp>
+          <p:nvSpPr>
+            <p:cNvPr id="63" name="Rectangle 62">
+              <a:extLst>
+                <a:ext uri="{FF2B5EF4-FFF2-40B4-BE49-F238E27FC236}">
+                  <a16:creationId xmlns:a16="http://schemas.microsoft.com/office/drawing/2014/main" id="{80759581-330F-420A-AB2F-CC14DB746802}"/>
+                </a:ext>
+              </a:extLst>
+            </p:cNvPr>
+            <p:cNvSpPr/>
+            <p:nvPr/>
+          </p:nvSpPr>
+          <p:spPr>
+            <a:xfrm>
+              <a:off x="7289987" y="3212598"/>
+              <a:ext cx="2476498" cy="65813"/>
+            </a:xfrm>
+            <a:prstGeom prst="rect">
+              <a:avLst/>
+            </a:prstGeom>
+            <a:noFill/>
+            <a:ln>
+              <a:noFill/>
+            </a:ln>
+          </p:spPr>
+          <p:style>
+            <a:lnRef idx="2">
+              <a:schemeClr val="dk1"/>
+            </a:lnRef>
+            <a:fillRef idx="1">
+              <a:schemeClr val="lt1"/>
+            </a:fillRef>
+            <a:effectRef idx="0">
+              <a:schemeClr val="dk1"/>
+            </a:effectRef>
+            <a:fontRef idx="minor">
+              <a:schemeClr val="dk1"/>
+            </a:fontRef>
+          </p:style>
+          <p:txBody>
+            <a:bodyPr rtlCol="0" anchor="ctr"/>
+            <a:lstStyle/>
+            <a:p>
+              <a:pPr algn="ctr"/>
+              <a:endParaRPr lang="LID4096" dirty="0"/>
+            </a:p>
+          </p:txBody>
+        </p:sp>
+      </p:grpSp>
+      <p:cxnSp>
+        <p:nvCxnSpPr>
+          <p:cNvPr id="15" name="Straight Arrow Connector 14">
+            <a:extLst>
+              <a:ext uri="{FF2B5EF4-FFF2-40B4-BE49-F238E27FC236}">
+                <a16:creationId xmlns:a16="http://schemas.microsoft.com/office/drawing/2014/main" id="{72E81A24-E430-47FF-BD31-773153BB2680}"/>
+              </a:ext>
+            </a:extLst>
+          </p:cNvPr>
+          <p:cNvCxnSpPr>
+            <a:cxnSpLocks/>
+            <a:stCxn id="47" idx="2"/>
+            <a:endCxn id="9" idx="0"/>
+          </p:cNvCxnSpPr>
+          <p:nvPr/>
+        </p:nvCxnSpPr>
+        <p:spPr>
+          <a:xfrm>
+            <a:off x="3935406" y="4315663"/>
+            <a:ext cx="6351" cy="1422308"/>
+          </a:xfrm>
+          <a:prstGeom prst="straightConnector1">
+            <a:avLst/>
+          </a:prstGeom>
+          <a:ln>
+            <a:prstDash val="solid"/>
+            <a:tailEnd type="triangle"/>
+          </a:ln>
+        </p:spPr>
+        <p:style>
+          <a:lnRef idx="1">
+            <a:schemeClr val="dk1"/>
+          </a:lnRef>
+          <a:fillRef idx="0">
+            <a:schemeClr val="dk1"/>
+          </a:fillRef>
+          <a:effectRef idx="0">
+            <a:schemeClr val="dk1"/>
+          </a:effectRef>
+          <a:fontRef idx="minor">
+            <a:schemeClr val="tx1"/>
+          </a:fontRef>
+        </p:style>
+      </p:cxnSp>
+      <p:cxnSp>
+        <p:nvCxnSpPr>
+          <p:cNvPr id="12" name="Straight Arrow Connector 11">
+            <a:extLst>
+              <a:ext uri="{FF2B5EF4-FFF2-40B4-BE49-F238E27FC236}">
+                <a16:creationId xmlns:a16="http://schemas.microsoft.com/office/drawing/2014/main" id="{0F1A70A0-68D7-4FBE-BD81-F87DCE8921F5}"/>
+              </a:ext>
+            </a:extLst>
+          </p:cNvPr>
+          <p:cNvCxnSpPr>
+            <a:cxnSpLocks/>
+            <a:endCxn id="1030" idx="0"/>
+          </p:cNvCxnSpPr>
+          <p:nvPr/>
+        </p:nvCxnSpPr>
+        <p:spPr>
+          <a:xfrm flipH="1">
+            <a:off x="1883086" y="4315663"/>
+            <a:ext cx="2052320" cy="924014"/>
+          </a:xfrm>
+          <a:prstGeom prst="straightConnector1">
+            <a:avLst/>
+          </a:prstGeom>
+          <a:ln>
+            <a:prstDash val="solid"/>
+            <a:tailEnd type="triangle"/>
+          </a:ln>
+        </p:spPr>
+        <p:style>
+          <a:lnRef idx="1">
+            <a:schemeClr val="dk1"/>
+          </a:lnRef>
+          <a:fillRef idx="0">
+            <a:schemeClr val="dk1"/>
+          </a:fillRef>
+          <a:effectRef idx="0">
+            <a:schemeClr val="dk1"/>
+          </a:effectRef>
+          <a:fontRef idx="minor">
+            <a:schemeClr val="tx1"/>
+          </a:fontRef>
+        </p:style>
+      </p:cxnSp>
+      <p:cxnSp>
+        <p:nvCxnSpPr>
+          <p:cNvPr id="21" name="Straight Arrow Connector 20">
+            <a:extLst>
+              <a:ext uri="{FF2B5EF4-FFF2-40B4-BE49-F238E27FC236}">
+                <a16:creationId xmlns:a16="http://schemas.microsoft.com/office/drawing/2014/main" id="{BAE1B440-87C8-4D06-8556-58FB14D17510}"/>
+              </a:ext>
+            </a:extLst>
+          </p:cNvPr>
+          <p:cNvCxnSpPr>
+            <a:cxnSpLocks/>
+            <a:stCxn id="10" idx="0"/>
+            <a:endCxn id="47" idx="2"/>
+          </p:cNvCxnSpPr>
+          <p:nvPr/>
+        </p:nvCxnSpPr>
+        <p:spPr>
+          <a:xfrm flipH="1" flipV="1">
+            <a:off x="3935406" y="4315663"/>
+            <a:ext cx="2132719" cy="933681"/>
+          </a:xfrm>
+          <a:prstGeom prst="straightConnector1">
+            <a:avLst/>
+          </a:prstGeom>
+          <a:ln>
+            <a:prstDash val="sysDash"/>
+            <a:tailEnd type="triangle"/>
+          </a:ln>
+        </p:spPr>
+        <p:style>
+          <a:lnRef idx="1">
+            <a:schemeClr val="dk1"/>
+          </a:lnRef>
+          <a:fillRef idx="0">
+            <a:schemeClr val="dk1"/>
+          </a:fillRef>
+          <a:effectRef idx="0">
+            <a:schemeClr val="dk1"/>
+          </a:effectRef>
+          <a:fontRef idx="minor">
+            <a:schemeClr val="tx1"/>
+          </a:fontRef>
+        </p:style>
+      </p:cxnSp>
+      <p:cxnSp>
+        <p:nvCxnSpPr>
+          <p:cNvPr id="74" name="Straight Arrow Connector 73">
+            <a:extLst>
+              <a:ext uri="{FF2B5EF4-FFF2-40B4-BE49-F238E27FC236}">
+                <a16:creationId xmlns:a16="http://schemas.microsoft.com/office/drawing/2014/main" id="{0DBB484A-508A-4C5E-8A91-D592BB0C1810}"/>
+              </a:ext>
+            </a:extLst>
+          </p:cNvPr>
+          <p:cNvCxnSpPr>
+            <a:cxnSpLocks/>
+            <a:stCxn id="3" idx="2"/>
+            <a:endCxn id="63" idx="0"/>
+          </p:cNvCxnSpPr>
+          <p:nvPr/>
+        </p:nvCxnSpPr>
+        <p:spPr>
+          <a:xfrm rot="16200000" flipH="1">
+            <a:off x="6710652" y="1697597"/>
+            <a:ext cx="900548" cy="2129454"/>
+          </a:xfrm>
+          <a:prstGeom prst="bentConnector3">
+            <a:avLst>
+              <a:gd name="adj1" fmla="val 50000"/>
+            </a:avLst>
+          </a:prstGeom>
+          <a:ln>
+            <a:prstDash val="dash"/>
+            <a:tailEnd type="triangle"/>
+          </a:ln>
+        </p:spPr>
+        <p:style>
+          <a:lnRef idx="1">
+            <a:schemeClr val="dk1"/>
+          </a:lnRef>
+          <a:fillRef idx="0">
+            <a:schemeClr val="dk1"/>
+          </a:fillRef>
+          <a:effectRef idx="0">
+            <a:schemeClr val="dk1"/>
+          </a:effectRef>
+          <a:fontRef idx="minor">
+            <a:schemeClr val="tx1"/>
+          </a:fontRef>
+        </p:style>
+      </p:cxnSp>
+      <p:cxnSp>
+        <p:nvCxnSpPr>
+          <p:cNvPr id="78" name="Straight Arrow Connector 77">
+            <a:extLst>
+              <a:ext uri="{FF2B5EF4-FFF2-40B4-BE49-F238E27FC236}">
+                <a16:creationId xmlns:a16="http://schemas.microsoft.com/office/drawing/2014/main" id="{DE4D253F-F35B-459B-B318-955ABA6B579A}"/>
+              </a:ext>
+            </a:extLst>
+          </p:cNvPr>
+          <p:cNvCxnSpPr>
+            <a:cxnSpLocks/>
+            <a:stCxn id="3" idx="2"/>
+            <a:endCxn id="62" idx="2"/>
+          </p:cNvCxnSpPr>
+          <p:nvPr/>
+        </p:nvCxnSpPr>
+        <p:spPr>
+          <a:xfrm rot="5400000">
+            <a:off x="4532622" y="1714835"/>
+            <a:ext cx="966362" cy="2160793"/>
+          </a:xfrm>
+          <a:prstGeom prst="bentConnector3">
+            <a:avLst>
+              <a:gd name="adj1" fmla="val 46380"/>
+            </a:avLst>
+          </a:prstGeom>
+          <a:ln>
+            <a:prstDash val="dash"/>
+            <a:tailEnd type="triangle"/>
+          </a:ln>
+        </p:spPr>
+        <p:style>
+          <a:lnRef idx="1">
+            <a:schemeClr val="dk1"/>
+          </a:lnRef>
+          <a:fillRef idx="0">
+            <a:schemeClr val="dk1"/>
+          </a:fillRef>
+          <a:effectRef idx="0">
+            <a:schemeClr val="dk1"/>
+          </a:effectRef>
+          <a:fontRef idx="minor">
+            <a:schemeClr val="tx1"/>
+          </a:fontRef>
+        </p:style>
+      </p:cxnSp>
+      <p:grpSp>
+        <p:nvGrpSpPr>
+          <p:cNvPr id="92" name="Group 91">
+            <a:extLst>
+              <a:ext uri="{FF2B5EF4-FFF2-40B4-BE49-F238E27FC236}">
+                <a16:creationId xmlns:a16="http://schemas.microsoft.com/office/drawing/2014/main" id="{77F1662A-51A6-4CB4-B688-9A6EDD68D55E}"/>
+              </a:ext>
+            </a:extLst>
+          </p:cNvPr>
+          <p:cNvGrpSpPr/>
+          <p:nvPr/>
+        </p:nvGrpSpPr>
+        <p:grpSpPr>
+          <a:xfrm>
+            <a:off x="10550423" y="4149282"/>
+            <a:ext cx="1244059" cy="837394"/>
+            <a:chOff x="3622310" y="3854675"/>
+            <a:chExt cx="1244059" cy="837394"/>
+          </a:xfrm>
+        </p:grpSpPr>
+        <p:pic>
+          <p:nvPicPr>
+            <p:cNvPr id="93" name="Picture 10" descr="Azure Monitor (@AzureMonitor) | Twitter">
+              <a:extLst>
+                <a:ext uri="{FF2B5EF4-FFF2-40B4-BE49-F238E27FC236}">
+                  <a16:creationId xmlns:a16="http://schemas.microsoft.com/office/drawing/2014/main" id="{8A243155-9046-40A7-AD57-0C899B9361BC}"/>
+                </a:ext>
+              </a:extLst>
+            </p:cNvPr>
+            <p:cNvPicPr>
+              <a:picLocks noChangeAspect="1" noChangeArrowheads="1"/>
+            </p:cNvPicPr>
+            <p:nvPr/>
+          </p:nvPicPr>
+          <p:blipFill>
+            <a:blip r:embed="rId7">
+              <a:extLst>
+                <a:ext uri="{28A0092B-C50C-407E-A947-70E740481C1C}">
+                  <a14:useLocalDpi xmlns:a14="http://schemas.microsoft.com/office/drawing/2010/main" val="0"/>
+                </a:ext>
+              </a:extLst>
+            </a:blip>
+            <a:srcRect/>
+            <a:stretch>
+              <a:fillRect/>
+            </a:stretch>
+          </p:blipFill>
+          <p:spPr bwMode="auto">
+            <a:xfrm>
+              <a:off x="3999074" y="3854675"/>
+              <a:ext cx="491841" cy="491841"/>
+            </a:xfrm>
+            <a:prstGeom prst="rect">
+              <a:avLst/>
+            </a:prstGeom>
+            <a:noFill/>
+            <a:extLst>
+              <a:ext uri="{909E8E84-426E-40DD-AFC4-6F175D3DCCD1}">
+                <a14:hiddenFill xmlns:a14="http://schemas.microsoft.com/office/drawing/2010/main">
+                  <a:solidFill>
+                    <a:srgbClr val="FFFFFF"/>
+                  </a:solidFill>
+                </a14:hiddenFill>
+              </a:ext>
+            </a:extLst>
+          </p:spPr>
+        </p:pic>
+        <p:sp>
+          <p:nvSpPr>
+            <p:cNvPr id="94" name="TextBox 93">
+              <a:extLst>
+                <a:ext uri="{FF2B5EF4-FFF2-40B4-BE49-F238E27FC236}">
+                  <a16:creationId xmlns:a16="http://schemas.microsoft.com/office/drawing/2014/main" id="{0B04B98B-0879-4444-9912-A0C3AEDAF3B7}"/>
+                </a:ext>
+              </a:extLst>
+            </p:cNvPr>
+            <p:cNvSpPr txBox="1"/>
+            <p:nvPr/>
+          </p:nvSpPr>
+          <p:spPr>
+            <a:xfrm>
+              <a:off x="3622310" y="4384292"/>
+              <a:ext cx="1244059" cy="307777"/>
+            </a:xfrm>
+            <a:prstGeom prst="rect">
+              <a:avLst/>
+            </a:prstGeom>
+            <a:noFill/>
+          </p:spPr>
+          <p:txBody>
+            <a:bodyPr wrap="none" rtlCol="0">
+              <a:spAutoFit/>
+            </a:bodyPr>
+            <a:lstStyle/>
+            <a:p>
+              <a:r>
+                <a:rPr lang="en-US" sz="1400" dirty="0"/>
+                <a:t>Azure Monitor</a:t>
+              </a:r>
+              <a:endParaRPr lang="LID4096" sz="1400" dirty="0"/>
+            </a:p>
+          </p:txBody>
+        </p:sp>
+      </p:grpSp>
+      <p:grpSp>
+        <p:nvGrpSpPr>
+          <p:cNvPr id="95" name="Group 94">
+            <a:extLst>
+              <a:ext uri="{FF2B5EF4-FFF2-40B4-BE49-F238E27FC236}">
+                <a16:creationId xmlns:a16="http://schemas.microsoft.com/office/drawing/2014/main" id="{1650958C-4DF8-4B3A-A217-7521C08CA5E9}"/>
+              </a:ext>
+            </a:extLst>
+          </p:cNvPr>
+          <p:cNvGrpSpPr/>
+          <p:nvPr/>
+        </p:nvGrpSpPr>
+        <p:grpSpPr>
+          <a:xfrm>
+            <a:off x="10274861" y="2863521"/>
+            <a:ext cx="1800621" cy="837392"/>
+            <a:chOff x="6982900" y="3854676"/>
+            <a:chExt cx="1800621" cy="837392"/>
+          </a:xfrm>
+        </p:grpSpPr>
+        <p:pic>
+          <p:nvPicPr>
+            <p:cNvPr id="96" name="Picture 4" descr="Starter query samples - Azure Resource Graph | Microsoft Docs">
+              <a:extLst>
+                <a:ext uri="{FF2B5EF4-FFF2-40B4-BE49-F238E27FC236}">
+                  <a16:creationId xmlns:a16="http://schemas.microsoft.com/office/drawing/2014/main" id="{2ADDDB2F-C460-4EDE-A1BC-55A87092B731}"/>
+                </a:ext>
+              </a:extLst>
+            </p:cNvPr>
+            <p:cNvPicPr>
+              <a:picLocks noChangeAspect="1" noChangeArrowheads="1"/>
+            </p:cNvPicPr>
+            <p:nvPr/>
+          </p:nvPicPr>
+          <p:blipFill>
+            <a:blip r:embed="rId8">
+              <a:extLst>
+                <a:ext uri="{BEBA8EAE-BF5A-486C-A8C5-ECC9F3942E4B}">
+                  <a14:imgProps xmlns:a14="http://schemas.microsoft.com/office/drawing/2010/main">
+                    <a14:imgLayer r:embed="rId9">
+                      <a14:imgEffect>
+                        <a14:backgroundRemoval t="4000" b="95556" l="889" r="93778">
+                          <a14:foregroundMark x1="4889" y1="22222" x2="13333" y2="9333"/>
+                          <a14:foregroundMark x1="1333" y1="16889" x2="1333" y2="16889"/>
+                          <a14:foregroundMark x1="81778" y1="20000" x2="81778" y2="20000"/>
+                          <a14:foregroundMark x1="75111" y1="18667" x2="75111" y2="16444"/>
+                          <a14:foregroundMark x1="67111" y1="16000" x2="89778" y2="18222"/>
+                          <a14:foregroundMark x1="89778" y1="18222" x2="68000" y2="17333"/>
+                          <a14:foregroundMark x1="94222" y1="23111" x2="94222" y2="23111"/>
+                          <a14:foregroundMark x1="79556" y1="4444" x2="79556" y2="4444"/>
+                          <a14:foregroundMark x1="54667" y1="72444" x2="54667" y2="72444"/>
+                          <a14:foregroundMark x1="56889" y1="91556" x2="56889" y2="91556"/>
+                          <a14:foregroundMark x1="56444" y1="95556" x2="56444" y2="95556"/>
+                        </a14:backgroundRemoval>
+                      </a14:imgEffect>
+                    </a14:imgLayer>
+                  </a14:imgProps>
+                </a:ext>
+                <a:ext uri="{28A0092B-C50C-407E-A947-70E740481C1C}">
+                  <a14:useLocalDpi xmlns:a14="http://schemas.microsoft.com/office/drawing/2010/main" val="0"/>
+                </a:ext>
+              </a:extLst>
+            </a:blip>
+            <a:srcRect/>
+            <a:stretch>
+              <a:fillRect/>
+            </a:stretch>
+          </p:blipFill>
+          <p:spPr bwMode="auto">
+            <a:xfrm>
+              <a:off x="7637290" y="3854676"/>
+              <a:ext cx="491842" cy="491842"/>
+            </a:xfrm>
+            <a:prstGeom prst="rect">
+              <a:avLst/>
+            </a:prstGeom>
+            <a:noFill/>
+            <a:extLst>
+              <a:ext uri="{909E8E84-426E-40DD-AFC4-6F175D3DCCD1}">
+                <a14:hiddenFill xmlns:a14="http://schemas.microsoft.com/office/drawing/2010/main">
+                  <a:solidFill>
+                    <a:srgbClr val="FFFFFF"/>
+                  </a:solidFill>
+                </a14:hiddenFill>
+              </a:ext>
+            </a:extLst>
+          </p:spPr>
+        </p:pic>
+        <p:sp>
+          <p:nvSpPr>
+            <p:cNvPr id="97" name="TextBox 96">
+              <a:extLst>
+                <a:ext uri="{FF2B5EF4-FFF2-40B4-BE49-F238E27FC236}">
+                  <a16:creationId xmlns:a16="http://schemas.microsoft.com/office/drawing/2014/main" id="{56B263F7-B210-4406-98C7-AABD2FECF3FF}"/>
+                </a:ext>
+              </a:extLst>
+            </p:cNvPr>
+            <p:cNvSpPr txBox="1"/>
+            <p:nvPr/>
+          </p:nvSpPr>
+          <p:spPr>
+            <a:xfrm>
+              <a:off x="6982900" y="4384291"/>
+              <a:ext cx="1800621" cy="307777"/>
+            </a:xfrm>
+            <a:prstGeom prst="rect">
+              <a:avLst/>
+            </a:prstGeom>
+            <a:noFill/>
+          </p:spPr>
+          <p:txBody>
+            <a:bodyPr wrap="none" rtlCol="0">
+              <a:spAutoFit/>
+            </a:bodyPr>
+            <a:lstStyle/>
+            <a:p>
+              <a:r>
+                <a:rPr lang="en-US" sz="1400" dirty="0"/>
+                <a:t>Azure Resource Graph</a:t>
+              </a:r>
+              <a:endParaRPr lang="LID4096" sz="1400" dirty="0"/>
+            </a:p>
+          </p:txBody>
+        </p:sp>
+      </p:grpSp>
+      <p:cxnSp>
+        <p:nvCxnSpPr>
+          <p:cNvPr id="91" name="Straight Arrow Connector 90">
+            <a:extLst>
+              <a:ext uri="{FF2B5EF4-FFF2-40B4-BE49-F238E27FC236}">
+                <a16:creationId xmlns:a16="http://schemas.microsoft.com/office/drawing/2014/main" id="{87B784F0-5D0E-4EBE-A1A3-5548CCCCE074}"/>
+              </a:ext>
+            </a:extLst>
+          </p:cNvPr>
+          <p:cNvCxnSpPr>
+            <a:cxnSpLocks/>
+            <a:stCxn id="26" idx="3"/>
+            <a:endCxn id="96" idx="1"/>
+          </p:cNvCxnSpPr>
+          <p:nvPr/>
+        </p:nvCxnSpPr>
+        <p:spPr>
+          <a:xfrm flipV="1">
+            <a:off x="9725331" y="3109442"/>
+            <a:ext cx="1203920" cy="658769"/>
+          </a:xfrm>
+          <a:prstGeom prst="bentConnector3">
+            <a:avLst>
+              <a:gd name="adj1" fmla="val 36980"/>
+            </a:avLst>
+          </a:prstGeom>
+          <a:ln>
+            <a:prstDash val="lgDash"/>
+            <a:tailEnd type="triangle"/>
+          </a:ln>
+        </p:spPr>
+        <p:style>
+          <a:lnRef idx="1">
+            <a:schemeClr val="dk1"/>
+          </a:lnRef>
+          <a:fillRef idx="0">
+            <a:schemeClr val="dk1"/>
+          </a:fillRef>
+          <a:effectRef idx="0">
+            <a:schemeClr val="dk1"/>
+          </a:effectRef>
+          <a:fontRef idx="minor">
+            <a:schemeClr val="tx1"/>
+          </a:fontRef>
+        </p:style>
+      </p:cxnSp>
+      <p:cxnSp>
+        <p:nvCxnSpPr>
+          <p:cNvPr id="102" name="Straight Arrow Connector 101">
+            <a:extLst>
+              <a:ext uri="{FF2B5EF4-FFF2-40B4-BE49-F238E27FC236}">
+                <a16:creationId xmlns:a16="http://schemas.microsoft.com/office/drawing/2014/main" id="{2A76A497-8EDD-4B51-A912-162817016642}"/>
+              </a:ext>
+            </a:extLst>
+          </p:cNvPr>
+          <p:cNvCxnSpPr>
+            <a:cxnSpLocks/>
+            <a:stCxn id="26" idx="3"/>
+            <a:endCxn id="93" idx="1"/>
+          </p:cNvCxnSpPr>
+          <p:nvPr/>
+        </p:nvCxnSpPr>
+        <p:spPr>
+          <a:xfrm>
+            <a:off x="9725331" y="3768211"/>
+            <a:ext cx="1201856" cy="626992"/>
+          </a:xfrm>
+          <a:prstGeom prst="bentConnector3">
+            <a:avLst>
+              <a:gd name="adj1" fmla="val 36957"/>
+            </a:avLst>
+          </a:prstGeom>
+          <a:ln>
+            <a:prstDash val="lgDash"/>
+            <a:tailEnd type="triangle"/>
+          </a:ln>
+        </p:spPr>
+        <p:style>
+          <a:lnRef idx="1">
+            <a:schemeClr val="dk1"/>
+          </a:lnRef>
+          <a:fillRef idx="0">
+            <a:schemeClr val="dk1"/>
+          </a:fillRef>
+          <a:effectRef idx="0">
+            <a:schemeClr val="dk1"/>
+          </a:effectRef>
+          <a:fontRef idx="minor">
+            <a:schemeClr val="tx1"/>
+          </a:fontRef>
+        </p:style>
+      </p:cxnSp>
+      <p:grpSp>
+        <p:nvGrpSpPr>
+          <p:cNvPr id="18" name="Group 17">
+            <a:extLst>
+              <a:ext uri="{FF2B5EF4-FFF2-40B4-BE49-F238E27FC236}">
+                <a16:creationId xmlns:a16="http://schemas.microsoft.com/office/drawing/2014/main" id="{E689B0D8-EC05-4589-9E21-CEFBE8020F49}"/>
+              </a:ext>
+            </a:extLst>
+          </p:cNvPr>
+          <p:cNvGrpSpPr/>
+          <p:nvPr/>
+        </p:nvGrpSpPr>
+        <p:grpSpPr>
+          <a:xfrm>
+            <a:off x="4920924" y="1452094"/>
+            <a:ext cx="2350550" cy="859956"/>
+            <a:chOff x="5626501" y="1299770"/>
+            <a:chExt cx="2350550" cy="859956"/>
+          </a:xfrm>
+        </p:grpSpPr>
+        <p:sp>
+          <p:nvSpPr>
+            <p:cNvPr id="3" name="Rectangle 2">
+              <a:extLst>
+                <a:ext uri="{FF2B5EF4-FFF2-40B4-BE49-F238E27FC236}">
+                  <a16:creationId xmlns:a16="http://schemas.microsoft.com/office/drawing/2014/main" id="{9C5E7D04-B76F-49FD-BFFC-F2BC06C62423}"/>
+                </a:ext>
+              </a:extLst>
+            </p:cNvPr>
+            <p:cNvSpPr/>
+            <p:nvPr/>
+          </p:nvSpPr>
+          <p:spPr>
+            <a:xfrm>
+              <a:off x="5626501" y="1299770"/>
+              <a:ext cx="2350550" cy="859956"/>
+            </a:xfrm>
+            <a:prstGeom prst="rect">
+              <a:avLst/>
+            </a:prstGeom>
+            <a:solidFill>
+              <a:schemeClr val="bg1"/>
+            </a:solidFill>
+          </p:spPr>
+          <p:style>
+            <a:lnRef idx="2">
+              <a:schemeClr val="dk1"/>
+            </a:lnRef>
+            <a:fillRef idx="1">
+              <a:schemeClr val="lt1"/>
+            </a:fillRef>
+            <a:effectRef idx="0">
+              <a:schemeClr val="dk1"/>
+            </a:effectRef>
+            <a:fontRef idx="minor">
+              <a:schemeClr val="dk1"/>
+            </a:fontRef>
+          </p:style>
+          <p:txBody>
+            <a:bodyPr rtlCol="0" anchor="b"/>
+            <a:lstStyle/>
+            <a:p>
+              <a:pPr algn="ctr">
+                <a:spcAft>
+                  <a:spcPts val="1200"/>
+                </a:spcAft>
+              </a:pPr>
+              <a:endParaRPr lang="LID4096" sz="900" dirty="0"/>
+            </a:p>
+          </p:txBody>
+        </p:sp>
+        <p:pic>
+          <p:nvPicPr>
+            <p:cNvPr id="2050" name="Picture 2" descr="networking Archives - IT-obey!">
+              <a:extLst>
+                <a:ext uri="{FF2B5EF4-FFF2-40B4-BE49-F238E27FC236}">
+                  <a16:creationId xmlns:a16="http://schemas.microsoft.com/office/drawing/2014/main" id="{67E5E883-7F0B-4AF5-AADB-3C0E265D8C3F}"/>
+                </a:ext>
+              </a:extLst>
+            </p:cNvPr>
+            <p:cNvPicPr>
+              <a:picLocks noChangeAspect="1" noChangeArrowheads="1"/>
+            </p:cNvPicPr>
+            <p:nvPr/>
+          </p:nvPicPr>
+          <p:blipFill rotWithShape="1">
+            <a:blip r:embed="rId10">
+              <a:extLst>
+                <a:ext uri="{28A0092B-C50C-407E-A947-70E740481C1C}">
+                  <a14:useLocalDpi xmlns:a14="http://schemas.microsoft.com/office/drawing/2010/main" val="0"/>
+                </a:ext>
+              </a:extLst>
+            </a:blip>
+            <a:srcRect l="6870" t="3610" r="8395" b="11670"/>
+            <a:stretch/>
+          </p:blipFill>
+          <p:spPr bwMode="auto">
+            <a:xfrm>
+              <a:off x="5721775" y="1392069"/>
+              <a:ext cx="2160000" cy="664510"/>
+            </a:xfrm>
+            <a:prstGeom prst="rect">
+              <a:avLst/>
+            </a:prstGeom>
+            <a:noFill/>
+            <a:extLst>
+              <a:ext uri="{909E8E84-426E-40DD-AFC4-6F175D3DCCD1}">
+                <a14:hiddenFill xmlns:a14="http://schemas.microsoft.com/office/drawing/2010/main">
+                  <a:solidFill>
+                    <a:srgbClr val="FFFFFF"/>
+                  </a:solidFill>
+                </a14:hiddenFill>
+              </a:ext>
+            </a:extLst>
+          </p:spPr>
+        </p:pic>
+      </p:grpSp>
+      <p:sp>
+        <p:nvSpPr>
+          <p:cNvPr id="22" name="TextBox 21">
+            <a:extLst>
+              <a:ext uri="{FF2B5EF4-FFF2-40B4-BE49-F238E27FC236}">
+                <a16:creationId xmlns:a16="http://schemas.microsoft.com/office/drawing/2014/main" id="{06E9F5EF-EFB5-478D-A539-64DB3C53FD14}"/>
+              </a:ext>
+            </a:extLst>
+          </p:cNvPr>
+          <p:cNvSpPr txBox="1"/>
+          <p:nvPr/>
+        </p:nvSpPr>
+        <p:spPr>
+          <a:xfrm>
+            <a:off x="3855003" y="2367791"/>
+            <a:ext cx="1151277" cy="307777"/>
+          </a:xfrm>
+          <a:prstGeom prst="rect">
+            <a:avLst/>
+          </a:prstGeom>
+          <a:noFill/>
+        </p:spPr>
+        <p:txBody>
+          <a:bodyPr wrap="none" rtlCol="0">
+            <a:spAutoFit/>
+          </a:bodyPr>
+          <a:lstStyle/>
+          <a:p>
+            <a:r>
+              <a:rPr lang="en-US" sz="1400" dirty="0"/>
+              <a:t>:80/</a:t>
+            </a:r>
+            <a:r>
+              <a:rPr lang="en-US" sz="1400" dirty="0" err="1"/>
+              <a:t>api</a:t>
+            </a:r>
+            <a:r>
+              <a:rPr lang="en-US" sz="1400" dirty="0"/>
+              <a:t>/docs</a:t>
+            </a:r>
+            <a:endParaRPr lang="LID4096" sz="1400" dirty="0"/>
+          </a:p>
+        </p:txBody>
+      </p:sp>
+      <p:sp>
+        <p:nvSpPr>
+          <p:cNvPr id="24" name="TextBox 23">
+            <a:extLst>
+              <a:ext uri="{FF2B5EF4-FFF2-40B4-BE49-F238E27FC236}">
+                <a16:creationId xmlns:a16="http://schemas.microsoft.com/office/drawing/2014/main" id="{B5A10A00-9B69-4B4A-9E44-02A39D8511C9}"/>
+              </a:ext>
+            </a:extLst>
+          </p:cNvPr>
+          <p:cNvSpPr txBox="1"/>
+          <p:nvPr/>
+        </p:nvSpPr>
+        <p:spPr>
+          <a:xfrm>
+            <a:off x="6842043" y="2388408"/>
+            <a:ext cx="1151277" cy="307777"/>
+          </a:xfrm>
+          <a:prstGeom prst="rect">
+            <a:avLst/>
+          </a:prstGeom>
+          <a:noFill/>
+        </p:spPr>
+        <p:txBody>
+          <a:bodyPr wrap="none" rtlCol="0">
+            <a:spAutoFit/>
+          </a:bodyPr>
+          <a:lstStyle/>
+          <a:p>
+            <a:r>
+              <a:rPr lang="en-US" sz="1400" dirty="0"/>
+              <a:t>:80/</a:t>
+            </a:r>
+            <a:r>
+              <a:rPr lang="en-US" sz="1400" dirty="0" err="1"/>
+              <a:t>api</a:t>
+            </a:r>
+            <a:r>
+              <a:rPr lang="en-US" sz="1400" dirty="0"/>
+              <a:t>/docs</a:t>
+            </a:r>
+            <a:endParaRPr lang="LID4096" sz="1400" dirty="0"/>
+          </a:p>
+        </p:txBody>
+      </p:sp>
+      <p:sp>
+        <p:nvSpPr>
+          <p:cNvPr id="28" name="TextBox 27">
+            <a:extLst>
+              <a:ext uri="{FF2B5EF4-FFF2-40B4-BE49-F238E27FC236}">
+                <a16:creationId xmlns:a16="http://schemas.microsoft.com/office/drawing/2014/main" id="{85384B44-6855-414A-B536-2D8C433E1847}"/>
+              </a:ext>
+            </a:extLst>
+          </p:cNvPr>
+          <p:cNvSpPr txBox="1"/>
+          <p:nvPr/>
+        </p:nvSpPr>
+        <p:spPr>
+          <a:xfrm>
+            <a:off x="2997134" y="708756"/>
+            <a:ext cx="2352824" cy="307777"/>
+          </a:xfrm>
+          <a:prstGeom prst="rect">
+            <a:avLst/>
+          </a:prstGeom>
+          <a:noFill/>
+        </p:spPr>
+        <p:txBody>
+          <a:bodyPr wrap="none" rtlCol="0">
+            <a:spAutoFit/>
+          </a:bodyPr>
+          <a:lstStyle/>
+          <a:p>
+            <a:r>
+              <a:rPr lang="en-US" sz="1400" dirty="0"/>
+              <a:t>:999/agents/scraper/</a:t>
+            </a:r>
+            <a:r>
+              <a:rPr lang="en-US" sz="1400" dirty="0" err="1"/>
+              <a:t>api</a:t>
+            </a:r>
+            <a:r>
+              <a:rPr lang="en-US" sz="1400" dirty="0"/>
+              <a:t>/docs</a:t>
+            </a:r>
+            <a:endParaRPr lang="LID4096" sz="1400" dirty="0"/>
+          </a:p>
+        </p:txBody>
+      </p:sp>
+      <p:sp>
+        <p:nvSpPr>
+          <p:cNvPr id="30" name="TextBox 29">
+            <a:extLst>
+              <a:ext uri="{FF2B5EF4-FFF2-40B4-BE49-F238E27FC236}">
+                <a16:creationId xmlns:a16="http://schemas.microsoft.com/office/drawing/2014/main" id="{61CE4008-432C-407E-811F-1913AA1D83D7}"/>
+              </a:ext>
+            </a:extLst>
+          </p:cNvPr>
+          <p:cNvSpPr txBox="1"/>
+          <p:nvPr/>
+        </p:nvSpPr>
+        <p:spPr>
+          <a:xfrm>
+            <a:off x="6842043" y="708757"/>
+            <a:ext cx="2507481" cy="307777"/>
+          </a:xfrm>
+          <a:prstGeom prst="rect">
+            <a:avLst/>
+          </a:prstGeom>
+          <a:noFill/>
+        </p:spPr>
+        <p:txBody>
+          <a:bodyPr wrap="none" rtlCol="0">
+            <a:spAutoFit/>
+          </a:bodyPr>
+          <a:lstStyle/>
+          <a:p>
+            <a:r>
+              <a:rPr lang="en-US" sz="1400" dirty="0"/>
+              <a:t>:999/agents/discovery/</a:t>
+            </a:r>
+            <a:r>
+              <a:rPr lang="en-US" sz="1400" dirty="0" err="1"/>
+              <a:t>api</a:t>
+            </a:r>
+            <a:r>
+              <a:rPr lang="en-US" sz="1400" dirty="0"/>
+              <a:t>/docs</a:t>
+            </a:r>
+            <a:endParaRPr lang="LID4096" sz="1400" dirty="0"/>
+          </a:p>
+        </p:txBody>
+      </p:sp>
+      <p:cxnSp>
+        <p:nvCxnSpPr>
+          <p:cNvPr id="36" name="Straight Arrow Connector 73">
+            <a:extLst>
+              <a:ext uri="{FF2B5EF4-FFF2-40B4-BE49-F238E27FC236}">
+                <a16:creationId xmlns:a16="http://schemas.microsoft.com/office/drawing/2014/main" id="{A63C92DA-C30F-4E3B-9006-5C3FA4EE256B}"/>
+              </a:ext>
+            </a:extLst>
+          </p:cNvPr>
+          <p:cNvCxnSpPr>
+            <a:cxnSpLocks/>
+            <a:stCxn id="28" idx="2"/>
+            <a:endCxn id="3" idx="0"/>
+          </p:cNvCxnSpPr>
+          <p:nvPr/>
+        </p:nvCxnSpPr>
+        <p:spPr>
+          <a:xfrm rot="16200000" flipH="1">
+            <a:off x="4917092" y="272986"/>
+            <a:ext cx="435561" cy="1922653"/>
+          </a:xfrm>
+          <a:prstGeom prst="bentConnector3">
+            <a:avLst>
+              <a:gd name="adj1" fmla="val 50000"/>
+            </a:avLst>
+          </a:prstGeom>
+          <a:ln>
+            <a:prstDash val="dash"/>
+            <a:tailEnd type="triangle"/>
+          </a:ln>
+        </p:spPr>
+        <p:style>
+          <a:lnRef idx="1">
+            <a:schemeClr val="dk1"/>
+          </a:lnRef>
+          <a:fillRef idx="0">
+            <a:schemeClr val="dk1"/>
+          </a:fillRef>
+          <a:effectRef idx="0">
+            <a:schemeClr val="dk1"/>
+          </a:effectRef>
+          <a:fontRef idx="minor">
+            <a:schemeClr val="tx1"/>
+          </a:fontRef>
+        </p:style>
+      </p:cxnSp>
+      <p:cxnSp>
+        <p:nvCxnSpPr>
+          <p:cNvPr id="40" name="Straight Arrow Connector 73">
+            <a:extLst>
+              <a:ext uri="{FF2B5EF4-FFF2-40B4-BE49-F238E27FC236}">
+                <a16:creationId xmlns:a16="http://schemas.microsoft.com/office/drawing/2014/main" id="{51260472-4003-4EE3-9B29-6AAF8C9B09C2}"/>
+              </a:ext>
+            </a:extLst>
+          </p:cNvPr>
+          <p:cNvCxnSpPr>
+            <a:cxnSpLocks/>
+            <a:stCxn id="30" idx="2"/>
+            <a:endCxn id="3" idx="0"/>
+          </p:cNvCxnSpPr>
+          <p:nvPr/>
+        </p:nvCxnSpPr>
+        <p:spPr>
+          <a:xfrm rot="5400000">
+            <a:off x="6878212" y="234522"/>
+            <a:ext cx="435560" cy="1999585"/>
+          </a:xfrm>
+          <a:prstGeom prst="bentConnector3">
+            <a:avLst>
+              <a:gd name="adj1" fmla="val 50000"/>
+            </a:avLst>
+          </a:prstGeom>
+          <a:ln>
+            <a:prstDash val="dash"/>
+            <a:tailEnd type="triangle"/>
+          </a:ln>
+        </p:spPr>
+        <p:style>
+          <a:lnRef idx="1">
+            <a:schemeClr val="dk1"/>
+          </a:lnRef>
+          <a:fillRef idx="0">
+            <a:schemeClr val="dk1"/>
+          </a:fillRef>
+          <a:effectRef idx="0">
+            <a:schemeClr val="dk1"/>
+          </a:effectRef>
+          <a:fontRef idx="minor">
+            <a:schemeClr val="tx1"/>
+          </a:fontRef>
+        </p:style>
+      </p:cxnSp>
+      <p:pic>
+        <p:nvPicPr>
+          <p:cNvPr id="84" name="Graphic 83" descr="Programmer male with solid fill">
+            <a:extLst>
+              <a:ext uri="{FF2B5EF4-FFF2-40B4-BE49-F238E27FC236}">
+                <a16:creationId xmlns:a16="http://schemas.microsoft.com/office/drawing/2014/main" id="{401FCF1C-B4C9-4A28-B6CB-9389B35C5652}"/>
+              </a:ext>
+            </a:extLst>
+          </p:cNvPr>
+          <p:cNvPicPr>
+            <a:picLocks noChangeAspect="1"/>
+          </p:cNvPicPr>
+          <p:nvPr/>
+        </p:nvPicPr>
+        <p:blipFill>
+          <a:blip r:embed="rId11">
+            <a:extLst>
+              <a:ext uri="{28A0092B-C50C-407E-A947-70E740481C1C}">
+                <a14:useLocalDpi xmlns:a14="http://schemas.microsoft.com/office/drawing/2010/main" val="0"/>
+              </a:ext>
+              <a:ext uri="{96DAC541-7B7A-43D3-8B79-37D633B846F1}">
+                <asvg:svgBlip xmlns:asvg="http://schemas.microsoft.com/office/drawing/2016/SVG/main" r:embed="rId12"/>
+              </a:ext>
+            </a:extLst>
+          </a:blip>
+          <a:stretch>
+            <a:fillRect/>
+          </a:stretch>
+        </p:blipFill>
+        <p:spPr>
+          <a:xfrm>
+            <a:off x="7805348" y="127886"/>
+            <a:ext cx="580870" cy="580870"/>
+          </a:xfrm>
+          <a:prstGeom prst="rect">
+            <a:avLst/>
+          </a:prstGeom>
+        </p:spPr>
+      </p:pic>
+      <p:pic>
+        <p:nvPicPr>
+          <p:cNvPr id="86" name="Graphic 85" descr="Programmer female with solid fill">
+            <a:extLst>
+              <a:ext uri="{FF2B5EF4-FFF2-40B4-BE49-F238E27FC236}">
+                <a16:creationId xmlns:a16="http://schemas.microsoft.com/office/drawing/2014/main" id="{72C34781-8860-47FD-A39C-1EF1C08FF798}"/>
+              </a:ext>
+            </a:extLst>
+          </p:cNvPr>
+          <p:cNvPicPr>
+            <a:picLocks noChangeAspect="1"/>
+          </p:cNvPicPr>
+          <p:nvPr/>
+        </p:nvPicPr>
+        <p:blipFill>
+          <a:blip r:embed="rId13">
+            <a:extLst>
+              <a:ext uri="{28A0092B-C50C-407E-A947-70E740481C1C}">
+                <a14:useLocalDpi xmlns:a14="http://schemas.microsoft.com/office/drawing/2010/main" val="0"/>
+              </a:ext>
+              <a:ext uri="{96DAC541-7B7A-43D3-8B79-37D633B846F1}">
+                <asvg:svgBlip xmlns:asvg="http://schemas.microsoft.com/office/drawing/2016/SVG/main" r:embed="rId14"/>
+              </a:ext>
+            </a:extLst>
+          </a:blip>
+          <a:srcRect/>
+          <a:stretch/>
+        </p:blipFill>
+        <p:spPr>
+          <a:xfrm>
+            <a:off x="3883111" y="127885"/>
+            <a:ext cx="580870" cy="580870"/>
+          </a:xfrm>
+          <a:prstGeom prst="rect">
+            <a:avLst/>
+          </a:prstGeom>
+        </p:spPr>
+      </p:pic>
+    </p:spTree>
+    <p:extLst>
+      <p:ext uri="{BB962C8B-B14F-4D97-AF65-F5344CB8AC3E}">
+        <p14:creationId xmlns:p14="http://schemas.microsoft.com/office/powerpoint/2010/main" val="136988369"/>
+      </p:ext>
+    </p:extLst>
+  </p:cSld>
+  <p:clrMapOvr>
+    <a:masterClrMapping/>
+  </p:clrMapOvr>
+</p:sld>
+</file>
+
+<file path=ppt/slides/slide8.xml><?xml version="1.0" encoding="utf-8"?>
+<p:sld xmlns:a="http://schemas.openxmlformats.org/drawingml/2006/main" xmlns:r="http://schemas.openxmlformats.org/officeDocument/2006/relationships" xmlns:p="http://schemas.openxmlformats.org/presentationml/2006/main">
+  <p:cSld>
+    <p:spTree>
+      <p:nvGrpSpPr>
+        <p:cNvPr id="1" name=""/>
+        <p:cNvGrpSpPr/>
+        <p:nvPr/>
+      </p:nvGrpSpPr>
+      <p:grpSpPr>
+        <a:xfrm>
+          <a:off x="0" y="0"/>
+          <a:ext cx="0" cy="0"/>
+          <a:chOff x="0" y="0"/>
+          <a:chExt cx="0" cy="0"/>
+        </a:xfrm>
+      </p:grpSpPr>
       <p:pic>
         <p:nvPicPr>
           <p:cNvPr id="1026" name="Picture 2" descr="StatsD Logo | Logos, Tech logos, Gaming logos">
@@ -7406,4 +12211,10 @@
     </a:ext>
   </a:extLst>
 </a:theme>
+</file>
+
+<file path=docMetadata/LabelInfo.xml><?xml version="1.0" encoding="utf-8"?>
+<clbl:labelList xmlns:clbl="http://schemas.microsoft.com/office/2020/mipLabelMetadata">
+  <clbl:label id="{72f988bf-86f1-41af-91ab-2d7cd011db47}" enabled="0" method="" siteId="{72f988bf-86f1-41af-91ab-2d7cd011db47}" removed="1"/>
+</clbl:labelList>
 </file>
</xml_diff>